<commit_message>
add notes to sept ppt
</commit_message>
<xml_diff>
--- a/2024/presentation/sept_pt/sept_pt_notes.pptx
+++ b/2024/presentation/sept_pt/sept_pt_notes.pptx
@@ -6,10 +6,12 @@
   </p:sldMasterIdLst>
   <p:sldIdLst>
     <p:sldId id="256" r:id="rId2"/>
-    <p:sldId id="258" r:id="rId3"/>
-    <p:sldId id="257" r:id="rId4"/>
-    <p:sldId id="259" r:id="rId5"/>
-    <p:sldId id="260" r:id="rId6"/>
+    <p:sldId id="261" r:id="rId3"/>
+    <p:sldId id="258" r:id="rId4"/>
+    <p:sldId id="262" r:id="rId5"/>
+    <p:sldId id="257" r:id="rId6"/>
+    <p:sldId id="259" r:id="rId7"/>
+    <p:sldId id="260" r:id="rId8"/>
   </p:sldIdLst>
   <p:sldSz cx="12192000" cy="6858000"/>
   <p:notesSz cx="6858000" cy="9144000"/>
@@ -108,6 +110,11 @@
       </a:defRPr>
     </a:lvl9pPr>
   </p:defaultTextStyle>
+  <p:extLst>
+    <p:ext uri="{EFAFB233-063F-42B5-8137-9DF3F51BA10A}">
+      <p15:sldGuideLst xmlns:p15="http://schemas.microsoft.com/office/powerpoint/2012/main"/>
+    </p:ext>
+  </p:extLst>
 </p:presentation>
 </file>
 
@@ -242,7 +249,7 @@
           <a:p>
             <a:fld id="{4E25A832-BDE2-4020-AF57-35165F1EE857}" type="datetimeFigureOut">
               <a:rPr lang="en-US" smtClean="0"/>
-              <a:t>7/30/2024</a:t>
+              <a:t>8/8/2024</a:t>
             </a:fld>
             <a:endParaRPr lang="en-US"/>
           </a:p>
@@ -412,7 +419,7 @@
           <a:p>
             <a:fld id="{4E25A832-BDE2-4020-AF57-35165F1EE857}" type="datetimeFigureOut">
               <a:rPr lang="en-US" smtClean="0"/>
-              <a:t>7/30/2024</a:t>
+              <a:t>8/8/2024</a:t>
             </a:fld>
             <a:endParaRPr lang="en-US"/>
           </a:p>
@@ -592,7 +599,7 @@
           <a:p>
             <a:fld id="{4E25A832-BDE2-4020-AF57-35165F1EE857}" type="datetimeFigureOut">
               <a:rPr lang="en-US" smtClean="0"/>
-              <a:t>7/30/2024</a:t>
+              <a:t>8/8/2024</a:t>
             </a:fld>
             <a:endParaRPr lang="en-US"/>
           </a:p>
@@ -762,7 +769,7 @@
           <a:p>
             <a:fld id="{4E25A832-BDE2-4020-AF57-35165F1EE857}" type="datetimeFigureOut">
               <a:rPr lang="en-US" smtClean="0"/>
-              <a:t>7/30/2024</a:t>
+              <a:t>8/8/2024</a:t>
             </a:fld>
             <a:endParaRPr lang="en-US"/>
           </a:p>
@@ -1008,7 +1015,7 @@
           <a:p>
             <a:fld id="{4E25A832-BDE2-4020-AF57-35165F1EE857}" type="datetimeFigureOut">
               <a:rPr lang="en-US" smtClean="0"/>
-              <a:t>7/30/2024</a:t>
+              <a:t>8/8/2024</a:t>
             </a:fld>
             <a:endParaRPr lang="en-US"/>
           </a:p>
@@ -1240,7 +1247,7 @@
           <a:p>
             <a:fld id="{4E25A832-BDE2-4020-AF57-35165F1EE857}" type="datetimeFigureOut">
               <a:rPr lang="en-US" smtClean="0"/>
-              <a:t>7/30/2024</a:t>
+              <a:t>8/8/2024</a:t>
             </a:fld>
             <a:endParaRPr lang="en-US"/>
           </a:p>
@@ -1607,7 +1614,7 @@
           <a:p>
             <a:fld id="{4E25A832-BDE2-4020-AF57-35165F1EE857}" type="datetimeFigureOut">
               <a:rPr lang="en-US" smtClean="0"/>
-              <a:t>7/30/2024</a:t>
+              <a:t>8/8/2024</a:t>
             </a:fld>
             <a:endParaRPr lang="en-US"/>
           </a:p>
@@ -1725,7 +1732,7 @@
           <a:p>
             <a:fld id="{4E25A832-BDE2-4020-AF57-35165F1EE857}" type="datetimeFigureOut">
               <a:rPr lang="en-US" smtClean="0"/>
-              <a:t>7/30/2024</a:t>
+              <a:t>8/8/2024</a:t>
             </a:fld>
             <a:endParaRPr lang="en-US"/>
           </a:p>
@@ -1820,7 +1827,7 @@
           <a:p>
             <a:fld id="{4E25A832-BDE2-4020-AF57-35165F1EE857}" type="datetimeFigureOut">
               <a:rPr lang="en-US" smtClean="0"/>
-              <a:t>7/30/2024</a:t>
+              <a:t>8/8/2024</a:t>
             </a:fld>
             <a:endParaRPr lang="en-US"/>
           </a:p>
@@ -2097,7 +2104,7 @@
           <a:p>
             <a:fld id="{4E25A832-BDE2-4020-AF57-35165F1EE857}" type="datetimeFigureOut">
               <a:rPr lang="en-US" smtClean="0"/>
-              <a:t>7/30/2024</a:t>
+              <a:t>8/8/2024</a:t>
             </a:fld>
             <a:endParaRPr lang="en-US"/>
           </a:p>
@@ -2350,7 +2357,7 @@
           <a:p>
             <a:fld id="{4E25A832-BDE2-4020-AF57-35165F1EE857}" type="datetimeFigureOut">
               <a:rPr lang="en-US" smtClean="0"/>
-              <a:t>7/30/2024</a:t>
+              <a:t>8/8/2024</a:t>
             </a:fld>
             <a:endParaRPr lang="en-US"/>
           </a:p>
@@ -2563,7 +2570,7 @@
           <a:p>
             <a:fld id="{4E25A832-BDE2-4020-AF57-35165F1EE857}" type="datetimeFigureOut">
               <a:rPr lang="en-US" smtClean="0"/>
-              <a:t>7/30/2024</a:t>
+              <a:t>8/8/2024</a:t>
             </a:fld>
             <a:endParaRPr lang="en-US"/>
           </a:p>
@@ -3047,7 +3054,17 @@
             </a:r>
             <a:r>
               <a:rPr lang="en-US" dirty="0" smtClean="0"/>
-              <a:t>ength comps off by a cm (i.e., 25 cm fish became 26 cm)</a:t>
+              <a:t>ength comps off by a cm (i.e., 25 cm fish became 26 cm</a:t>
+            </a:r>
+            <a:r>
+              <a:rPr lang="en-US" dirty="0" smtClean="0"/>
+              <a:t>)</a:t>
+            </a:r>
+          </a:p>
+          <a:p>
+            <a:r>
+              <a:rPr lang="en-US" dirty="0" smtClean="0"/>
+              <a:t>Length-weight relationship continually updated</a:t>
             </a:r>
             <a:endParaRPr lang="en-US" dirty="0"/>
           </a:p>
@@ -3100,7 +3117,7 @@
           <a:p>
             <a:r>
               <a:rPr lang="en-US" dirty="0" smtClean="0"/>
-              <a:t>Base data updates</a:t>
+              <a:t>Base data differences</a:t>
             </a:r>
             <a:endParaRPr lang="en-US" dirty="0"/>
           </a:p>
@@ -3123,13 +3140,7 @@
           <a:p>
             <a:r>
               <a:rPr lang="en-US" dirty="0" smtClean="0"/>
-              <a:t>Length-weight relationship continually updated</a:t>
-            </a:r>
-          </a:p>
-          <a:p>
-            <a:r>
-              <a:rPr lang="en-US" dirty="0" smtClean="0"/>
-              <a:t>Ageing error updated</a:t>
+              <a:t>Plots….</a:t>
             </a:r>
             <a:endParaRPr lang="en-US" dirty="0"/>
           </a:p>
@@ -3138,7 +3149,7 @@
     </p:spTree>
     <p:extLst>
       <p:ext uri="{BB962C8B-B14F-4D97-AF65-F5344CB8AC3E}">
-        <p14:creationId xmlns:p14="http://schemas.microsoft.com/office/powerpoint/2010/main" val="1301354348"/>
+        <p14:creationId xmlns:p14="http://schemas.microsoft.com/office/powerpoint/2010/main" val="3238081657"/>
       </p:ext>
     </p:extLst>
   </p:cSld>
@@ -3182,11 +3193,7 @@
           <a:p>
             <a:r>
               <a:rPr lang="en-US" dirty="0" smtClean="0"/>
-              <a:t>Len comp </a:t>
-            </a:r>
-            <a:r>
-              <a:rPr lang="en-US" dirty="0" err="1" smtClean="0"/>
-              <a:t>inv</a:t>
+              <a:t>Base data updates</a:t>
             </a:r>
             <a:endParaRPr lang="en-US" dirty="0"/>
           </a:p>
@@ -3209,71 +3216,20 @@
           <a:p>
             <a:r>
               <a:rPr lang="en-US" dirty="0" smtClean="0"/>
-              <a:t>Post-91 data filtering: &gt;10 per haul in fed data, &gt;30 per year-trimester-area-gear</a:t>
-            </a:r>
-          </a:p>
-          <a:p>
-            <a:pPr lvl="1"/>
-            <a:r>
-              <a:rPr lang="en-US" dirty="0" smtClean="0"/>
-              <a:t>Test: remove filter and include all data</a:t>
-            </a:r>
-          </a:p>
-          <a:p>
-            <a:r>
-              <a:rPr lang="en-US" dirty="0" smtClean="0"/>
-              <a:t>State data used to ‘fill-in’ missing fed data</a:t>
-            </a:r>
-          </a:p>
-          <a:p>
-            <a:pPr lvl="1"/>
-            <a:r>
-              <a:rPr lang="en-US" dirty="0" smtClean="0"/>
-              <a:t>Test: rather than ‘fill-in’, merge with fed data</a:t>
-            </a:r>
-          </a:p>
-          <a:p>
-            <a:pPr lvl="1"/>
-            <a:r>
-              <a:rPr lang="en-US" dirty="0" smtClean="0"/>
-              <a:t>Requires restructure of how fed </a:t>
-            </a:r>
-            <a:r>
-              <a:rPr lang="en-US" dirty="0" err="1" smtClean="0"/>
-              <a:t>len</a:t>
-            </a:r>
-            <a:r>
-              <a:rPr lang="en-US" dirty="0" smtClean="0"/>
-              <a:t> comp data computed</a:t>
-            </a:r>
-          </a:p>
-          <a:p>
-            <a:pPr lvl="2"/>
-            <a:r>
-              <a:rPr lang="en-US" dirty="0" smtClean="0"/>
-              <a:t>Fed </a:t>
-            </a:r>
-            <a:r>
-              <a:rPr lang="en-US" dirty="0" err="1" smtClean="0"/>
-              <a:t>len</a:t>
-            </a:r>
-            <a:r>
-              <a:rPr lang="en-US" dirty="0" smtClean="0"/>
-              <a:t> comp computed at week-area-gear level, difference would require to aggregate at trimester level</a:t>
-            </a:r>
-          </a:p>
-          <a:p>
-            <a:r>
-              <a:rPr lang="en-US" dirty="0" smtClean="0"/>
-              <a:t>Investigate binning</a:t>
-            </a:r>
+              <a:t>Ageing </a:t>
+            </a:r>
+            <a:r>
+              <a:rPr lang="en-US" dirty="0" smtClean="0"/>
+              <a:t>error updated</a:t>
+            </a:r>
+            <a:endParaRPr lang="en-US" dirty="0"/>
           </a:p>
         </p:txBody>
       </p:sp>
     </p:spTree>
     <p:extLst>
       <p:ext uri="{BB962C8B-B14F-4D97-AF65-F5344CB8AC3E}">
-        <p14:creationId xmlns:p14="http://schemas.microsoft.com/office/powerpoint/2010/main" val="4069604221"/>
+        <p14:creationId xmlns:p14="http://schemas.microsoft.com/office/powerpoint/2010/main" val="1301354348"/>
       </p:ext>
     </p:extLst>
   </p:cSld>
@@ -3316,6 +3272,233 @@
           <a:lstStyle/>
           <a:p>
             <a:r>
+              <a:rPr lang="en-US" dirty="0" smtClean="0"/>
+              <a:t>Base data updates</a:t>
+            </a:r>
+            <a:endParaRPr lang="en-US" dirty="0"/>
+          </a:p>
+        </p:txBody>
+      </p:sp>
+      <p:sp>
+        <p:nvSpPr>
+          <p:cNvPr id="5" name="Content Placeholder 4"/>
+          <p:cNvSpPr>
+            <a:spLocks noGrp="1"/>
+          </p:cNvSpPr>
+          <p:nvPr>
+            <p:ph idx="1"/>
+          </p:nvPr>
+        </p:nvSpPr>
+        <p:spPr/>
+        <p:txBody>
+          <a:bodyPr/>
+          <a:lstStyle/>
+          <a:p>
+            <a:r>
+              <a:rPr lang="en-US" dirty="0" smtClean="0"/>
+              <a:t>Ageing </a:t>
+            </a:r>
+            <a:r>
+              <a:rPr lang="en-US" dirty="0" smtClean="0"/>
+              <a:t>error </a:t>
+            </a:r>
+            <a:r>
+              <a:rPr lang="en-US" dirty="0" smtClean="0"/>
+              <a:t>updated plots</a:t>
+            </a:r>
+            <a:endParaRPr lang="en-US" dirty="0"/>
+          </a:p>
+        </p:txBody>
+      </p:sp>
+    </p:spTree>
+    <p:extLst>
+      <p:ext uri="{BB962C8B-B14F-4D97-AF65-F5344CB8AC3E}">
+        <p14:creationId xmlns:p14="http://schemas.microsoft.com/office/powerpoint/2010/main" val="4188683286"/>
+      </p:ext>
+    </p:extLst>
+  </p:cSld>
+  <p:clrMapOvr>
+    <a:masterClrMapping/>
+  </p:clrMapOvr>
+</p:sld>
+</file>
+
+<file path=ppt/slides/slide5.xml><?xml version="1.0" encoding="utf-8"?>
+<p:sld xmlns:a="http://schemas.openxmlformats.org/drawingml/2006/main" xmlns:r="http://schemas.openxmlformats.org/officeDocument/2006/relationships" xmlns:p="http://schemas.openxmlformats.org/presentationml/2006/main">
+  <p:cSld>
+    <p:spTree>
+      <p:nvGrpSpPr>
+        <p:cNvPr id="1" name=""/>
+        <p:cNvGrpSpPr/>
+        <p:nvPr/>
+      </p:nvGrpSpPr>
+      <p:grpSpPr>
+        <a:xfrm>
+          <a:off x="0" y="0"/>
+          <a:ext cx="0" cy="0"/>
+          <a:chOff x="0" y="0"/>
+          <a:chExt cx="0" cy="0"/>
+        </a:xfrm>
+      </p:grpSpPr>
+      <p:sp>
+        <p:nvSpPr>
+          <p:cNvPr id="4" name="Title 3"/>
+          <p:cNvSpPr>
+            <a:spLocks noGrp="1"/>
+          </p:cNvSpPr>
+          <p:nvPr>
+            <p:ph type="title"/>
+          </p:nvPr>
+        </p:nvSpPr>
+        <p:spPr/>
+        <p:txBody>
+          <a:bodyPr/>
+          <a:lstStyle/>
+          <a:p>
+            <a:r>
+              <a:rPr lang="en-US" dirty="0" smtClean="0"/>
+              <a:t>Len comp </a:t>
+            </a:r>
+            <a:r>
+              <a:rPr lang="en-US" dirty="0" err="1" smtClean="0"/>
+              <a:t>inv</a:t>
+            </a:r>
+            <a:endParaRPr lang="en-US" dirty="0"/>
+          </a:p>
+        </p:txBody>
+      </p:sp>
+      <p:sp>
+        <p:nvSpPr>
+          <p:cNvPr id="5" name="Content Placeholder 4"/>
+          <p:cNvSpPr>
+            <a:spLocks noGrp="1"/>
+          </p:cNvSpPr>
+          <p:nvPr>
+            <p:ph idx="1"/>
+          </p:nvPr>
+        </p:nvSpPr>
+        <p:spPr/>
+        <p:txBody>
+          <a:bodyPr/>
+          <a:lstStyle/>
+          <a:p>
+            <a:r>
+              <a:rPr lang="en-US" dirty="0" smtClean="0"/>
+              <a:t>Post-91 data filtering: &gt;10 per haul in fed data, &gt;30 per year-trimester-area-gear</a:t>
+            </a:r>
+          </a:p>
+          <a:p>
+            <a:pPr lvl="1"/>
+            <a:r>
+              <a:rPr lang="en-US" dirty="0" smtClean="0"/>
+              <a:t>Test: remove filter and include all data</a:t>
+            </a:r>
+          </a:p>
+          <a:p>
+            <a:r>
+              <a:rPr lang="en-US" dirty="0" smtClean="0"/>
+              <a:t>State data used to ‘fill-in’ missing fed data</a:t>
+            </a:r>
+          </a:p>
+          <a:p>
+            <a:pPr lvl="1"/>
+            <a:r>
+              <a:rPr lang="en-US" dirty="0" smtClean="0"/>
+              <a:t>Test: rather than ‘fill-in’, merge with fed data</a:t>
+            </a:r>
+          </a:p>
+          <a:p>
+            <a:pPr lvl="1"/>
+            <a:r>
+              <a:rPr lang="en-US" dirty="0" smtClean="0"/>
+              <a:t>Requires restructure of how fed </a:t>
+            </a:r>
+            <a:r>
+              <a:rPr lang="en-US" dirty="0" err="1" smtClean="0"/>
+              <a:t>len</a:t>
+            </a:r>
+            <a:r>
+              <a:rPr lang="en-US" dirty="0" smtClean="0"/>
+              <a:t> comp data computed</a:t>
+            </a:r>
+          </a:p>
+          <a:p>
+            <a:pPr lvl="2"/>
+            <a:r>
+              <a:rPr lang="en-US" dirty="0" smtClean="0"/>
+              <a:t>Fed </a:t>
+            </a:r>
+            <a:r>
+              <a:rPr lang="en-US" dirty="0" err="1" smtClean="0"/>
+              <a:t>len</a:t>
+            </a:r>
+            <a:r>
+              <a:rPr lang="en-US" dirty="0" smtClean="0"/>
+              <a:t> comp computed at week-area-gear level, difference would require to aggregate at </a:t>
+            </a:r>
+            <a:r>
+              <a:rPr lang="en-US" dirty="0" smtClean="0"/>
+              <a:t>trimester-area-gear </a:t>
+            </a:r>
+            <a:r>
+              <a:rPr lang="en-US" dirty="0" smtClean="0"/>
+              <a:t>level</a:t>
+            </a:r>
+          </a:p>
+          <a:p>
+            <a:r>
+              <a:rPr lang="en-US" dirty="0" smtClean="0"/>
+              <a:t>Investigate binning</a:t>
+            </a:r>
+          </a:p>
+        </p:txBody>
+      </p:sp>
+    </p:spTree>
+    <p:extLst>
+      <p:ext uri="{BB962C8B-B14F-4D97-AF65-F5344CB8AC3E}">
+        <p14:creationId xmlns:p14="http://schemas.microsoft.com/office/powerpoint/2010/main" val="4069604221"/>
+      </p:ext>
+    </p:extLst>
+  </p:cSld>
+  <p:clrMapOvr>
+    <a:masterClrMapping/>
+  </p:clrMapOvr>
+</p:sld>
+</file>
+
+<file path=ppt/slides/slide6.xml><?xml version="1.0" encoding="utf-8"?>
+<p:sld xmlns:a="http://schemas.openxmlformats.org/drawingml/2006/main" xmlns:r="http://schemas.openxmlformats.org/officeDocument/2006/relationships" xmlns:p="http://schemas.openxmlformats.org/presentationml/2006/main">
+  <p:cSld>
+    <p:spTree>
+      <p:nvGrpSpPr>
+        <p:cNvPr id="1" name=""/>
+        <p:cNvGrpSpPr/>
+        <p:nvPr/>
+      </p:nvGrpSpPr>
+      <p:grpSpPr>
+        <a:xfrm>
+          <a:off x="0" y="0"/>
+          <a:ext cx="0" cy="0"/>
+          <a:chOff x="0" y="0"/>
+          <a:chExt cx="0" cy="0"/>
+        </a:xfrm>
+      </p:grpSpPr>
+      <p:sp>
+        <p:nvSpPr>
+          <p:cNvPr id="4" name="Title 3"/>
+          <p:cNvSpPr>
+            <a:spLocks noGrp="1"/>
+          </p:cNvSpPr>
+          <p:nvPr>
+            <p:ph type="title"/>
+          </p:nvPr>
+        </p:nvSpPr>
+        <p:spPr/>
+        <p:txBody>
+          <a:bodyPr/>
+          <a:lstStyle/>
+          <a:p>
+            <a:r>
               <a:rPr lang="en-US" dirty="0"/>
               <a:t>A</a:t>
             </a:r>
@@ -3365,11 +3548,7 @@
             </a:r>
             <a:r>
               <a:rPr lang="en-US" dirty="0" smtClean="0"/>
-              <a:t>urrently computed for males/females, then combined (e</a:t>
-            </a:r>
-            <a:r>
-              <a:rPr lang="en-US" dirty="0" smtClean="0"/>
-              <a:t>xcludes unsexed data)</a:t>
+              <a:t>urrently computed for males/females, then combined (excludes unsexed data)</a:t>
             </a:r>
           </a:p>
           <a:p>
@@ -3421,7 +3600,7 @@
 </p:sld>
 </file>
 
-<file path=ppt/slides/slide5.xml><?xml version="1.0" encoding="utf-8"?>
+<file path=ppt/slides/slide7.xml><?xml version="1.0" encoding="utf-8"?>
 <p:sld xmlns:a="http://schemas.openxmlformats.org/drawingml/2006/main" xmlns:r="http://schemas.openxmlformats.org/officeDocument/2006/relationships" xmlns:p="http://schemas.openxmlformats.org/presentationml/2006/main">
   <p:cSld>
     <p:spTree>

</xml_diff>

<commit_message>
add apport results and disc
</commit_message>
<xml_diff>
--- a/2024/presentation/sept_pt/sept_pt_notes.pptx
+++ b/2024/presentation/sept_pt/sept_pt_notes.pptx
@@ -12,6 +12,19 @@
     <p:sldId id="257" r:id="rId6"/>
     <p:sldId id="259" r:id="rId7"/>
     <p:sldId id="260" r:id="rId8"/>
+    <p:sldId id="263" r:id="rId9"/>
+    <p:sldId id="264" r:id="rId10"/>
+    <p:sldId id="265" r:id="rId11"/>
+    <p:sldId id="266" r:id="rId12"/>
+    <p:sldId id="267" r:id="rId13"/>
+    <p:sldId id="268" r:id="rId14"/>
+    <p:sldId id="269" r:id="rId15"/>
+    <p:sldId id="270" r:id="rId16"/>
+    <p:sldId id="271" r:id="rId17"/>
+    <p:sldId id="272" r:id="rId18"/>
+    <p:sldId id="273" r:id="rId19"/>
+    <p:sldId id="274" r:id="rId20"/>
+    <p:sldId id="275" r:id="rId21"/>
   </p:sldIdLst>
   <p:sldSz cx="12192000" cy="6858000"/>
   <p:notesSz cx="6858000" cy="9144000"/>
@@ -249,7 +262,7 @@
           <a:p>
             <a:fld id="{4E25A832-BDE2-4020-AF57-35165F1EE857}" type="datetimeFigureOut">
               <a:rPr lang="en-US" smtClean="0"/>
-              <a:t>8/8/2024</a:t>
+              <a:t>8/9/2024</a:t>
             </a:fld>
             <a:endParaRPr lang="en-US"/>
           </a:p>
@@ -419,7 +432,7 @@
           <a:p>
             <a:fld id="{4E25A832-BDE2-4020-AF57-35165F1EE857}" type="datetimeFigureOut">
               <a:rPr lang="en-US" smtClean="0"/>
-              <a:t>8/8/2024</a:t>
+              <a:t>8/9/2024</a:t>
             </a:fld>
             <a:endParaRPr lang="en-US"/>
           </a:p>
@@ -599,7 +612,7 @@
           <a:p>
             <a:fld id="{4E25A832-BDE2-4020-AF57-35165F1EE857}" type="datetimeFigureOut">
               <a:rPr lang="en-US" smtClean="0"/>
-              <a:t>8/8/2024</a:t>
+              <a:t>8/9/2024</a:t>
             </a:fld>
             <a:endParaRPr lang="en-US"/>
           </a:p>
@@ -769,7 +782,7 @@
           <a:p>
             <a:fld id="{4E25A832-BDE2-4020-AF57-35165F1EE857}" type="datetimeFigureOut">
               <a:rPr lang="en-US" smtClean="0"/>
-              <a:t>8/8/2024</a:t>
+              <a:t>8/9/2024</a:t>
             </a:fld>
             <a:endParaRPr lang="en-US"/>
           </a:p>
@@ -1015,7 +1028,7 @@
           <a:p>
             <a:fld id="{4E25A832-BDE2-4020-AF57-35165F1EE857}" type="datetimeFigureOut">
               <a:rPr lang="en-US" smtClean="0"/>
-              <a:t>8/8/2024</a:t>
+              <a:t>8/9/2024</a:t>
             </a:fld>
             <a:endParaRPr lang="en-US"/>
           </a:p>
@@ -1247,7 +1260,7 @@
           <a:p>
             <a:fld id="{4E25A832-BDE2-4020-AF57-35165F1EE857}" type="datetimeFigureOut">
               <a:rPr lang="en-US" smtClean="0"/>
-              <a:t>8/8/2024</a:t>
+              <a:t>8/9/2024</a:t>
             </a:fld>
             <a:endParaRPr lang="en-US"/>
           </a:p>
@@ -1614,7 +1627,7 @@
           <a:p>
             <a:fld id="{4E25A832-BDE2-4020-AF57-35165F1EE857}" type="datetimeFigureOut">
               <a:rPr lang="en-US" smtClean="0"/>
-              <a:t>8/8/2024</a:t>
+              <a:t>8/9/2024</a:t>
             </a:fld>
             <a:endParaRPr lang="en-US"/>
           </a:p>
@@ -1732,7 +1745,7 @@
           <a:p>
             <a:fld id="{4E25A832-BDE2-4020-AF57-35165F1EE857}" type="datetimeFigureOut">
               <a:rPr lang="en-US" smtClean="0"/>
-              <a:t>8/8/2024</a:t>
+              <a:t>8/9/2024</a:t>
             </a:fld>
             <a:endParaRPr lang="en-US"/>
           </a:p>
@@ -1827,7 +1840,7 @@
           <a:p>
             <a:fld id="{4E25A832-BDE2-4020-AF57-35165F1EE857}" type="datetimeFigureOut">
               <a:rPr lang="en-US" smtClean="0"/>
-              <a:t>8/8/2024</a:t>
+              <a:t>8/9/2024</a:t>
             </a:fld>
             <a:endParaRPr lang="en-US"/>
           </a:p>
@@ -2104,7 +2117,7 @@
           <a:p>
             <a:fld id="{4E25A832-BDE2-4020-AF57-35165F1EE857}" type="datetimeFigureOut">
               <a:rPr lang="en-US" smtClean="0"/>
-              <a:t>8/8/2024</a:t>
+              <a:t>8/9/2024</a:t>
             </a:fld>
             <a:endParaRPr lang="en-US"/>
           </a:p>
@@ -2357,7 +2370,7 @@
           <a:p>
             <a:fld id="{4E25A832-BDE2-4020-AF57-35165F1EE857}" type="datetimeFigureOut">
               <a:rPr lang="en-US" smtClean="0"/>
-              <a:t>8/8/2024</a:t>
+              <a:t>8/9/2024</a:t>
             </a:fld>
             <a:endParaRPr lang="en-US"/>
           </a:p>
@@ -2570,7 +2583,7 @@
           <a:p>
             <a:fld id="{4E25A832-BDE2-4020-AF57-35165F1EE857}" type="datetimeFigureOut">
               <a:rPr lang="en-US" smtClean="0"/>
-              <a:t>8/8/2024</a:t>
+              <a:t>8/9/2024</a:t>
             </a:fld>
             <a:endParaRPr lang="en-US"/>
           </a:p>
@@ -3054,11 +3067,7 @@
             </a:r>
             <a:r>
               <a:rPr lang="en-US" dirty="0" smtClean="0"/>
-              <a:t>ength comps off by a cm (i.e., 25 cm fish became 26 cm</a:t>
-            </a:r>
-            <a:r>
-              <a:rPr lang="en-US" dirty="0" smtClean="0"/>
-              <a:t>)</a:t>
+              <a:t>ength comps off by a cm (i.e., 25 cm fish became 26 cm)</a:t>
             </a:r>
           </a:p>
           <a:p>
@@ -3074,6 +3083,1578 @@
     <p:extLst>
       <p:ext uri="{BB962C8B-B14F-4D97-AF65-F5344CB8AC3E}">
         <p14:creationId xmlns:p14="http://schemas.microsoft.com/office/powerpoint/2010/main" val="2652085116"/>
+      </p:ext>
+    </p:extLst>
+  </p:cSld>
+  <p:clrMapOvr>
+    <a:masterClrMapping/>
+  </p:clrMapOvr>
+</p:sld>
+</file>
+
+<file path=ppt/slides/slide10.xml><?xml version="1.0" encoding="utf-8"?>
+<p:sld xmlns:a="http://schemas.openxmlformats.org/drawingml/2006/main" xmlns:r="http://schemas.openxmlformats.org/officeDocument/2006/relationships" xmlns:p="http://schemas.openxmlformats.org/presentationml/2006/main">
+  <p:cSld>
+    <p:spTree>
+      <p:nvGrpSpPr>
+        <p:cNvPr id="1" name=""/>
+        <p:cNvGrpSpPr/>
+        <p:nvPr/>
+      </p:nvGrpSpPr>
+      <p:grpSpPr>
+        <a:xfrm>
+          <a:off x="0" y="0"/>
+          <a:ext cx="0" cy="0"/>
+          <a:chOff x="0" y="0"/>
+          <a:chExt cx="0" cy="0"/>
+        </a:xfrm>
+      </p:grpSpPr>
+      <p:sp>
+        <p:nvSpPr>
+          <p:cNvPr id="4" name="Title 3"/>
+          <p:cNvSpPr>
+            <a:spLocks noGrp="1"/>
+          </p:cNvSpPr>
+          <p:nvPr>
+            <p:ph type="title"/>
+          </p:nvPr>
+        </p:nvSpPr>
+        <p:spPr/>
+        <p:txBody>
+          <a:bodyPr/>
+          <a:lstStyle/>
+          <a:p>
+            <a:r>
+              <a:rPr lang="en-US" dirty="0" err="1" smtClean="0"/>
+              <a:t>Apport</a:t>
+            </a:r>
+            <a:r>
+              <a:rPr lang="en-US" dirty="0" smtClean="0"/>
+              <a:t> </a:t>
+            </a:r>
+            <a:r>
+              <a:rPr lang="en-US" dirty="0" err="1" smtClean="0"/>
+              <a:t>inv</a:t>
+            </a:r>
+            <a:r>
+              <a:rPr lang="en-US" dirty="0" smtClean="0"/>
+              <a:t>: Step 1</a:t>
+            </a:r>
+            <a:endParaRPr lang="en-US" dirty="0"/>
+          </a:p>
+        </p:txBody>
+      </p:sp>
+      <p:sp>
+        <p:nvSpPr>
+          <p:cNvPr id="5" name="Content Placeholder 4"/>
+          <p:cNvSpPr>
+            <a:spLocks noGrp="1"/>
+          </p:cNvSpPr>
+          <p:nvPr>
+            <p:ph idx="1"/>
+          </p:nvPr>
+        </p:nvSpPr>
+        <p:spPr/>
+        <p:txBody>
+          <a:bodyPr/>
+          <a:lstStyle/>
+          <a:p>
+            <a:r>
+              <a:rPr lang="en-US" dirty="0" smtClean="0"/>
+              <a:t>4 c</a:t>
+            </a:r>
+            <a:r>
+              <a:rPr lang="en-US" dirty="0" smtClean="0"/>
+              <a:t>ases: factorial design of global (1), or regional (3) PE and q parameters</a:t>
+            </a:r>
+          </a:p>
+          <a:p>
+            <a:pPr lvl="1"/>
+            <a:r>
+              <a:rPr lang="en-US" dirty="0" smtClean="0"/>
+              <a:t>PE = 1, q = 1</a:t>
+            </a:r>
+          </a:p>
+          <a:p>
+            <a:pPr lvl="1"/>
+            <a:r>
+              <a:rPr lang="en-US" dirty="0" smtClean="0"/>
+              <a:t>PE = 3, q = 1</a:t>
+            </a:r>
+          </a:p>
+          <a:p>
+            <a:pPr lvl="1"/>
+            <a:r>
+              <a:rPr lang="en-US" dirty="0" smtClean="0"/>
+              <a:t>PE = 1, q = 3</a:t>
+            </a:r>
+          </a:p>
+          <a:p>
+            <a:pPr lvl="1"/>
+            <a:r>
+              <a:rPr lang="en-US" dirty="0" smtClean="0"/>
+              <a:t>PE = 3, q = 3</a:t>
+            </a:r>
+          </a:p>
+          <a:p>
+            <a:pPr lvl="1"/>
+            <a:endParaRPr lang="en-US" dirty="0" smtClean="0"/>
+          </a:p>
+        </p:txBody>
+      </p:sp>
+    </p:spTree>
+    <p:extLst>
+      <p:ext uri="{BB962C8B-B14F-4D97-AF65-F5344CB8AC3E}">
+        <p14:creationId xmlns:p14="http://schemas.microsoft.com/office/powerpoint/2010/main" val="724838981"/>
+      </p:ext>
+    </p:extLst>
+  </p:cSld>
+  <p:clrMapOvr>
+    <a:masterClrMapping/>
+  </p:clrMapOvr>
+</p:sld>
+</file>
+
+<file path=ppt/slides/slide11.xml><?xml version="1.0" encoding="utf-8"?>
+<p:sld xmlns:a="http://schemas.openxmlformats.org/drawingml/2006/main" xmlns:r="http://schemas.openxmlformats.org/officeDocument/2006/relationships" xmlns:p="http://schemas.openxmlformats.org/presentationml/2006/main">
+  <p:cSld>
+    <p:spTree>
+      <p:nvGrpSpPr>
+        <p:cNvPr id="1" name=""/>
+        <p:cNvGrpSpPr/>
+        <p:nvPr/>
+      </p:nvGrpSpPr>
+      <p:grpSpPr>
+        <a:xfrm>
+          <a:off x="0" y="0"/>
+          <a:ext cx="0" cy="0"/>
+          <a:chOff x="0" y="0"/>
+          <a:chExt cx="0" cy="0"/>
+        </a:xfrm>
+      </p:grpSpPr>
+      <p:sp>
+        <p:nvSpPr>
+          <p:cNvPr id="4" name="Title 3"/>
+          <p:cNvSpPr>
+            <a:spLocks noGrp="1"/>
+          </p:cNvSpPr>
+          <p:nvPr>
+            <p:ph type="title"/>
+          </p:nvPr>
+        </p:nvSpPr>
+        <p:spPr/>
+        <p:txBody>
+          <a:bodyPr/>
+          <a:lstStyle/>
+          <a:p>
+            <a:r>
+              <a:rPr lang="en-US" dirty="0" err="1" smtClean="0"/>
+              <a:t>Apport</a:t>
+            </a:r>
+            <a:r>
+              <a:rPr lang="en-US" dirty="0" smtClean="0"/>
+              <a:t> </a:t>
+            </a:r>
+            <a:r>
+              <a:rPr lang="en-US" dirty="0" err="1" smtClean="0"/>
+              <a:t>inv</a:t>
+            </a:r>
+            <a:r>
+              <a:rPr lang="en-US" dirty="0" smtClean="0"/>
+              <a:t>: Step 1</a:t>
+            </a:r>
+            <a:endParaRPr lang="en-US" dirty="0"/>
+          </a:p>
+        </p:txBody>
+      </p:sp>
+      <p:sp>
+        <p:nvSpPr>
+          <p:cNvPr id="5" name="Content Placeholder 4"/>
+          <p:cNvSpPr>
+            <a:spLocks noGrp="1"/>
+          </p:cNvSpPr>
+          <p:nvPr>
+            <p:ph idx="1"/>
+          </p:nvPr>
+        </p:nvSpPr>
+        <p:spPr/>
+        <p:txBody>
+          <a:bodyPr/>
+          <a:lstStyle/>
+          <a:p>
+            <a:r>
+              <a:rPr lang="en-US" dirty="0" smtClean="0"/>
+              <a:t>AIC suggests that regional scaling parameters q are supported (and most influential)</a:t>
+            </a:r>
+          </a:p>
+          <a:p>
+            <a:r>
+              <a:rPr lang="en-US" dirty="0" smtClean="0"/>
+              <a:t>Whether PE = 1 or 3, no real difference in model</a:t>
+            </a:r>
+          </a:p>
+          <a:p>
+            <a:endParaRPr lang="en-US" dirty="0"/>
+          </a:p>
+          <a:p>
+            <a:endParaRPr lang="en-US" dirty="0" smtClean="0"/>
+          </a:p>
+          <a:p>
+            <a:endParaRPr lang="en-US" dirty="0"/>
+          </a:p>
+          <a:p>
+            <a:r>
+              <a:rPr lang="en-US" dirty="0" smtClean="0"/>
+              <a:t>So, to cover our bases, select PE = 1, q= 3 and PE = 3, q = 3 for additional uncertainty analysis</a:t>
+            </a:r>
+          </a:p>
+          <a:p>
+            <a:pPr lvl="1"/>
+            <a:endParaRPr lang="en-US" dirty="0" smtClean="0"/>
+          </a:p>
+        </p:txBody>
+      </p:sp>
+      <p:pic>
+        <p:nvPicPr>
+          <p:cNvPr id="2" name="Picture 1"/>
+          <p:cNvPicPr>
+            <a:picLocks noChangeAspect="1"/>
+          </p:cNvPicPr>
+          <p:nvPr/>
+        </p:nvPicPr>
+        <p:blipFill>
+          <a:blip r:embed="rId2"/>
+          <a:stretch>
+            <a:fillRect/>
+          </a:stretch>
+        </p:blipFill>
+        <p:spPr>
+          <a:xfrm>
+            <a:off x="1521295" y="3381525"/>
+            <a:ext cx="8567395" cy="1239538"/>
+          </a:xfrm>
+          <a:prstGeom prst="rect">
+            <a:avLst/>
+          </a:prstGeom>
+        </p:spPr>
+      </p:pic>
+    </p:spTree>
+    <p:extLst>
+      <p:ext uri="{BB962C8B-B14F-4D97-AF65-F5344CB8AC3E}">
+        <p14:creationId xmlns:p14="http://schemas.microsoft.com/office/powerpoint/2010/main" val="888815047"/>
+      </p:ext>
+    </p:extLst>
+  </p:cSld>
+  <p:clrMapOvr>
+    <a:masterClrMapping/>
+  </p:clrMapOvr>
+</p:sld>
+</file>
+
+<file path=ppt/slides/slide12.xml><?xml version="1.0" encoding="utf-8"?>
+<p:sld xmlns:a="http://schemas.openxmlformats.org/drawingml/2006/main" xmlns:r="http://schemas.openxmlformats.org/officeDocument/2006/relationships" xmlns:p="http://schemas.openxmlformats.org/presentationml/2006/main">
+  <p:cSld>
+    <p:spTree>
+      <p:nvGrpSpPr>
+        <p:cNvPr id="1" name=""/>
+        <p:cNvGrpSpPr/>
+        <p:nvPr/>
+      </p:nvGrpSpPr>
+      <p:grpSpPr>
+        <a:xfrm>
+          <a:off x="0" y="0"/>
+          <a:ext cx="0" cy="0"/>
+          <a:chOff x="0" y="0"/>
+          <a:chExt cx="0" cy="0"/>
+        </a:xfrm>
+      </p:grpSpPr>
+      <p:sp>
+        <p:nvSpPr>
+          <p:cNvPr id="4" name="Title 3"/>
+          <p:cNvSpPr>
+            <a:spLocks noGrp="1"/>
+          </p:cNvSpPr>
+          <p:nvPr>
+            <p:ph type="title"/>
+          </p:nvPr>
+        </p:nvSpPr>
+        <p:spPr/>
+        <p:txBody>
+          <a:bodyPr/>
+          <a:lstStyle/>
+          <a:p>
+            <a:r>
+              <a:rPr lang="en-US" dirty="0" err="1" smtClean="0"/>
+              <a:t>Apport</a:t>
+            </a:r>
+            <a:r>
+              <a:rPr lang="en-US" dirty="0" smtClean="0"/>
+              <a:t> </a:t>
+            </a:r>
+            <a:r>
+              <a:rPr lang="en-US" dirty="0" err="1" smtClean="0"/>
+              <a:t>inv</a:t>
+            </a:r>
+            <a:r>
+              <a:rPr lang="en-US" dirty="0" smtClean="0"/>
+              <a:t>: Step 2</a:t>
+            </a:r>
+            <a:endParaRPr lang="en-US" dirty="0"/>
+          </a:p>
+        </p:txBody>
+      </p:sp>
+      <p:sp>
+        <p:nvSpPr>
+          <p:cNvPr id="5" name="Content Placeholder 4"/>
+          <p:cNvSpPr>
+            <a:spLocks noGrp="1"/>
+          </p:cNvSpPr>
+          <p:nvPr>
+            <p:ph idx="1"/>
+          </p:nvPr>
+        </p:nvSpPr>
+        <p:spPr/>
+        <p:txBody>
+          <a:bodyPr/>
+          <a:lstStyle/>
+          <a:p>
+            <a:r>
+              <a:rPr lang="en-US" dirty="0"/>
+              <a:t>6</a:t>
+            </a:r>
+            <a:r>
+              <a:rPr lang="en-US" dirty="0" smtClean="0"/>
+              <a:t> c</a:t>
+            </a:r>
+            <a:r>
+              <a:rPr lang="en-US" dirty="0" smtClean="0"/>
+              <a:t>ases: factorial design of 2 PE-q cases from step 1 x 3 uncertainty cases:</a:t>
+            </a:r>
+          </a:p>
+          <a:p>
+            <a:pPr lvl="1"/>
+            <a:r>
+              <a:rPr lang="en-US" dirty="0" smtClean="0"/>
+              <a:t>Additional uncertainty in trawl survey</a:t>
+            </a:r>
+          </a:p>
+          <a:p>
+            <a:pPr lvl="1"/>
+            <a:r>
+              <a:rPr lang="en-US" dirty="0" smtClean="0"/>
+              <a:t>Additional uncertainty in longline survey</a:t>
+            </a:r>
+          </a:p>
+          <a:p>
+            <a:pPr lvl="1"/>
+            <a:r>
+              <a:rPr lang="en-US" dirty="0" smtClean="0"/>
+              <a:t>Additional uncertainty in both</a:t>
+            </a:r>
+            <a:endParaRPr lang="en-US" dirty="0" smtClean="0"/>
+          </a:p>
+          <a:p>
+            <a:pPr lvl="1"/>
+            <a:endParaRPr lang="en-US" dirty="0" smtClean="0"/>
+          </a:p>
+        </p:txBody>
+      </p:sp>
+    </p:spTree>
+    <p:extLst>
+      <p:ext uri="{BB962C8B-B14F-4D97-AF65-F5344CB8AC3E}">
+        <p14:creationId xmlns:p14="http://schemas.microsoft.com/office/powerpoint/2010/main" val="860714988"/>
+      </p:ext>
+    </p:extLst>
+  </p:cSld>
+  <p:clrMapOvr>
+    <a:masterClrMapping/>
+  </p:clrMapOvr>
+</p:sld>
+</file>
+
+<file path=ppt/slides/slide13.xml><?xml version="1.0" encoding="utf-8"?>
+<p:sld xmlns:a="http://schemas.openxmlformats.org/drawingml/2006/main" xmlns:r="http://schemas.openxmlformats.org/officeDocument/2006/relationships" xmlns:p="http://schemas.openxmlformats.org/presentationml/2006/main">
+  <p:cSld>
+    <p:spTree>
+      <p:nvGrpSpPr>
+        <p:cNvPr id="1" name=""/>
+        <p:cNvGrpSpPr/>
+        <p:nvPr/>
+      </p:nvGrpSpPr>
+      <p:grpSpPr>
+        <a:xfrm>
+          <a:off x="0" y="0"/>
+          <a:ext cx="0" cy="0"/>
+          <a:chOff x="0" y="0"/>
+          <a:chExt cx="0" cy="0"/>
+        </a:xfrm>
+      </p:grpSpPr>
+      <p:sp>
+        <p:nvSpPr>
+          <p:cNvPr id="4" name="Title 3"/>
+          <p:cNvSpPr>
+            <a:spLocks noGrp="1"/>
+          </p:cNvSpPr>
+          <p:nvPr>
+            <p:ph type="title"/>
+          </p:nvPr>
+        </p:nvSpPr>
+        <p:spPr/>
+        <p:txBody>
+          <a:bodyPr/>
+          <a:lstStyle/>
+          <a:p>
+            <a:r>
+              <a:rPr lang="en-US" dirty="0" err="1" smtClean="0"/>
+              <a:t>Apport</a:t>
+            </a:r>
+            <a:r>
+              <a:rPr lang="en-US" dirty="0" smtClean="0"/>
+              <a:t> </a:t>
+            </a:r>
+            <a:r>
+              <a:rPr lang="en-US" dirty="0" err="1" smtClean="0"/>
+              <a:t>inv</a:t>
+            </a:r>
+            <a:r>
+              <a:rPr lang="en-US" dirty="0" smtClean="0"/>
+              <a:t>: Step 2</a:t>
+            </a:r>
+            <a:endParaRPr lang="en-US" dirty="0"/>
+          </a:p>
+        </p:txBody>
+      </p:sp>
+      <p:sp>
+        <p:nvSpPr>
+          <p:cNvPr id="5" name="Content Placeholder 4"/>
+          <p:cNvSpPr>
+            <a:spLocks noGrp="1"/>
+          </p:cNvSpPr>
+          <p:nvPr>
+            <p:ph idx="1"/>
+          </p:nvPr>
+        </p:nvSpPr>
+        <p:spPr>
+          <a:xfrm>
+            <a:off x="838200" y="1825625"/>
+            <a:ext cx="10515600" cy="4686386"/>
+          </a:xfrm>
+        </p:spPr>
+        <p:txBody>
+          <a:bodyPr>
+            <a:normAutofit fontScale="92500" lnSpcReduction="10000"/>
+          </a:bodyPr>
+          <a:lstStyle/>
+          <a:p>
+            <a:r>
+              <a:rPr lang="en-US" dirty="0" smtClean="0"/>
+              <a:t>Results in 4 models that are essentially the same, in terms of AIC</a:t>
+            </a:r>
+          </a:p>
+          <a:p>
+            <a:endParaRPr lang="en-US" dirty="0"/>
+          </a:p>
+          <a:p>
+            <a:endParaRPr lang="en-US" dirty="0" smtClean="0"/>
+          </a:p>
+          <a:p>
+            <a:endParaRPr lang="en-US" dirty="0"/>
+          </a:p>
+          <a:p>
+            <a:endParaRPr lang="en-US" dirty="0" smtClean="0"/>
+          </a:p>
+          <a:p>
+            <a:r>
+              <a:rPr lang="en-US" dirty="0" smtClean="0"/>
+              <a:t>Preferred model:</a:t>
+            </a:r>
+          </a:p>
+          <a:p>
+            <a:pPr lvl="1"/>
+            <a:r>
+              <a:rPr lang="en-US" dirty="0" smtClean="0"/>
+              <a:t>For PE-q, argue for parsimony: select PE = 1 and q = 3 case</a:t>
+            </a:r>
+          </a:p>
+          <a:p>
+            <a:pPr lvl="1"/>
+            <a:r>
+              <a:rPr lang="en-US" dirty="0" smtClean="0"/>
+              <a:t>For additional uncertainty, argue:</a:t>
+            </a:r>
+          </a:p>
+          <a:p>
+            <a:pPr lvl="2"/>
+            <a:r>
+              <a:rPr lang="en-US" dirty="0" smtClean="0"/>
+              <a:t>When adding trawl survey uncertainty, largest decline in AIC (and is significant)</a:t>
+            </a:r>
+          </a:p>
+          <a:p>
+            <a:pPr lvl="2"/>
+            <a:r>
+              <a:rPr lang="en-US" dirty="0" smtClean="0"/>
+              <a:t>Acknowledge that these don’t include environmental link for longline survey, so, there’s a sources of uncertainty that we haven’t yet explained in this model</a:t>
+            </a:r>
+          </a:p>
+          <a:p>
+            <a:pPr lvl="2"/>
+            <a:r>
+              <a:rPr lang="en-US" dirty="0" smtClean="0"/>
+              <a:t>So, select additional uncertainty in both</a:t>
+            </a:r>
+          </a:p>
+        </p:txBody>
+      </p:sp>
+      <p:pic>
+        <p:nvPicPr>
+          <p:cNvPr id="2" name="Picture 1"/>
+          <p:cNvPicPr>
+            <a:picLocks noChangeAspect="1"/>
+          </p:cNvPicPr>
+          <p:nvPr/>
+        </p:nvPicPr>
+        <p:blipFill>
+          <a:blip r:embed="rId2"/>
+          <a:stretch>
+            <a:fillRect/>
+          </a:stretch>
+        </p:blipFill>
+        <p:spPr>
+          <a:xfrm>
+            <a:off x="1075552" y="2299387"/>
+            <a:ext cx="9721466" cy="1660954"/>
+          </a:xfrm>
+          <a:prstGeom prst="rect">
+            <a:avLst/>
+          </a:prstGeom>
+        </p:spPr>
+      </p:pic>
+    </p:spTree>
+    <p:extLst>
+      <p:ext uri="{BB962C8B-B14F-4D97-AF65-F5344CB8AC3E}">
+        <p14:creationId xmlns:p14="http://schemas.microsoft.com/office/powerpoint/2010/main" val="3626402399"/>
+      </p:ext>
+    </p:extLst>
+  </p:cSld>
+  <p:clrMapOvr>
+    <a:masterClrMapping/>
+  </p:clrMapOvr>
+</p:sld>
+</file>
+
+<file path=ppt/slides/slide14.xml><?xml version="1.0" encoding="utf-8"?>
+<p:sld xmlns:a="http://schemas.openxmlformats.org/drawingml/2006/main" xmlns:r="http://schemas.openxmlformats.org/officeDocument/2006/relationships" xmlns:p="http://schemas.openxmlformats.org/presentationml/2006/main">
+  <p:cSld>
+    <p:spTree>
+      <p:nvGrpSpPr>
+        <p:cNvPr id="1" name=""/>
+        <p:cNvGrpSpPr/>
+        <p:nvPr/>
+      </p:nvGrpSpPr>
+      <p:grpSpPr>
+        <a:xfrm>
+          <a:off x="0" y="0"/>
+          <a:ext cx="0" cy="0"/>
+          <a:chOff x="0" y="0"/>
+          <a:chExt cx="0" cy="0"/>
+        </a:xfrm>
+      </p:grpSpPr>
+      <p:sp>
+        <p:nvSpPr>
+          <p:cNvPr id="4" name="Title 3"/>
+          <p:cNvSpPr>
+            <a:spLocks noGrp="1"/>
+          </p:cNvSpPr>
+          <p:nvPr>
+            <p:ph type="title"/>
+          </p:nvPr>
+        </p:nvSpPr>
+        <p:spPr/>
+        <p:txBody>
+          <a:bodyPr/>
+          <a:lstStyle/>
+          <a:p>
+            <a:r>
+              <a:rPr lang="en-US" dirty="0" err="1" smtClean="0"/>
+              <a:t>Apport</a:t>
+            </a:r>
+            <a:r>
+              <a:rPr lang="en-US" dirty="0" smtClean="0"/>
+              <a:t> </a:t>
+            </a:r>
+            <a:r>
+              <a:rPr lang="en-US" dirty="0" err="1" smtClean="0"/>
+              <a:t>inv</a:t>
+            </a:r>
+            <a:r>
+              <a:rPr lang="en-US" dirty="0" smtClean="0"/>
+              <a:t>: Comparisons</a:t>
+            </a:r>
+            <a:endParaRPr lang="en-US" dirty="0"/>
+          </a:p>
+        </p:txBody>
+      </p:sp>
+      <p:sp>
+        <p:nvSpPr>
+          <p:cNvPr id="5" name="Content Placeholder 4"/>
+          <p:cNvSpPr>
+            <a:spLocks noGrp="1"/>
+          </p:cNvSpPr>
+          <p:nvPr>
+            <p:ph idx="1"/>
+          </p:nvPr>
+        </p:nvSpPr>
+        <p:spPr>
+          <a:xfrm>
+            <a:off x="838200" y="1825625"/>
+            <a:ext cx="10515600" cy="4686386"/>
+          </a:xfrm>
+        </p:spPr>
+        <p:txBody>
+          <a:bodyPr>
+            <a:normAutofit/>
+          </a:bodyPr>
+          <a:lstStyle/>
+          <a:p>
+            <a:r>
+              <a:rPr lang="en-US" dirty="0" smtClean="0"/>
+              <a:t>Compare between:</a:t>
+            </a:r>
+          </a:p>
+          <a:p>
+            <a:pPr lvl="1"/>
+            <a:r>
+              <a:rPr lang="en-US" dirty="0" smtClean="0"/>
+              <a:t>Base model: trawl survey only (</a:t>
+            </a:r>
+            <a:r>
+              <a:rPr lang="en-US" dirty="0" err="1" smtClean="0"/>
+              <a:t>pcod</a:t>
+            </a:r>
+            <a:r>
+              <a:rPr lang="en-US" dirty="0" smtClean="0"/>
+              <a:t> trawl survey)</a:t>
+            </a:r>
+          </a:p>
+          <a:p>
+            <a:pPr lvl="1"/>
+            <a:endParaRPr lang="en-US" dirty="0"/>
+          </a:p>
+          <a:p>
+            <a:pPr lvl="1"/>
+            <a:endParaRPr lang="en-US" dirty="0" smtClean="0"/>
+          </a:p>
+          <a:p>
+            <a:pPr lvl="1"/>
+            <a:endParaRPr lang="en-US" dirty="0" smtClean="0"/>
+          </a:p>
+          <a:p>
+            <a:pPr lvl="1"/>
+            <a:r>
+              <a:rPr lang="en-US" dirty="0" smtClean="0"/>
+              <a:t>Preferred model: both trawl and longline survey with 1 process error parameter, 3 scalar parameters, and additional uncertainty estimated for both surveys</a:t>
+            </a:r>
+          </a:p>
+        </p:txBody>
+      </p:sp>
+      <p:pic>
+        <p:nvPicPr>
+          <p:cNvPr id="3" name="Picture 2"/>
+          <p:cNvPicPr>
+            <a:picLocks noChangeAspect="1"/>
+          </p:cNvPicPr>
+          <p:nvPr/>
+        </p:nvPicPr>
+        <p:blipFill>
+          <a:blip r:embed="rId2"/>
+          <a:stretch>
+            <a:fillRect/>
+          </a:stretch>
+        </p:blipFill>
+        <p:spPr>
+          <a:xfrm>
+            <a:off x="1498127" y="2804081"/>
+            <a:ext cx="6143625" cy="866775"/>
+          </a:xfrm>
+          <a:prstGeom prst="rect">
+            <a:avLst/>
+          </a:prstGeom>
+        </p:spPr>
+      </p:pic>
+      <p:pic>
+        <p:nvPicPr>
+          <p:cNvPr id="6" name="Picture 5"/>
+          <p:cNvPicPr>
+            <a:picLocks noChangeAspect="1"/>
+          </p:cNvPicPr>
+          <p:nvPr/>
+        </p:nvPicPr>
+        <p:blipFill>
+          <a:blip r:embed="rId3"/>
+          <a:stretch>
+            <a:fillRect/>
+          </a:stretch>
+        </p:blipFill>
+        <p:spPr>
+          <a:xfrm>
+            <a:off x="1498127" y="4967159"/>
+            <a:ext cx="8543925" cy="1266825"/>
+          </a:xfrm>
+          <a:prstGeom prst="rect">
+            <a:avLst/>
+          </a:prstGeom>
+        </p:spPr>
+      </p:pic>
+    </p:spTree>
+    <p:extLst>
+      <p:ext uri="{BB962C8B-B14F-4D97-AF65-F5344CB8AC3E}">
+        <p14:creationId xmlns:p14="http://schemas.microsoft.com/office/powerpoint/2010/main" val="565291867"/>
+      </p:ext>
+    </p:extLst>
+  </p:cSld>
+  <p:clrMapOvr>
+    <a:masterClrMapping/>
+  </p:clrMapOvr>
+</p:sld>
+</file>
+
+<file path=ppt/slides/slide15.xml><?xml version="1.0" encoding="utf-8"?>
+<p:sld xmlns:a="http://schemas.openxmlformats.org/drawingml/2006/main" xmlns:r="http://schemas.openxmlformats.org/officeDocument/2006/relationships" xmlns:p="http://schemas.openxmlformats.org/presentationml/2006/main">
+  <p:cSld>
+    <p:spTree>
+      <p:nvGrpSpPr>
+        <p:cNvPr id="1" name=""/>
+        <p:cNvGrpSpPr/>
+        <p:nvPr/>
+      </p:nvGrpSpPr>
+      <p:grpSpPr>
+        <a:xfrm>
+          <a:off x="0" y="0"/>
+          <a:ext cx="0" cy="0"/>
+          <a:chOff x="0" y="0"/>
+          <a:chExt cx="0" cy="0"/>
+        </a:xfrm>
+      </p:grpSpPr>
+      <p:sp>
+        <p:nvSpPr>
+          <p:cNvPr id="4" name="Title 3"/>
+          <p:cNvSpPr>
+            <a:spLocks noGrp="1"/>
+          </p:cNvSpPr>
+          <p:nvPr>
+            <p:ph type="title"/>
+          </p:nvPr>
+        </p:nvSpPr>
+        <p:spPr/>
+        <p:txBody>
+          <a:bodyPr/>
+          <a:lstStyle/>
+          <a:p>
+            <a:r>
+              <a:rPr lang="en-US" dirty="0" err="1" smtClean="0"/>
+              <a:t>Apport</a:t>
+            </a:r>
+            <a:r>
+              <a:rPr lang="en-US" dirty="0" smtClean="0"/>
+              <a:t> </a:t>
+            </a:r>
+            <a:r>
+              <a:rPr lang="en-US" dirty="0" err="1" smtClean="0"/>
+              <a:t>inv</a:t>
+            </a:r>
+            <a:r>
+              <a:rPr lang="en-US" dirty="0" smtClean="0"/>
+              <a:t>: Comparisons</a:t>
+            </a:r>
+            <a:endParaRPr lang="en-US" dirty="0"/>
+          </a:p>
+        </p:txBody>
+      </p:sp>
+      <p:sp>
+        <p:nvSpPr>
+          <p:cNvPr id="5" name="Content Placeholder 4"/>
+          <p:cNvSpPr>
+            <a:spLocks noGrp="1"/>
+          </p:cNvSpPr>
+          <p:nvPr>
+            <p:ph idx="1"/>
+          </p:nvPr>
+        </p:nvSpPr>
+        <p:spPr>
+          <a:xfrm>
+            <a:off x="838200" y="1825625"/>
+            <a:ext cx="10515600" cy="4686386"/>
+          </a:xfrm>
+        </p:spPr>
+        <p:txBody>
+          <a:bodyPr>
+            <a:normAutofit/>
+          </a:bodyPr>
+          <a:lstStyle/>
+          <a:p>
+            <a:r>
+              <a:rPr lang="en-US" dirty="0" smtClean="0"/>
+              <a:t>Estimated biomass:</a:t>
+            </a:r>
+            <a:endParaRPr lang="en-US" dirty="0" smtClean="0"/>
+          </a:p>
+        </p:txBody>
+      </p:sp>
+      <p:pic>
+        <p:nvPicPr>
+          <p:cNvPr id="2" name="Picture 1"/>
+          <p:cNvPicPr>
+            <a:picLocks noChangeAspect="1"/>
+          </p:cNvPicPr>
+          <p:nvPr/>
+        </p:nvPicPr>
+        <p:blipFill>
+          <a:blip r:embed="rId2" cstate="print">
+            <a:extLst>
+              <a:ext uri="{28A0092B-C50C-407E-A947-70E740481C1C}">
+                <a14:useLocalDpi xmlns:a14="http://schemas.microsoft.com/office/drawing/2010/main" val="0"/>
+              </a:ext>
+            </a:extLst>
+          </a:blip>
+          <a:stretch>
+            <a:fillRect/>
+          </a:stretch>
+        </p:blipFill>
+        <p:spPr>
+          <a:xfrm>
+            <a:off x="2063578" y="2284112"/>
+            <a:ext cx="7152621" cy="4172362"/>
+          </a:xfrm>
+          <a:prstGeom prst="rect">
+            <a:avLst/>
+          </a:prstGeom>
+        </p:spPr>
+      </p:pic>
+    </p:spTree>
+    <p:extLst>
+      <p:ext uri="{BB962C8B-B14F-4D97-AF65-F5344CB8AC3E}">
+        <p14:creationId xmlns:p14="http://schemas.microsoft.com/office/powerpoint/2010/main" val="2991532110"/>
+      </p:ext>
+    </p:extLst>
+  </p:cSld>
+  <p:clrMapOvr>
+    <a:masterClrMapping/>
+  </p:clrMapOvr>
+</p:sld>
+</file>
+
+<file path=ppt/slides/slide16.xml><?xml version="1.0" encoding="utf-8"?>
+<p:sld xmlns:a="http://schemas.openxmlformats.org/drawingml/2006/main" xmlns:r="http://schemas.openxmlformats.org/officeDocument/2006/relationships" xmlns:p="http://schemas.openxmlformats.org/presentationml/2006/main">
+  <p:cSld>
+    <p:spTree>
+      <p:nvGrpSpPr>
+        <p:cNvPr id="1" name=""/>
+        <p:cNvGrpSpPr/>
+        <p:nvPr/>
+      </p:nvGrpSpPr>
+      <p:grpSpPr>
+        <a:xfrm>
+          <a:off x="0" y="0"/>
+          <a:ext cx="0" cy="0"/>
+          <a:chOff x="0" y="0"/>
+          <a:chExt cx="0" cy="0"/>
+        </a:xfrm>
+      </p:grpSpPr>
+      <p:sp>
+        <p:nvSpPr>
+          <p:cNvPr id="4" name="Title 3"/>
+          <p:cNvSpPr>
+            <a:spLocks noGrp="1"/>
+          </p:cNvSpPr>
+          <p:nvPr>
+            <p:ph type="title"/>
+          </p:nvPr>
+        </p:nvSpPr>
+        <p:spPr/>
+        <p:txBody>
+          <a:bodyPr/>
+          <a:lstStyle/>
+          <a:p>
+            <a:r>
+              <a:rPr lang="en-US" dirty="0" err="1" smtClean="0"/>
+              <a:t>Apport</a:t>
+            </a:r>
+            <a:r>
+              <a:rPr lang="en-US" dirty="0" smtClean="0"/>
+              <a:t> </a:t>
+            </a:r>
+            <a:r>
+              <a:rPr lang="en-US" dirty="0" err="1" smtClean="0"/>
+              <a:t>inv</a:t>
+            </a:r>
+            <a:r>
+              <a:rPr lang="en-US" dirty="0" smtClean="0"/>
+              <a:t>: Comparisons</a:t>
+            </a:r>
+            <a:endParaRPr lang="en-US" dirty="0"/>
+          </a:p>
+        </p:txBody>
+      </p:sp>
+      <p:sp>
+        <p:nvSpPr>
+          <p:cNvPr id="5" name="Content Placeholder 4"/>
+          <p:cNvSpPr>
+            <a:spLocks noGrp="1"/>
+          </p:cNvSpPr>
+          <p:nvPr>
+            <p:ph idx="1"/>
+          </p:nvPr>
+        </p:nvSpPr>
+        <p:spPr>
+          <a:xfrm>
+            <a:off x="838200" y="1825625"/>
+            <a:ext cx="10515600" cy="4686386"/>
+          </a:xfrm>
+        </p:spPr>
+        <p:txBody>
+          <a:bodyPr>
+            <a:normAutofit/>
+          </a:bodyPr>
+          <a:lstStyle/>
+          <a:p>
+            <a:r>
+              <a:rPr lang="en-US" dirty="0" smtClean="0"/>
+              <a:t>Data fits:</a:t>
+            </a:r>
+            <a:endParaRPr lang="en-US" dirty="0" smtClean="0"/>
+          </a:p>
+        </p:txBody>
+      </p:sp>
+      <p:pic>
+        <p:nvPicPr>
+          <p:cNvPr id="3" name="Picture 2"/>
+          <p:cNvPicPr>
+            <a:picLocks noChangeAspect="1"/>
+          </p:cNvPicPr>
+          <p:nvPr/>
+        </p:nvPicPr>
+        <p:blipFill>
+          <a:blip r:embed="rId2" cstate="print">
+            <a:extLst>
+              <a:ext uri="{28A0092B-C50C-407E-A947-70E740481C1C}">
+                <a14:useLocalDpi xmlns:a14="http://schemas.microsoft.com/office/drawing/2010/main" val="0"/>
+              </a:ext>
+            </a:extLst>
+          </a:blip>
+          <a:stretch>
+            <a:fillRect/>
+          </a:stretch>
+        </p:blipFill>
+        <p:spPr>
+          <a:xfrm>
+            <a:off x="2547492" y="2273300"/>
+            <a:ext cx="7097015" cy="4139925"/>
+          </a:xfrm>
+          <a:prstGeom prst="rect">
+            <a:avLst/>
+          </a:prstGeom>
+        </p:spPr>
+      </p:pic>
+    </p:spTree>
+    <p:extLst>
+      <p:ext uri="{BB962C8B-B14F-4D97-AF65-F5344CB8AC3E}">
+        <p14:creationId xmlns:p14="http://schemas.microsoft.com/office/powerpoint/2010/main" val="1208479669"/>
+      </p:ext>
+    </p:extLst>
+  </p:cSld>
+  <p:clrMapOvr>
+    <a:masterClrMapping/>
+  </p:clrMapOvr>
+</p:sld>
+</file>
+
+<file path=ppt/slides/slide17.xml><?xml version="1.0" encoding="utf-8"?>
+<p:sld xmlns:a="http://schemas.openxmlformats.org/drawingml/2006/main" xmlns:r="http://schemas.openxmlformats.org/officeDocument/2006/relationships" xmlns:p="http://schemas.openxmlformats.org/presentationml/2006/main">
+  <p:cSld>
+    <p:spTree>
+      <p:nvGrpSpPr>
+        <p:cNvPr id="1" name=""/>
+        <p:cNvGrpSpPr/>
+        <p:nvPr/>
+      </p:nvGrpSpPr>
+      <p:grpSpPr>
+        <a:xfrm>
+          <a:off x="0" y="0"/>
+          <a:ext cx="0" cy="0"/>
+          <a:chOff x="0" y="0"/>
+          <a:chExt cx="0" cy="0"/>
+        </a:xfrm>
+      </p:grpSpPr>
+      <p:sp>
+        <p:nvSpPr>
+          <p:cNvPr id="4" name="Title 3"/>
+          <p:cNvSpPr>
+            <a:spLocks noGrp="1"/>
+          </p:cNvSpPr>
+          <p:nvPr>
+            <p:ph type="title"/>
+          </p:nvPr>
+        </p:nvSpPr>
+        <p:spPr/>
+        <p:txBody>
+          <a:bodyPr/>
+          <a:lstStyle/>
+          <a:p>
+            <a:r>
+              <a:rPr lang="en-US" dirty="0" err="1" smtClean="0"/>
+              <a:t>Apport</a:t>
+            </a:r>
+            <a:r>
+              <a:rPr lang="en-US" dirty="0" smtClean="0"/>
+              <a:t> </a:t>
+            </a:r>
+            <a:r>
+              <a:rPr lang="en-US" dirty="0" err="1" smtClean="0"/>
+              <a:t>inv</a:t>
+            </a:r>
+            <a:r>
+              <a:rPr lang="en-US" dirty="0" smtClean="0"/>
+              <a:t>: Comparisons</a:t>
+            </a:r>
+            <a:endParaRPr lang="en-US" dirty="0"/>
+          </a:p>
+        </p:txBody>
+      </p:sp>
+      <p:sp>
+        <p:nvSpPr>
+          <p:cNvPr id="5" name="Content Placeholder 4"/>
+          <p:cNvSpPr>
+            <a:spLocks noGrp="1"/>
+          </p:cNvSpPr>
+          <p:nvPr>
+            <p:ph idx="1"/>
+          </p:nvPr>
+        </p:nvSpPr>
+        <p:spPr>
+          <a:xfrm>
+            <a:off x="838200" y="1578490"/>
+            <a:ext cx="10515600" cy="4686386"/>
+          </a:xfrm>
+        </p:spPr>
+        <p:txBody>
+          <a:bodyPr>
+            <a:normAutofit/>
+          </a:bodyPr>
+          <a:lstStyle/>
+          <a:p>
+            <a:r>
+              <a:rPr lang="en-US" dirty="0" smtClean="0"/>
+              <a:t>Apportionment:</a:t>
+            </a:r>
+            <a:endParaRPr lang="en-US" dirty="0" smtClean="0"/>
+          </a:p>
+        </p:txBody>
+      </p:sp>
+      <p:pic>
+        <p:nvPicPr>
+          <p:cNvPr id="2" name="Picture 1"/>
+          <p:cNvPicPr>
+            <a:picLocks noChangeAspect="1"/>
+          </p:cNvPicPr>
+          <p:nvPr/>
+        </p:nvPicPr>
+        <p:blipFill>
+          <a:blip r:embed="rId2" cstate="print">
+            <a:extLst>
+              <a:ext uri="{28A0092B-C50C-407E-A947-70E740481C1C}">
+                <a14:useLocalDpi xmlns:a14="http://schemas.microsoft.com/office/drawing/2010/main" val="0"/>
+              </a:ext>
+            </a:extLst>
+          </a:blip>
+          <a:stretch>
+            <a:fillRect/>
+          </a:stretch>
+        </p:blipFill>
+        <p:spPr>
+          <a:xfrm>
+            <a:off x="2742655" y="1965566"/>
+            <a:ext cx="6706688" cy="3912234"/>
+          </a:xfrm>
+          <a:prstGeom prst="rect">
+            <a:avLst/>
+          </a:prstGeom>
+        </p:spPr>
+      </p:pic>
+      <p:pic>
+        <p:nvPicPr>
+          <p:cNvPr id="6" name="Picture 5"/>
+          <p:cNvPicPr>
+            <a:picLocks noChangeAspect="1"/>
+          </p:cNvPicPr>
+          <p:nvPr/>
+        </p:nvPicPr>
+        <p:blipFill>
+          <a:blip r:embed="rId3"/>
+          <a:stretch>
+            <a:fillRect/>
+          </a:stretch>
+        </p:blipFill>
+        <p:spPr>
+          <a:xfrm>
+            <a:off x="3052761" y="6030354"/>
+            <a:ext cx="6086475" cy="666750"/>
+          </a:xfrm>
+          <a:prstGeom prst="rect">
+            <a:avLst/>
+          </a:prstGeom>
+        </p:spPr>
+      </p:pic>
+    </p:spTree>
+    <p:extLst>
+      <p:ext uri="{BB962C8B-B14F-4D97-AF65-F5344CB8AC3E}">
+        <p14:creationId xmlns:p14="http://schemas.microsoft.com/office/powerpoint/2010/main" val="3356352342"/>
+      </p:ext>
+    </p:extLst>
+  </p:cSld>
+  <p:clrMapOvr>
+    <a:masterClrMapping/>
+  </p:clrMapOvr>
+</p:sld>
+</file>
+
+<file path=ppt/slides/slide18.xml><?xml version="1.0" encoding="utf-8"?>
+<p:sld xmlns:a="http://schemas.openxmlformats.org/drawingml/2006/main" xmlns:r="http://schemas.openxmlformats.org/officeDocument/2006/relationships" xmlns:p="http://schemas.openxmlformats.org/presentationml/2006/main">
+  <p:cSld>
+    <p:spTree>
+      <p:nvGrpSpPr>
+        <p:cNvPr id="1" name=""/>
+        <p:cNvGrpSpPr/>
+        <p:nvPr/>
+      </p:nvGrpSpPr>
+      <p:grpSpPr>
+        <a:xfrm>
+          <a:off x="0" y="0"/>
+          <a:ext cx="0" cy="0"/>
+          <a:chOff x="0" y="0"/>
+          <a:chExt cx="0" cy="0"/>
+        </a:xfrm>
+      </p:grpSpPr>
+      <p:sp>
+        <p:nvSpPr>
+          <p:cNvPr id="4" name="Title 3"/>
+          <p:cNvSpPr>
+            <a:spLocks noGrp="1"/>
+          </p:cNvSpPr>
+          <p:nvPr>
+            <p:ph type="title"/>
+          </p:nvPr>
+        </p:nvSpPr>
+        <p:spPr/>
+        <p:txBody>
+          <a:bodyPr/>
+          <a:lstStyle/>
+          <a:p>
+            <a:r>
+              <a:rPr lang="en-US" dirty="0" err="1" smtClean="0"/>
+              <a:t>Apport</a:t>
+            </a:r>
+            <a:r>
+              <a:rPr lang="en-US" dirty="0" smtClean="0"/>
+              <a:t> </a:t>
+            </a:r>
+            <a:r>
+              <a:rPr lang="en-US" dirty="0" err="1" smtClean="0"/>
+              <a:t>inv</a:t>
+            </a:r>
+            <a:r>
+              <a:rPr lang="en-US" dirty="0" smtClean="0"/>
+              <a:t>: Discussion</a:t>
+            </a:r>
+            <a:endParaRPr lang="en-US" dirty="0"/>
+          </a:p>
+        </p:txBody>
+      </p:sp>
+      <p:sp>
+        <p:nvSpPr>
+          <p:cNvPr id="5" name="Content Placeholder 4"/>
+          <p:cNvSpPr>
+            <a:spLocks noGrp="1"/>
+          </p:cNvSpPr>
+          <p:nvPr>
+            <p:ph idx="1"/>
+          </p:nvPr>
+        </p:nvSpPr>
+        <p:spPr>
+          <a:xfrm>
+            <a:off x="838200" y="1578490"/>
+            <a:ext cx="10515600" cy="4686386"/>
+          </a:xfrm>
+        </p:spPr>
+        <p:txBody>
+          <a:bodyPr>
+            <a:normAutofit/>
+          </a:bodyPr>
+          <a:lstStyle/>
+          <a:p>
+            <a:r>
+              <a:rPr lang="en-US" dirty="0" smtClean="0"/>
+              <a:t>Recommendation: use </a:t>
+            </a:r>
+            <a:r>
+              <a:rPr lang="en-US" dirty="0" err="1" smtClean="0"/>
+              <a:t>rema</a:t>
+            </a:r>
+            <a:r>
+              <a:rPr lang="en-US" dirty="0" smtClean="0"/>
+              <a:t> with additional index with preferred parameterization</a:t>
+            </a:r>
+          </a:p>
+          <a:p>
+            <a:pPr lvl="1"/>
+            <a:r>
+              <a:rPr lang="en-US" dirty="0" smtClean="0"/>
+              <a:t>Makes apportionment consistent with data used in assessment</a:t>
+            </a:r>
+          </a:p>
+          <a:p>
+            <a:pPr lvl="1"/>
+            <a:endParaRPr lang="en-US" dirty="0"/>
+          </a:p>
+          <a:p>
+            <a:r>
+              <a:rPr lang="en-US" dirty="0" smtClean="0"/>
+              <a:t>Next steps:</a:t>
+            </a:r>
+          </a:p>
+          <a:p>
+            <a:pPr lvl="1"/>
+            <a:r>
+              <a:rPr lang="en-US" dirty="0" smtClean="0"/>
+              <a:t>Working on environmental index, will be looking towards region indices to potentially be used in apportionment</a:t>
+            </a:r>
+          </a:p>
+          <a:p>
+            <a:pPr lvl="2"/>
+            <a:r>
+              <a:rPr lang="en-US" dirty="0" smtClean="0"/>
+              <a:t>Survey timing is slightly different in each region, whether/if this results in different environmental conditions by region remains to be seen</a:t>
+            </a:r>
+          </a:p>
+          <a:p>
+            <a:pPr lvl="1"/>
+            <a:r>
+              <a:rPr lang="en-US" dirty="0" smtClean="0"/>
+              <a:t>Currently </a:t>
+            </a:r>
+            <a:r>
+              <a:rPr lang="en-US" dirty="0" err="1" smtClean="0"/>
+              <a:t>rema</a:t>
+            </a:r>
+            <a:r>
+              <a:rPr lang="en-US" dirty="0" smtClean="0"/>
+              <a:t> not developed to include environmental index</a:t>
+            </a:r>
+            <a:endParaRPr lang="en-US" dirty="0" smtClean="0"/>
+          </a:p>
+        </p:txBody>
+      </p:sp>
+    </p:spTree>
+    <p:extLst>
+      <p:ext uri="{BB962C8B-B14F-4D97-AF65-F5344CB8AC3E}">
+        <p14:creationId xmlns:p14="http://schemas.microsoft.com/office/powerpoint/2010/main" val="1455566097"/>
+      </p:ext>
+    </p:extLst>
+  </p:cSld>
+  <p:clrMapOvr>
+    <a:masterClrMapping/>
+  </p:clrMapOvr>
+</p:sld>
+</file>
+
+<file path=ppt/slides/slide19.xml><?xml version="1.0" encoding="utf-8"?>
+<p:sld xmlns:a="http://schemas.openxmlformats.org/drawingml/2006/main" xmlns:r="http://schemas.openxmlformats.org/officeDocument/2006/relationships" xmlns:p="http://schemas.openxmlformats.org/presentationml/2006/main">
+  <p:cSld>
+    <p:spTree>
+      <p:nvGrpSpPr>
+        <p:cNvPr id="1" name=""/>
+        <p:cNvGrpSpPr/>
+        <p:nvPr/>
+      </p:nvGrpSpPr>
+      <p:grpSpPr>
+        <a:xfrm>
+          <a:off x="0" y="0"/>
+          <a:ext cx="0" cy="0"/>
+          <a:chOff x="0" y="0"/>
+          <a:chExt cx="0" cy="0"/>
+        </a:xfrm>
+      </p:grpSpPr>
+      <p:sp>
+        <p:nvSpPr>
+          <p:cNvPr id="4" name="Title 3"/>
+          <p:cNvSpPr>
+            <a:spLocks noGrp="1"/>
+          </p:cNvSpPr>
+          <p:nvPr>
+            <p:ph type="title"/>
+          </p:nvPr>
+        </p:nvSpPr>
+        <p:spPr/>
+        <p:txBody>
+          <a:bodyPr/>
+          <a:lstStyle/>
+          <a:p>
+            <a:r>
+              <a:rPr lang="en-US" dirty="0" err="1" smtClean="0"/>
+              <a:t>Apport</a:t>
+            </a:r>
+            <a:r>
+              <a:rPr lang="en-US" dirty="0" smtClean="0"/>
+              <a:t> </a:t>
+            </a:r>
+            <a:r>
+              <a:rPr lang="en-US" dirty="0" err="1" smtClean="0"/>
+              <a:t>inv</a:t>
+            </a:r>
+            <a:r>
+              <a:rPr lang="en-US" dirty="0" smtClean="0"/>
+              <a:t>: Discussion</a:t>
+            </a:r>
+            <a:endParaRPr lang="en-US" dirty="0"/>
+          </a:p>
+        </p:txBody>
+      </p:sp>
+      <p:sp>
+        <p:nvSpPr>
+          <p:cNvPr id="5" name="Content Placeholder 4"/>
+          <p:cNvSpPr>
+            <a:spLocks noGrp="1"/>
+          </p:cNvSpPr>
+          <p:nvPr>
+            <p:ph idx="1"/>
+          </p:nvPr>
+        </p:nvSpPr>
+        <p:spPr>
+          <a:xfrm>
+            <a:off x="838200" y="1578490"/>
+            <a:ext cx="10515600" cy="4686386"/>
+          </a:xfrm>
+        </p:spPr>
+        <p:txBody>
+          <a:bodyPr>
+            <a:normAutofit lnSpcReduction="10000"/>
+          </a:bodyPr>
+          <a:lstStyle/>
+          <a:p>
+            <a:r>
+              <a:rPr lang="en-US" dirty="0" smtClean="0"/>
+              <a:t>Other indices: IPHC FISS</a:t>
+            </a:r>
+          </a:p>
+          <a:p>
+            <a:pPr lvl="1"/>
+            <a:r>
+              <a:rPr lang="en-US" dirty="0" smtClean="0"/>
+              <a:t>Has always been a promising additional index for apportionment</a:t>
+            </a:r>
+            <a:r>
+              <a:rPr lang="en-US" dirty="0" smtClean="0"/>
+              <a:t>, but, recent developments have made implementation questionable for Pacific cod</a:t>
+            </a:r>
+          </a:p>
+          <a:p>
+            <a:pPr lvl="1"/>
+            <a:endParaRPr lang="en-US" dirty="0"/>
+          </a:p>
+          <a:p>
+            <a:pPr lvl="1"/>
+            <a:endParaRPr lang="en-US" dirty="0" smtClean="0"/>
+          </a:p>
+          <a:p>
+            <a:pPr lvl="1"/>
+            <a:endParaRPr lang="en-US" dirty="0"/>
+          </a:p>
+          <a:p>
+            <a:pPr lvl="1"/>
+            <a:endParaRPr lang="en-US" dirty="0" smtClean="0"/>
+          </a:p>
+          <a:p>
+            <a:pPr lvl="1"/>
+            <a:endParaRPr lang="en-US" dirty="0"/>
+          </a:p>
+          <a:p>
+            <a:pPr lvl="1"/>
+            <a:endParaRPr lang="en-US" dirty="0" smtClean="0"/>
+          </a:p>
+          <a:p>
+            <a:pPr lvl="1"/>
+            <a:endParaRPr lang="en-US" dirty="0"/>
+          </a:p>
+          <a:p>
+            <a:pPr lvl="1"/>
+            <a:endParaRPr lang="en-US" dirty="0" smtClean="0"/>
+          </a:p>
+          <a:p>
+            <a:pPr lvl="1"/>
+            <a:r>
+              <a:rPr lang="en-US" dirty="0" smtClean="0"/>
+              <a:t>Recommend: not consider FISS as viable alternative index for Pacific cod until stations randomly subsampled or full FISS design is implemented</a:t>
+            </a:r>
+            <a:endParaRPr lang="en-US" dirty="0" smtClean="0"/>
+          </a:p>
+        </p:txBody>
+      </p:sp>
+      <p:pic>
+        <p:nvPicPr>
+          <p:cNvPr id="2" name="Picture 1"/>
+          <p:cNvPicPr>
+            <a:picLocks noChangeAspect="1"/>
+          </p:cNvPicPr>
+          <p:nvPr/>
+        </p:nvPicPr>
+        <p:blipFill>
+          <a:blip r:embed="rId2"/>
+          <a:stretch>
+            <a:fillRect/>
+          </a:stretch>
+        </p:blipFill>
+        <p:spPr>
+          <a:xfrm>
+            <a:off x="350626" y="2688758"/>
+            <a:ext cx="3769182" cy="2662883"/>
+          </a:xfrm>
+          <a:prstGeom prst="rect">
+            <a:avLst/>
+          </a:prstGeom>
+        </p:spPr>
+      </p:pic>
+      <p:pic>
+        <p:nvPicPr>
+          <p:cNvPr id="3" name="Picture 2"/>
+          <p:cNvPicPr>
+            <a:picLocks noChangeAspect="1"/>
+          </p:cNvPicPr>
+          <p:nvPr/>
+        </p:nvPicPr>
+        <p:blipFill>
+          <a:blip r:embed="rId3"/>
+          <a:stretch>
+            <a:fillRect/>
+          </a:stretch>
+        </p:blipFill>
+        <p:spPr>
+          <a:xfrm>
+            <a:off x="4220839" y="2688758"/>
+            <a:ext cx="3713250" cy="2680479"/>
+          </a:xfrm>
+          <a:prstGeom prst="rect">
+            <a:avLst/>
+          </a:prstGeom>
+        </p:spPr>
+      </p:pic>
+      <p:pic>
+        <p:nvPicPr>
+          <p:cNvPr id="6" name="Picture 5"/>
+          <p:cNvPicPr>
+            <a:picLocks noChangeAspect="1"/>
+          </p:cNvPicPr>
+          <p:nvPr/>
+        </p:nvPicPr>
+        <p:blipFill>
+          <a:blip r:embed="rId4"/>
+          <a:stretch>
+            <a:fillRect/>
+          </a:stretch>
+        </p:blipFill>
+        <p:spPr>
+          <a:xfrm>
+            <a:off x="8163332" y="2688758"/>
+            <a:ext cx="3849292" cy="2680479"/>
+          </a:xfrm>
+          <a:prstGeom prst="rect">
+            <a:avLst/>
+          </a:prstGeom>
+        </p:spPr>
+      </p:pic>
+      <p:sp>
+        <p:nvSpPr>
+          <p:cNvPr id="7" name="Right Arrow 6"/>
+          <p:cNvSpPr/>
+          <p:nvPr/>
+        </p:nvSpPr>
+        <p:spPr>
+          <a:xfrm>
+            <a:off x="3885672" y="3854255"/>
+            <a:ext cx="630195" cy="442400"/>
+          </a:xfrm>
+          <a:prstGeom prst="rightArrow">
+            <a:avLst/>
+          </a:prstGeom>
+        </p:spPr>
+        <p:style>
+          <a:lnRef idx="2">
+            <a:schemeClr val="accent1">
+              <a:shade val="50000"/>
+            </a:schemeClr>
+          </a:lnRef>
+          <a:fillRef idx="1">
+            <a:schemeClr val="accent1"/>
+          </a:fillRef>
+          <a:effectRef idx="0">
+            <a:schemeClr val="accent1"/>
+          </a:effectRef>
+          <a:fontRef idx="minor">
+            <a:schemeClr val="lt1"/>
+          </a:fontRef>
+        </p:style>
+        <p:txBody>
+          <a:bodyPr rtlCol="0" anchor="ctr"/>
+          <a:lstStyle/>
+          <a:p>
+            <a:pPr algn="ctr"/>
+            <a:endParaRPr lang="en-US"/>
+          </a:p>
+        </p:txBody>
+      </p:sp>
+      <p:sp>
+        <p:nvSpPr>
+          <p:cNvPr id="8" name="Right Arrow 7"/>
+          <p:cNvSpPr/>
+          <p:nvPr/>
+        </p:nvSpPr>
+        <p:spPr>
+          <a:xfrm>
+            <a:off x="7733613" y="3854255"/>
+            <a:ext cx="630195" cy="442400"/>
+          </a:xfrm>
+          <a:prstGeom prst="rightArrow">
+            <a:avLst/>
+          </a:prstGeom>
+        </p:spPr>
+        <p:style>
+          <a:lnRef idx="2">
+            <a:schemeClr val="accent1">
+              <a:shade val="50000"/>
+            </a:schemeClr>
+          </a:lnRef>
+          <a:fillRef idx="1">
+            <a:schemeClr val="accent1"/>
+          </a:fillRef>
+          <a:effectRef idx="0">
+            <a:schemeClr val="accent1"/>
+          </a:effectRef>
+          <a:fontRef idx="minor">
+            <a:schemeClr val="lt1"/>
+          </a:fontRef>
+        </p:style>
+        <p:txBody>
+          <a:bodyPr rtlCol="0" anchor="ctr"/>
+          <a:lstStyle/>
+          <a:p>
+            <a:pPr algn="ctr"/>
+            <a:endParaRPr lang="en-US"/>
+          </a:p>
+        </p:txBody>
+      </p:sp>
+    </p:spTree>
+    <p:extLst>
+      <p:ext uri="{BB962C8B-B14F-4D97-AF65-F5344CB8AC3E}">
+        <p14:creationId xmlns:p14="http://schemas.microsoft.com/office/powerpoint/2010/main" val="2917584940"/>
       </p:ext>
     </p:extLst>
   </p:cSld>
@@ -3159,6 +4740,204 @@
 </p:sld>
 </file>
 
+<file path=ppt/slides/slide20.xml><?xml version="1.0" encoding="utf-8"?>
+<p:sld xmlns:a="http://schemas.openxmlformats.org/drawingml/2006/main" xmlns:r="http://schemas.openxmlformats.org/officeDocument/2006/relationships" xmlns:p="http://schemas.openxmlformats.org/presentationml/2006/main">
+  <p:cSld>
+    <p:spTree>
+      <p:nvGrpSpPr>
+        <p:cNvPr id="1" name=""/>
+        <p:cNvGrpSpPr/>
+        <p:nvPr/>
+      </p:nvGrpSpPr>
+      <p:grpSpPr>
+        <a:xfrm>
+          <a:off x="0" y="0"/>
+          <a:ext cx="0" cy="0"/>
+          <a:chOff x="0" y="0"/>
+          <a:chExt cx="0" cy="0"/>
+        </a:xfrm>
+      </p:grpSpPr>
+      <p:sp>
+        <p:nvSpPr>
+          <p:cNvPr id="4" name="Title 3"/>
+          <p:cNvSpPr>
+            <a:spLocks noGrp="1"/>
+          </p:cNvSpPr>
+          <p:nvPr>
+            <p:ph type="title"/>
+          </p:nvPr>
+        </p:nvSpPr>
+        <p:spPr/>
+        <p:txBody>
+          <a:bodyPr/>
+          <a:lstStyle/>
+          <a:p>
+            <a:r>
+              <a:rPr lang="en-US" dirty="0" err="1" smtClean="0"/>
+              <a:t>Apport</a:t>
+            </a:r>
+            <a:r>
+              <a:rPr lang="en-US" dirty="0" smtClean="0"/>
+              <a:t> </a:t>
+            </a:r>
+            <a:r>
+              <a:rPr lang="en-US" dirty="0" err="1" smtClean="0"/>
+              <a:t>inv</a:t>
+            </a:r>
+            <a:r>
+              <a:rPr lang="en-US" dirty="0" smtClean="0"/>
+              <a:t>: Discussion</a:t>
+            </a:r>
+            <a:endParaRPr lang="en-US" dirty="0"/>
+          </a:p>
+        </p:txBody>
+      </p:sp>
+      <p:sp>
+        <p:nvSpPr>
+          <p:cNvPr id="5" name="Content Placeholder 4"/>
+          <p:cNvSpPr>
+            <a:spLocks noGrp="1"/>
+          </p:cNvSpPr>
+          <p:nvPr>
+            <p:ph idx="1"/>
+          </p:nvPr>
+        </p:nvSpPr>
+        <p:spPr>
+          <a:xfrm>
+            <a:off x="838200" y="1578490"/>
+            <a:ext cx="10515600" cy="4686386"/>
+          </a:xfrm>
+        </p:spPr>
+        <p:txBody>
+          <a:bodyPr>
+            <a:normAutofit/>
+          </a:bodyPr>
+          <a:lstStyle/>
+          <a:p>
+            <a:r>
+              <a:rPr lang="en-US" dirty="0" smtClean="0"/>
+              <a:t>Other indices: ADF&amp;G large mesh survey</a:t>
+            </a:r>
+          </a:p>
+          <a:p>
+            <a:pPr lvl="1"/>
+            <a:r>
+              <a:rPr lang="en-US" dirty="0" smtClean="0"/>
+              <a:t>Rub here: only samples western and central gulf</a:t>
+            </a:r>
+          </a:p>
+          <a:p>
+            <a:pPr lvl="1"/>
+            <a:r>
+              <a:rPr lang="en-US" dirty="0" smtClean="0"/>
+              <a:t>But, if there is additional information about trend in these two </a:t>
+            </a:r>
+            <a:r>
+              <a:rPr lang="en-US" dirty="0" err="1" smtClean="0"/>
+              <a:t>subregions</a:t>
+            </a:r>
+            <a:r>
+              <a:rPr lang="en-US" dirty="0" smtClean="0"/>
+              <a:t>, could possibly use it in </a:t>
+            </a:r>
+            <a:r>
+              <a:rPr lang="en-US" dirty="0" err="1" smtClean="0"/>
+              <a:t>rema</a:t>
+            </a:r>
+            <a:endParaRPr lang="en-US" dirty="0" smtClean="0"/>
+          </a:p>
+          <a:p>
+            <a:pPr lvl="1"/>
+            <a:r>
+              <a:rPr lang="en-US" dirty="0" smtClean="0"/>
+              <a:t>However, </a:t>
+            </a:r>
+            <a:r>
+              <a:rPr lang="en-US" dirty="0" err="1" smtClean="0"/>
+              <a:t>rema</a:t>
+            </a:r>
+            <a:r>
+              <a:rPr lang="en-US" dirty="0" smtClean="0"/>
+              <a:t> currently not capable of including third index</a:t>
+            </a:r>
+          </a:p>
+          <a:p>
+            <a:pPr lvl="1"/>
+            <a:r>
+              <a:rPr lang="en-US" dirty="0" smtClean="0"/>
+              <a:t>Recommend: for now continue to track ADF&amp;G survey in assessment, but since we have 2 indices in </a:t>
+            </a:r>
+            <a:r>
+              <a:rPr lang="en-US" dirty="0" err="1" smtClean="0"/>
+              <a:t>rema</a:t>
+            </a:r>
+            <a:r>
+              <a:rPr lang="en-US" dirty="0" smtClean="0"/>
+              <a:t> that have good spatial coverage, not spend time yet developing this as an additional index</a:t>
+            </a:r>
+            <a:endParaRPr lang="en-US" dirty="0" smtClean="0"/>
+          </a:p>
+        </p:txBody>
+      </p:sp>
+      <p:pic>
+        <p:nvPicPr>
+          <p:cNvPr id="10" name="Picture 9">
+            <a:extLst>
+              <a:ext uri="{FF2B5EF4-FFF2-40B4-BE49-F238E27FC236}">
+                <a16:creationId xmlns:a16="http://schemas.microsoft.com/office/drawing/2014/main" id="{ED083C68-C3B3-44F7-A518-D7A1025AD26C}"/>
+              </a:ext>
+            </a:extLst>
+          </p:cNvPr>
+          <p:cNvPicPr>
+            <a:picLocks noChangeAspect="1"/>
+          </p:cNvPicPr>
+          <p:nvPr/>
+        </p:nvPicPr>
+        <p:blipFill>
+          <a:blip r:embed="rId2" cstate="print">
+            <a:extLst>
+              <a:ext uri="{28A0092B-C50C-407E-A947-70E740481C1C}">
+                <a14:useLocalDpi xmlns:a14="http://schemas.microsoft.com/office/drawing/2010/main" val="0"/>
+              </a:ext>
+            </a:extLst>
+          </a:blip>
+          <a:srcRect/>
+          <a:stretch/>
+        </p:blipFill>
+        <p:spPr>
+          <a:xfrm>
+            <a:off x="8019534" y="365125"/>
+            <a:ext cx="2929693" cy="1953129"/>
+          </a:xfrm>
+          <a:prstGeom prst="rect">
+            <a:avLst/>
+          </a:prstGeom>
+          <a:noFill/>
+          <a:ln>
+            <a:noFill/>
+          </a:ln>
+          <a:effectLst>
+            <a:outerShdw blurRad="63500" sx="102000" sy="102000" algn="ctr" rotWithShape="0">
+              <a:prstClr val="black">
+                <a:alpha val="40000"/>
+              </a:prstClr>
+            </a:outerShdw>
+          </a:effectLst>
+        </p:spPr>
+      </p:pic>
+    </p:spTree>
+    <p:extLst>
+      <p:ext uri="{BB962C8B-B14F-4D97-AF65-F5344CB8AC3E}">
+        <p14:creationId xmlns:p14="http://schemas.microsoft.com/office/powerpoint/2010/main" val="4115332601"/>
+      </p:ext>
+    </p:extLst>
+  </p:cSld>
+  <p:clrMapOvr>
+    <a:masterClrMapping/>
+  </p:clrMapOvr>
+</p:sld>
+</file>
+
 <file path=ppt/slides/slide3.xml><?xml version="1.0" encoding="utf-8"?>
 <p:sld xmlns:a="http://schemas.openxmlformats.org/drawingml/2006/main" xmlns:r="http://schemas.openxmlformats.org/officeDocument/2006/relationships" xmlns:p="http://schemas.openxmlformats.org/presentationml/2006/main">
   <p:cSld>
@@ -3216,11 +4995,7 @@
           <a:p>
             <a:r>
               <a:rPr lang="en-US" dirty="0" smtClean="0"/>
-              <a:t>Ageing </a:t>
-            </a:r>
-            <a:r>
-              <a:rPr lang="en-US" dirty="0" smtClean="0"/>
-              <a:t>error updated</a:t>
+              <a:t>Ageing error updated</a:t>
             </a:r>
             <a:endParaRPr lang="en-US" dirty="0"/>
           </a:p>
@@ -3296,15 +5071,7 @@
           <a:p>
             <a:r>
               <a:rPr lang="en-US" dirty="0" smtClean="0"/>
-              <a:t>Ageing </a:t>
-            </a:r>
-            <a:r>
-              <a:rPr lang="en-US" dirty="0" smtClean="0"/>
-              <a:t>error </a:t>
-            </a:r>
-            <a:r>
-              <a:rPr lang="en-US" dirty="0" smtClean="0"/>
-              <a:t>updated plots</a:t>
+              <a:t>Ageing error updated plots</a:t>
             </a:r>
             <a:endParaRPr lang="en-US" dirty="0"/>
           </a:p>
@@ -3434,15 +5201,7 @@
             </a:r>
             <a:r>
               <a:rPr lang="en-US" dirty="0" smtClean="0"/>
-              <a:t> comp computed at week-area-gear level, difference would require to aggregate at </a:t>
-            </a:r>
-            <a:r>
-              <a:rPr lang="en-US" dirty="0" smtClean="0"/>
-              <a:t>trimester-area-gear </a:t>
-            </a:r>
-            <a:r>
-              <a:rPr lang="en-US" dirty="0" smtClean="0"/>
-              <a:t>level</a:t>
+              <a:t> comp computed at week-area-gear level, difference would require to aggregate at trimester-area-gear level</a:t>
             </a:r>
           </a:p>
           <a:p>
@@ -3745,6 +5504,237 @@
     <p:extLst>
       <p:ext uri="{BB962C8B-B14F-4D97-AF65-F5344CB8AC3E}">
         <p14:creationId xmlns:p14="http://schemas.microsoft.com/office/powerpoint/2010/main" val="2671101252"/>
+      </p:ext>
+    </p:extLst>
+  </p:cSld>
+  <p:clrMapOvr>
+    <a:masterClrMapping/>
+  </p:clrMapOvr>
+</p:sld>
+</file>
+
+<file path=ppt/slides/slide8.xml><?xml version="1.0" encoding="utf-8"?>
+<p:sld xmlns:a="http://schemas.openxmlformats.org/drawingml/2006/main" xmlns:r="http://schemas.openxmlformats.org/officeDocument/2006/relationships" xmlns:p="http://schemas.openxmlformats.org/presentationml/2006/main">
+  <p:cSld>
+    <p:spTree>
+      <p:nvGrpSpPr>
+        <p:cNvPr id="1" name=""/>
+        <p:cNvGrpSpPr/>
+        <p:nvPr/>
+      </p:nvGrpSpPr>
+      <p:grpSpPr>
+        <a:xfrm>
+          <a:off x="0" y="0"/>
+          <a:ext cx="0" cy="0"/>
+          <a:chOff x="0" y="0"/>
+          <a:chExt cx="0" cy="0"/>
+        </a:xfrm>
+      </p:grpSpPr>
+      <p:sp>
+        <p:nvSpPr>
+          <p:cNvPr id="4" name="Title 3"/>
+          <p:cNvSpPr>
+            <a:spLocks noGrp="1"/>
+          </p:cNvSpPr>
+          <p:nvPr>
+            <p:ph type="title"/>
+          </p:nvPr>
+        </p:nvSpPr>
+        <p:spPr/>
+        <p:txBody>
+          <a:bodyPr/>
+          <a:lstStyle/>
+          <a:p>
+            <a:r>
+              <a:rPr lang="en-US" dirty="0" err="1" smtClean="0"/>
+              <a:t>Apport</a:t>
+            </a:r>
+            <a:r>
+              <a:rPr lang="en-US" dirty="0" smtClean="0"/>
+              <a:t> </a:t>
+            </a:r>
+            <a:r>
+              <a:rPr lang="en-US" dirty="0" err="1" smtClean="0"/>
+              <a:t>inv</a:t>
+            </a:r>
+            <a:endParaRPr lang="en-US" dirty="0"/>
+          </a:p>
+        </p:txBody>
+      </p:sp>
+      <p:sp>
+        <p:nvSpPr>
+          <p:cNvPr id="5" name="Content Placeholder 4"/>
+          <p:cNvSpPr>
+            <a:spLocks noGrp="1"/>
+          </p:cNvSpPr>
+          <p:nvPr>
+            <p:ph idx="1"/>
+          </p:nvPr>
+        </p:nvSpPr>
+        <p:spPr/>
+        <p:txBody>
+          <a:bodyPr/>
+          <a:lstStyle/>
+          <a:p>
+            <a:r>
+              <a:rPr lang="en-US" dirty="0" smtClean="0"/>
+              <a:t>Reminder: LLS used in assessment as additional </a:t>
+            </a:r>
+            <a:r>
+              <a:rPr lang="en-US" dirty="0" err="1" smtClean="0"/>
+              <a:t>pop’n</a:t>
+            </a:r>
+            <a:r>
+              <a:rPr lang="en-US" dirty="0" smtClean="0"/>
+              <a:t> index, but not used in apportionment</a:t>
+            </a:r>
+          </a:p>
+          <a:p>
+            <a:pPr lvl="1"/>
+            <a:r>
+              <a:rPr lang="en-US" dirty="0" smtClean="0"/>
+              <a:t>And, includes an environmental link, where in warmer temps at depth cod move deeper and are more available to the LLS than in colder years</a:t>
+            </a:r>
+            <a:endParaRPr lang="en-US" dirty="0" smtClean="0"/>
+          </a:p>
+          <a:p>
+            <a:r>
+              <a:rPr lang="en-US" dirty="0" smtClean="0"/>
+              <a:t>Including it in apportionment has been talked about for some time </a:t>
+            </a:r>
+          </a:p>
+          <a:p>
+            <a:r>
+              <a:rPr lang="en-US" dirty="0" smtClean="0"/>
+              <a:t>Other, ‘tracked’, </a:t>
+            </a:r>
+            <a:r>
+              <a:rPr lang="en-US" dirty="0" err="1" smtClean="0"/>
+              <a:t>pop’n</a:t>
+            </a:r>
+            <a:r>
+              <a:rPr lang="en-US" dirty="0" smtClean="0"/>
+              <a:t> indices include IPHC FISS and ADF&amp;G large mesh trawl survey</a:t>
+            </a:r>
+          </a:p>
+        </p:txBody>
+      </p:sp>
+    </p:spTree>
+    <p:extLst>
+      <p:ext uri="{BB962C8B-B14F-4D97-AF65-F5344CB8AC3E}">
+        <p14:creationId xmlns:p14="http://schemas.microsoft.com/office/powerpoint/2010/main" val="1209424533"/>
+      </p:ext>
+    </p:extLst>
+  </p:cSld>
+  <p:clrMapOvr>
+    <a:masterClrMapping/>
+  </p:clrMapOvr>
+</p:sld>
+</file>
+
+<file path=ppt/slides/slide9.xml><?xml version="1.0" encoding="utf-8"?>
+<p:sld xmlns:a="http://schemas.openxmlformats.org/drawingml/2006/main" xmlns:r="http://schemas.openxmlformats.org/officeDocument/2006/relationships" xmlns:p="http://schemas.openxmlformats.org/presentationml/2006/main">
+  <p:cSld>
+    <p:spTree>
+      <p:nvGrpSpPr>
+        <p:cNvPr id="1" name=""/>
+        <p:cNvGrpSpPr/>
+        <p:nvPr/>
+      </p:nvGrpSpPr>
+      <p:grpSpPr>
+        <a:xfrm>
+          <a:off x="0" y="0"/>
+          <a:ext cx="0" cy="0"/>
+          <a:chOff x="0" y="0"/>
+          <a:chExt cx="0" cy="0"/>
+        </a:xfrm>
+      </p:grpSpPr>
+      <p:sp>
+        <p:nvSpPr>
+          <p:cNvPr id="4" name="Title 3"/>
+          <p:cNvSpPr>
+            <a:spLocks noGrp="1"/>
+          </p:cNvSpPr>
+          <p:nvPr>
+            <p:ph type="title"/>
+          </p:nvPr>
+        </p:nvSpPr>
+        <p:spPr/>
+        <p:txBody>
+          <a:bodyPr/>
+          <a:lstStyle/>
+          <a:p>
+            <a:r>
+              <a:rPr lang="en-US" dirty="0" err="1" smtClean="0"/>
+              <a:t>Apport</a:t>
+            </a:r>
+            <a:r>
+              <a:rPr lang="en-US" dirty="0" smtClean="0"/>
+              <a:t> </a:t>
+            </a:r>
+            <a:r>
+              <a:rPr lang="en-US" dirty="0" err="1" smtClean="0"/>
+              <a:t>inv</a:t>
+            </a:r>
+            <a:endParaRPr lang="en-US" dirty="0"/>
+          </a:p>
+        </p:txBody>
+      </p:sp>
+      <p:sp>
+        <p:nvSpPr>
+          <p:cNvPr id="5" name="Content Placeholder 4"/>
+          <p:cNvSpPr>
+            <a:spLocks noGrp="1"/>
+          </p:cNvSpPr>
+          <p:nvPr>
+            <p:ph idx="1"/>
+          </p:nvPr>
+        </p:nvSpPr>
+        <p:spPr/>
+        <p:txBody>
+          <a:bodyPr/>
+          <a:lstStyle/>
+          <a:p>
+            <a:r>
+              <a:rPr lang="en-US" dirty="0" smtClean="0"/>
+              <a:t>Here, look at including LLS into </a:t>
+            </a:r>
+            <a:r>
+              <a:rPr lang="en-US" dirty="0" err="1" smtClean="0"/>
+              <a:t>rema</a:t>
+            </a:r>
+            <a:r>
+              <a:rPr lang="en-US" dirty="0" smtClean="0"/>
+              <a:t> as an additional index to be used for apportionment</a:t>
+            </a:r>
+          </a:p>
+          <a:p>
+            <a:r>
+              <a:rPr lang="en-US" dirty="0" smtClean="0"/>
+              <a:t>Step-wise approach:</a:t>
+            </a:r>
+          </a:p>
+          <a:p>
+            <a:pPr lvl="1"/>
+            <a:r>
+              <a:rPr lang="en-US" dirty="0" smtClean="0"/>
+              <a:t>First, look at AIC ‘preferred’ model when it comes to Process Error (PE) and index scaling (q) parameters</a:t>
+            </a:r>
+          </a:p>
+          <a:p>
+            <a:pPr lvl="1"/>
+            <a:r>
+              <a:rPr lang="en-US" dirty="0" smtClean="0"/>
+              <a:t>Next, with ‘preferred’ models investigate estimating additional observation error</a:t>
+            </a:r>
+            <a:endParaRPr lang="en-US" dirty="0" smtClean="0"/>
+          </a:p>
+        </p:txBody>
+      </p:sp>
+    </p:spTree>
+    <p:extLst>
+      <p:ext uri="{BB962C8B-B14F-4D97-AF65-F5344CB8AC3E}">
+        <p14:creationId xmlns:p14="http://schemas.microsoft.com/office/powerpoint/2010/main" val="1936284340"/>
       </p:ext>
     </p:extLst>
   </p:cSld>

</xml_diff>

<commit_message>
add srv bin plots
</commit_message>
<xml_diff>
--- a/2024/presentation/sept_pt/sept_pt_notes.pptx
+++ b/2024/presentation/sept_pt/sept_pt_notes.pptx
@@ -16,21 +16,31 @@
     <p:sldId id="279" r:id="rId10"/>
     <p:sldId id="280" r:id="rId11"/>
     <p:sldId id="281" r:id="rId12"/>
-    <p:sldId id="259" r:id="rId13"/>
-    <p:sldId id="260" r:id="rId14"/>
-    <p:sldId id="263" r:id="rId15"/>
-    <p:sldId id="264" r:id="rId16"/>
-    <p:sldId id="265" r:id="rId17"/>
-    <p:sldId id="266" r:id="rId18"/>
-    <p:sldId id="267" r:id="rId19"/>
-    <p:sldId id="268" r:id="rId20"/>
-    <p:sldId id="269" r:id="rId21"/>
-    <p:sldId id="270" r:id="rId22"/>
-    <p:sldId id="271" r:id="rId23"/>
-    <p:sldId id="272" r:id="rId24"/>
-    <p:sldId id="273" r:id="rId25"/>
-    <p:sldId id="274" r:id="rId26"/>
-    <p:sldId id="275" r:id="rId27"/>
+    <p:sldId id="282" r:id="rId13"/>
+    <p:sldId id="283" r:id="rId14"/>
+    <p:sldId id="284" r:id="rId15"/>
+    <p:sldId id="285" r:id="rId16"/>
+    <p:sldId id="286" r:id="rId17"/>
+    <p:sldId id="287" r:id="rId18"/>
+    <p:sldId id="288" r:id="rId19"/>
+    <p:sldId id="289" r:id="rId20"/>
+    <p:sldId id="290" r:id="rId21"/>
+    <p:sldId id="291" r:id="rId22"/>
+    <p:sldId id="259" r:id="rId23"/>
+    <p:sldId id="260" r:id="rId24"/>
+    <p:sldId id="263" r:id="rId25"/>
+    <p:sldId id="264" r:id="rId26"/>
+    <p:sldId id="265" r:id="rId27"/>
+    <p:sldId id="266" r:id="rId28"/>
+    <p:sldId id="267" r:id="rId29"/>
+    <p:sldId id="268" r:id="rId30"/>
+    <p:sldId id="269" r:id="rId31"/>
+    <p:sldId id="270" r:id="rId32"/>
+    <p:sldId id="271" r:id="rId33"/>
+    <p:sldId id="272" r:id="rId34"/>
+    <p:sldId id="273" r:id="rId35"/>
+    <p:sldId id="274" r:id="rId36"/>
+    <p:sldId id="275" r:id="rId37"/>
   </p:sldIdLst>
   <p:sldSz cx="12192000" cy="6858000"/>
   <p:notesSz cx="6858000" cy="9144000"/>
@@ -3062,15 +3072,7 @@
             <a:pPr lvl="1"/>
             <a:r>
               <a:rPr lang="en-US" dirty="0" smtClean="0"/>
-              <a:t>Log correction in SD hadn’t been </a:t>
-            </a:r>
-            <a:r>
-              <a:rPr lang="en-US" dirty="0" smtClean="0"/>
-              <a:t>applied (but was applied to bottom trawl survey index), </a:t>
-            </a:r>
-            <a:r>
-              <a:rPr lang="en-US" dirty="0" smtClean="0"/>
-              <a:t>now is applied</a:t>
+              <a:t>Log correction in SD hadn’t been applied (but was applied to bottom trawl survey index), now is applied</a:t>
             </a:r>
           </a:p>
           <a:p>
@@ -3177,7 +3179,6 @@
               <a:rPr lang="en-US" dirty="0" smtClean="0"/>
               <a:t>Longline comps:</a:t>
             </a:r>
-            <a:endParaRPr lang="en-US" dirty="0" smtClean="0"/>
           </a:p>
         </p:txBody>
       </p:sp>
@@ -3287,7 +3288,6 @@
               <a:rPr lang="en-US" dirty="0" smtClean="0"/>
               <a:t>Pot comps:</a:t>
             </a:r>
-            <a:endParaRPr lang="en-US" dirty="0" smtClean="0"/>
           </a:p>
         </p:txBody>
       </p:sp>
@@ -3367,12 +3367,8 @@
           <a:lstStyle/>
           <a:p>
             <a:r>
-              <a:rPr lang="en-US" dirty="0"/>
-              <a:t>A</a:t>
-            </a:r>
-            <a:r>
-              <a:rPr lang="en-US" dirty="0" smtClean="0"/>
-              <a:t>ge comp </a:t>
+              <a:rPr lang="en-US" dirty="0" smtClean="0"/>
+              <a:t>Len comp </a:t>
             </a:r>
             <a:r>
               <a:rPr lang="en-US" dirty="0" err="1" smtClean="0"/>
@@ -3399,66 +3395,34 @@
           <a:p>
             <a:r>
               <a:rPr lang="en-US" dirty="0" smtClean="0"/>
-              <a:t>Survey data: this has been the standard</a:t>
-            </a:r>
-          </a:p>
-          <a:p>
-            <a:r>
-              <a:rPr lang="en-US" dirty="0" smtClean="0"/>
-              <a:t>Fishery data: </a:t>
-            </a:r>
-          </a:p>
-          <a:p>
-            <a:pPr lvl="1"/>
+              <a:t>Overall,</a:t>
+            </a:r>
             <a:r>
               <a:rPr lang="en-US" dirty="0"/>
-              <a:t>C</a:t>
-            </a:r>
-            <a:r>
-              <a:rPr lang="en-US" dirty="0" smtClean="0"/>
-              <a:t>urrently computed for males/females, then combined (excludes unsexed data)</a:t>
-            </a:r>
-          </a:p>
-          <a:p>
-            <a:pPr lvl="1"/>
-            <a:r>
-              <a:rPr lang="en-US" dirty="0" smtClean="0"/>
-              <a:t>ALK computed with FSA package rather than the observed ALK (essentially, puts lengths into ages that weren’t actually observed)</a:t>
-            </a:r>
-          </a:p>
-          <a:p>
-            <a:pPr lvl="1"/>
-            <a:r>
-              <a:rPr lang="en-US" dirty="0" smtClean="0"/>
-              <a:t>Define smallest lengths in each year as age-1</a:t>
-            </a:r>
-          </a:p>
-          <a:p>
-            <a:r>
-              <a:rPr lang="en-US" dirty="0" smtClean="0"/>
-              <a:t>Propose:</a:t>
-            </a:r>
-          </a:p>
-          <a:p>
-            <a:pPr lvl="1"/>
-            <a:r>
-              <a:rPr lang="en-US" dirty="0" smtClean="0"/>
-              <a:t>Both: combine age/length data across sexes pre-expansion</a:t>
-            </a:r>
-          </a:p>
-          <a:p>
-            <a:pPr lvl="1"/>
-            <a:r>
-              <a:rPr lang="en-US" dirty="0" smtClean="0"/>
-              <a:t>Fishery: use year-specific ALK, remove age-1 assignment</a:t>
-            </a:r>
+              <a:t> </a:t>
+            </a:r>
+            <a:r>
+              <a:rPr lang="en-US" dirty="0" smtClean="0"/>
+              <a:t>removing filters, aggregating at trimester-area-gear level and merging state data helps to smooth out much of the variability in fishery length comps</a:t>
+            </a:r>
+          </a:p>
+          <a:p>
+            <a:r>
+              <a:rPr lang="en-US" dirty="0" smtClean="0"/>
+              <a:t>Proposal: add thi</a:t>
+            </a:r>
+            <a:r>
+              <a:rPr lang="en-US" dirty="0" smtClean="0"/>
+              <a:t>s data treatment as alternative model ###</a:t>
+            </a:r>
+            <a:endParaRPr lang="en-US" dirty="0" smtClean="0"/>
           </a:p>
         </p:txBody>
       </p:sp>
     </p:spTree>
     <p:extLst>
       <p:ext uri="{BB962C8B-B14F-4D97-AF65-F5344CB8AC3E}">
-        <p14:creationId xmlns:p14="http://schemas.microsoft.com/office/powerpoint/2010/main" val="897550304"/>
+        <p14:creationId xmlns:p14="http://schemas.microsoft.com/office/powerpoint/2010/main" val="1805485079"/>
       </p:ext>
     </p:extLst>
   </p:cSld>
@@ -3501,12 +3465,8 @@
           <a:lstStyle/>
           <a:p>
             <a:r>
-              <a:rPr lang="en-US" dirty="0" err="1" smtClean="0"/>
-              <a:t>Apport</a:t>
-            </a:r>
-            <a:r>
-              <a:rPr lang="en-US" dirty="0" smtClean="0"/>
-              <a:t> </a:t>
+              <a:rPr lang="en-US" dirty="0" smtClean="0"/>
+              <a:t>Len comp </a:t>
             </a:r>
             <a:r>
               <a:rPr lang="en-US" dirty="0" err="1" smtClean="0"/>
@@ -3532,79 +3492,12 @@
           <a:lstStyle/>
           <a:p>
             <a:r>
-              <a:rPr lang="en-US" dirty="0" smtClean="0"/>
-              <a:t>LLS: might want </a:t>
-            </a:r>
-            <a:r>
-              <a:rPr lang="en-US" dirty="0" err="1" smtClean="0"/>
-              <a:t>env</a:t>
-            </a:r>
-            <a:r>
-              <a:rPr lang="en-US" dirty="0" smtClean="0"/>
-              <a:t> index for each region prior to implementation</a:t>
-            </a:r>
-          </a:p>
-          <a:p>
-            <a:pPr lvl="1"/>
-            <a:r>
-              <a:rPr lang="en-US" dirty="0" smtClean="0"/>
-              <a:t>Show </a:t>
-            </a:r>
-            <a:r>
-              <a:rPr lang="en-US" dirty="0" err="1" smtClean="0"/>
-              <a:t>rema</a:t>
-            </a:r>
-            <a:r>
-              <a:rPr lang="en-US" dirty="0" smtClean="0"/>
-              <a:t> with naïve index</a:t>
-            </a:r>
-          </a:p>
-          <a:p>
-            <a:r>
-              <a:rPr lang="en-US" dirty="0" smtClean="0"/>
-              <a:t>ADFG: run </a:t>
-            </a:r>
-            <a:r>
-              <a:rPr lang="en-US" dirty="0" err="1" smtClean="0"/>
-              <a:t>glm</a:t>
-            </a:r>
-            <a:r>
-              <a:rPr lang="en-US" dirty="0" smtClean="0"/>
-              <a:t> for each </a:t>
-            </a:r>
-            <a:r>
-              <a:rPr lang="en-US" dirty="0" err="1" smtClean="0"/>
-              <a:t>subregion</a:t>
-            </a:r>
-            <a:endParaRPr lang="en-US" dirty="0" smtClean="0"/>
-          </a:p>
-          <a:p>
-            <a:pPr lvl="1"/>
-            <a:r>
-              <a:rPr lang="en-US" dirty="0" smtClean="0"/>
-              <a:t>Show </a:t>
-            </a:r>
-            <a:r>
-              <a:rPr lang="en-US" dirty="0" err="1" smtClean="0"/>
-              <a:t>rema</a:t>
-            </a:r>
-            <a:r>
-              <a:rPr lang="en-US" dirty="0" smtClean="0"/>
-              <a:t> with index, removing </a:t>
-            </a:r>
-            <a:r>
-              <a:rPr lang="en-US" dirty="0" err="1" smtClean="0"/>
-              <a:t>egoa</a:t>
-            </a:r>
-            <a:r>
-              <a:rPr lang="en-US" dirty="0" smtClean="0"/>
-              <a:t>?</a:t>
-            </a:r>
-          </a:p>
-          <a:p>
-            <a:r>
-              <a:rPr lang="en-US" dirty="0" smtClean="0"/>
-              <a:t>IPHC: show map for 2024 index, discuss issues with data</a:t>
+              <a:rPr lang="en-US" b="1" dirty="0" smtClean="0">
+                <a:solidFill>
+                  <a:srgbClr val="FF0000"/>
+                </a:solidFill>
+              </a:rPr>
+              <a:t>Plots of new base vs alternative model ##</a:t>
             </a:r>
           </a:p>
         </p:txBody>
@@ -3612,7 +3505,7 @@
     </p:spTree>
     <p:extLst>
       <p:ext uri="{BB962C8B-B14F-4D97-AF65-F5344CB8AC3E}">
-        <p14:creationId xmlns:p14="http://schemas.microsoft.com/office/powerpoint/2010/main" val="2671101252"/>
+        <p14:creationId xmlns:p14="http://schemas.microsoft.com/office/powerpoint/2010/main" val="1675813466"/>
       </p:ext>
     </p:extLst>
   </p:cSld>
@@ -3655,12 +3548,8 @@
           <a:lstStyle/>
           <a:p>
             <a:r>
-              <a:rPr lang="en-US" dirty="0" err="1" smtClean="0"/>
-              <a:t>Apport</a:t>
-            </a:r>
-            <a:r>
-              <a:rPr lang="en-US" dirty="0" smtClean="0"/>
-              <a:t> </a:t>
+              <a:rPr lang="en-US" dirty="0" smtClean="0"/>
+              <a:t>Len comp </a:t>
             </a:r>
             <a:r>
               <a:rPr lang="en-US" dirty="0" err="1" smtClean="0"/>
@@ -3687,42 +3576,33 @@
           <a:p>
             <a:r>
               <a:rPr lang="en-US" dirty="0" smtClean="0"/>
-              <a:t>Reminder: LLS used in assessment as additional </a:t>
-            </a:r>
-            <a:r>
-              <a:rPr lang="en-US" dirty="0" err="1" smtClean="0"/>
-              <a:t>pop’n</a:t>
-            </a:r>
-            <a:r>
-              <a:rPr lang="en-US" dirty="0" smtClean="0"/>
-              <a:t> index, but not used in apportionment</a:t>
-            </a:r>
-          </a:p>
-          <a:p>
-            <a:pPr lvl="1"/>
-            <a:r>
-              <a:rPr lang="en-US" dirty="0" smtClean="0"/>
-              <a:t>And, includes an environmental link, where in warmer temps at depth cod move deeper and are more available to the LLS than in colder years</a:t>
-            </a:r>
-          </a:p>
-          <a:p>
-            <a:r>
-              <a:rPr lang="en-US" dirty="0" smtClean="0"/>
-              <a:t>Including it in apportionment has been talked about for some time </a:t>
-            </a:r>
-          </a:p>
-          <a:p>
-            <a:r>
-              <a:rPr lang="en-US" dirty="0" smtClean="0"/>
-              <a:t>Other, ‘tracked’, </a:t>
-            </a:r>
-            <a:r>
-              <a:rPr lang="en-US" dirty="0" err="1" smtClean="0"/>
-              <a:t>pop’n</a:t>
-            </a:r>
-            <a:r>
-              <a:rPr lang="en-US" dirty="0" smtClean="0"/>
-              <a:t> indices include IPHC FISS and ADF&amp;G large mesh trawl survey</a:t>
+              <a:t>Overall,</a:t>
+            </a:r>
+            <a:r>
+              <a:rPr lang="en-US" dirty="0"/>
+              <a:t> </a:t>
+            </a:r>
+            <a:r>
+              <a:rPr lang="en-US" dirty="0" smtClean="0"/>
+              <a:t>removing filters, aggregating at trimester-area-gear level and merging state data helps to smooth out much of the variability in fishery length comps</a:t>
+            </a:r>
+          </a:p>
+          <a:p>
+            <a:r>
+              <a:rPr lang="en-US" dirty="0" smtClean="0"/>
+              <a:t>But, only gets us so far</a:t>
+            </a:r>
+          </a:p>
+          <a:p>
+            <a:r>
+              <a:rPr lang="en-US" dirty="0" smtClean="0"/>
+              <a:t>Proposal: align with EBS cod investigations this year, and investigate binning length data at 5 cm intervals</a:t>
+            </a:r>
+          </a:p>
+          <a:p>
+            <a:r>
+              <a:rPr lang="en-US" dirty="0" smtClean="0"/>
+              <a:t>Affects: all length comp (surveys &amp; fishery) and conditional age-at-length (trawl survey and fishery)</a:t>
             </a:r>
           </a:p>
         </p:txBody>
@@ -3730,7 +3610,7 @@
     </p:spTree>
     <p:extLst>
       <p:ext uri="{BB962C8B-B14F-4D97-AF65-F5344CB8AC3E}">
-        <p14:creationId xmlns:p14="http://schemas.microsoft.com/office/powerpoint/2010/main" val="1209424533"/>
+        <p14:creationId xmlns:p14="http://schemas.microsoft.com/office/powerpoint/2010/main" val="3448383147"/>
       </p:ext>
     </p:extLst>
   </p:cSld>
@@ -3773,12 +3653,8 @@
           <a:lstStyle/>
           <a:p>
             <a:r>
-              <a:rPr lang="en-US" dirty="0" err="1" smtClean="0"/>
-              <a:t>Apport</a:t>
-            </a:r>
-            <a:r>
-              <a:rPr lang="en-US" dirty="0" smtClean="0"/>
-              <a:t> </a:t>
+              <a:rPr lang="en-US" dirty="0" smtClean="0"/>
+              <a:t>Len comp </a:t>
             </a:r>
             <a:r>
               <a:rPr lang="en-US" dirty="0" err="1" smtClean="0"/>
@@ -3805,43 +3681,45 @@
           <a:p>
             <a:r>
               <a:rPr lang="en-US" dirty="0" smtClean="0"/>
-              <a:t>Here, look at including LLS into </a:t>
-            </a:r>
-            <a:r>
-              <a:rPr lang="en-US" dirty="0" err="1" smtClean="0"/>
-              <a:t>rema</a:t>
-            </a:r>
-            <a:r>
-              <a:rPr lang="en-US" dirty="0" smtClean="0"/>
-              <a:t> as an additional index to be used for apportionment</a:t>
-            </a:r>
-          </a:p>
-          <a:p>
-            <a:r>
-              <a:rPr lang="en-US" dirty="0" smtClean="0"/>
-              <a:t>Step-wise approach:</a:t>
-            </a:r>
-          </a:p>
-          <a:p>
-            <a:pPr lvl="1"/>
-            <a:r>
-              <a:rPr lang="en-US" dirty="0" smtClean="0"/>
-              <a:t>First, look at AIC ‘preferred’ model when it comes to Process Error (PE) and index scaling (q) parameters</a:t>
-            </a:r>
-          </a:p>
-          <a:p>
-            <a:pPr lvl="1"/>
-            <a:r>
-              <a:rPr lang="en-US" dirty="0" smtClean="0"/>
-              <a:t>Next, with ‘preferred’ models investigate estimating additional observation error</a:t>
-            </a:r>
-          </a:p>
-        </p:txBody>
-      </p:sp>
+              <a:t>Bin trawl:</a:t>
+            </a:r>
+          </a:p>
+        </p:txBody>
+      </p:sp>
+      <p:pic>
+        <p:nvPicPr>
+          <p:cNvPr id="2" name="Picture 1"/>
+          <p:cNvPicPr>
+            <a:picLocks noChangeAspect="1"/>
+          </p:cNvPicPr>
+          <p:nvPr/>
+        </p:nvPicPr>
+        <p:blipFill>
+          <a:blip r:embed="rId2" cstate="print">
+            <a:extLst>
+              <a:ext uri="{28A0092B-C50C-407E-A947-70E740481C1C}">
+                <a14:useLocalDpi xmlns:a14="http://schemas.microsoft.com/office/drawing/2010/main" val="0"/>
+              </a:ext>
+            </a:extLst>
+          </a:blip>
+          <a:stretch>
+            <a:fillRect/>
+          </a:stretch>
+        </p:blipFill>
+        <p:spPr>
+          <a:xfrm>
+            <a:off x="2644346" y="1309128"/>
+            <a:ext cx="8781653" cy="5122631"/>
+          </a:xfrm>
+          <a:prstGeom prst="rect">
+            <a:avLst/>
+          </a:prstGeom>
+        </p:spPr>
+      </p:pic>
     </p:spTree>
     <p:extLst>
       <p:ext uri="{BB962C8B-B14F-4D97-AF65-F5344CB8AC3E}">
-        <p14:creationId xmlns:p14="http://schemas.microsoft.com/office/powerpoint/2010/main" val="1936284340"/>
+        <p14:creationId xmlns:p14="http://schemas.microsoft.com/office/powerpoint/2010/main" val="3092300499"/>
       </p:ext>
     </p:extLst>
   </p:cSld>
@@ -3884,6 +3762,1220 @@
           <a:lstStyle/>
           <a:p>
             <a:r>
+              <a:rPr lang="en-US" dirty="0" smtClean="0"/>
+              <a:t>Len comp </a:t>
+            </a:r>
+            <a:r>
+              <a:rPr lang="en-US" dirty="0" err="1" smtClean="0"/>
+              <a:t>inv</a:t>
+            </a:r>
+            <a:endParaRPr lang="en-US" dirty="0"/>
+          </a:p>
+        </p:txBody>
+      </p:sp>
+      <p:sp>
+        <p:nvSpPr>
+          <p:cNvPr id="5" name="Content Placeholder 4"/>
+          <p:cNvSpPr>
+            <a:spLocks noGrp="1"/>
+          </p:cNvSpPr>
+          <p:nvPr>
+            <p:ph idx="1"/>
+          </p:nvPr>
+        </p:nvSpPr>
+        <p:spPr/>
+        <p:txBody>
+          <a:bodyPr/>
+          <a:lstStyle/>
+          <a:p>
+            <a:r>
+              <a:rPr lang="en-US" dirty="0" smtClean="0"/>
+              <a:t>Bin longline:</a:t>
+            </a:r>
+          </a:p>
+        </p:txBody>
+      </p:sp>
+      <p:pic>
+        <p:nvPicPr>
+          <p:cNvPr id="3" name="Picture 2"/>
+          <p:cNvPicPr>
+            <a:picLocks noChangeAspect="1"/>
+          </p:cNvPicPr>
+          <p:nvPr/>
+        </p:nvPicPr>
+        <p:blipFill>
+          <a:blip r:embed="rId2" cstate="print">
+            <a:extLst>
+              <a:ext uri="{28A0092B-C50C-407E-A947-70E740481C1C}">
+                <a14:useLocalDpi xmlns:a14="http://schemas.microsoft.com/office/drawing/2010/main" val="0"/>
+              </a:ext>
+            </a:extLst>
+          </a:blip>
+          <a:stretch>
+            <a:fillRect/>
+          </a:stretch>
+        </p:blipFill>
+        <p:spPr>
+          <a:xfrm>
+            <a:off x="3118639" y="1373119"/>
+            <a:ext cx="8235161" cy="4803844"/>
+          </a:xfrm>
+          <a:prstGeom prst="rect">
+            <a:avLst/>
+          </a:prstGeom>
+        </p:spPr>
+      </p:pic>
+    </p:spTree>
+    <p:extLst>
+      <p:ext uri="{BB962C8B-B14F-4D97-AF65-F5344CB8AC3E}">
+        <p14:creationId xmlns:p14="http://schemas.microsoft.com/office/powerpoint/2010/main" val="3986824567"/>
+      </p:ext>
+    </p:extLst>
+  </p:cSld>
+  <p:clrMapOvr>
+    <a:masterClrMapping/>
+  </p:clrMapOvr>
+</p:sld>
+</file>
+
+<file path=ppt/slides/slide17.xml><?xml version="1.0" encoding="utf-8"?>
+<p:sld xmlns:a="http://schemas.openxmlformats.org/drawingml/2006/main" xmlns:r="http://schemas.openxmlformats.org/officeDocument/2006/relationships" xmlns:p="http://schemas.openxmlformats.org/presentationml/2006/main">
+  <p:cSld>
+    <p:spTree>
+      <p:nvGrpSpPr>
+        <p:cNvPr id="1" name=""/>
+        <p:cNvGrpSpPr/>
+        <p:nvPr/>
+      </p:nvGrpSpPr>
+      <p:grpSpPr>
+        <a:xfrm>
+          <a:off x="0" y="0"/>
+          <a:ext cx="0" cy="0"/>
+          <a:chOff x="0" y="0"/>
+          <a:chExt cx="0" cy="0"/>
+        </a:xfrm>
+      </p:grpSpPr>
+      <p:sp>
+        <p:nvSpPr>
+          <p:cNvPr id="4" name="Title 3"/>
+          <p:cNvSpPr>
+            <a:spLocks noGrp="1"/>
+          </p:cNvSpPr>
+          <p:nvPr>
+            <p:ph type="title"/>
+          </p:nvPr>
+        </p:nvSpPr>
+        <p:spPr/>
+        <p:txBody>
+          <a:bodyPr/>
+          <a:lstStyle/>
+          <a:p>
+            <a:r>
+              <a:rPr lang="en-US" dirty="0" smtClean="0"/>
+              <a:t>Len comp </a:t>
+            </a:r>
+            <a:r>
+              <a:rPr lang="en-US" dirty="0" err="1" smtClean="0"/>
+              <a:t>inv</a:t>
+            </a:r>
+            <a:endParaRPr lang="en-US" dirty="0"/>
+          </a:p>
+        </p:txBody>
+      </p:sp>
+      <p:sp>
+        <p:nvSpPr>
+          <p:cNvPr id="5" name="Content Placeholder 4"/>
+          <p:cNvSpPr>
+            <a:spLocks noGrp="1"/>
+          </p:cNvSpPr>
+          <p:nvPr>
+            <p:ph idx="1"/>
+          </p:nvPr>
+        </p:nvSpPr>
+        <p:spPr/>
+        <p:txBody>
+          <a:bodyPr/>
+          <a:lstStyle/>
+          <a:p>
+            <a:r>
+              <a:rPr lang="en-US" dirty="0" smtClean="0"/>
+              <a:t>Bin pot:</a:t>
+            </a:r>
+          </a:p>
+        </p:txBody>
+      </p:sp>
+      <p:pic>
+        <p:nvPicPr>
+          <p:cNvPr id="2" name="Picture 1"/>
+          <p:cNvPicPr>
+            <a:picLocks noChangeAspect="1"/>
+          </p:cNvPicPr>
+          <p:nvPr/>
+        </p:nvPicPr>
+        <p:blipFill>
+          <a:blip r:embed="rId2" cstate="print">
+            <a:extLst>
+              <a:ext uri="{28A0092B-C50C-407E-A947-70E740481C1C}">
+                <a14:useLocalDpi xmlns:a14="http://schemas.microsoft.com/office/drawing/2010/main" val="0"/>
+              </a:ext>
+            </a:extLst>
+          </a:blip>
+          <a:stretch>
+            <a:fillRect/>
+          </a:stretch>
+        </p:blipFill>
+        <p:spPr>
+          <a:xfrm>
+            <a:off x="2767914" y="1409357"/>
+            <a:ext cx="8468615" cy="4940025"/>
+          </a:xfrm>
+          <a:prstGeom prst="rect">
+            <a:avLst/>
+          </a:prstGeom>
+        </p:spPr>
+      </p:pic>
+    </p:spTree>
+    <p:extLst>
+      <p:ext uri="{BB962C8B-B14F-4D97-AF65-F5344CB8AC3E}">
+        <p14:creationId xmlns:p14="http://schemas.microsoft.com/office/powerpoint/2010/main" val="463318304"/>
+      </p:ext>
+    </p:extLst>
+  </p:cSld>
+  <p:clrMapOvr>
+    <a:masterClrMapping/>
+  </p:clrMapOvr>
+</p:sld>
+</file>
+
+<file path=ppt/slides/slide18.xml><?xml version="1.0" encoding="utf-8"?>
+<p:sld xmlns:a="http://schemas.openxmlformats.org/drawingml/2006/main" xmlns:r="http://schemas.openxmlformats.org/officeDocument/2006/relationships" xmlns:p="http://schemas.openxmlformats.org/presentationml/2006/main">
+  <p:cSld>
+    <p:spTree>
+      <p:nvGrpSpPr>
+        <p:cNvPr id="1" name=""/>
+        <p:cNvGrpSpPr/>
+        <p:nvPr/>
+      </p:nvGrpSpPr>
+      <p:grpSpPr>
+        <a:xfrm>
+          <a:off x="0" y="0"/>
+          <a:ext cx="0" cy="0"/>
+          <a:chOff x="0" y="0"/>
+          <a:chExt cx="0" cy="0"/>
+        </a:xfrm>
+      </p:grpSpPr>
+      <p:sp>
+        <p:nvSpPr>
+          <p:cNvPr id="4" name="Title 3"/>
+          <p:cNvSpPr>
+            <a:spLocks noGrp="1"/>
+          </p:cNvSpPr>
+          <p:nvPr>
+            <p:ph type="title"/>
+          </p:nvPr>
+        </p:nvSpPr>
+        <p:spPr/>
+        <p:txBody>
+          <a:bodyPr/>
+          <a:lstStyle/>
+          <a:p>
+            <a:r>
+              <a:rPr lang="en-US" dirty="0" smtClean="0"/>
+              <a:t>Len comp </a:t>
+            </a:r>
+            <a:r>
+              <a:rPr lang="en-US" dirty="0" err="1" smtClean="0"/>
+              <a:t>inv</a:t>
+            </a:r>
+            <a:endParaRPr lang="en-US" dirty="0"/>
+          </a:p>
+        </p:txBody>
+      </p:sp>
+      <p:sp>
+        <p:nvSpPr>
+          <p:cNvPr id="5" name="Content Placeholder 4"/>
+          <p:cNvSpPr>
+            <a:spLocks noGrp="1"/>
+          </p:cNvSpPr>
+          <p:nvPr>
+            <p:ph idx="1"/>
+          </p:nvPr>
+        </p:nvSpPr>
+        <p:spPr/>
+        <p:txBody>
+          <a:bodyPr/>
+          <a:lstStyle/>
+          <a:p>
+            <a:r>
+              <a:rPr lang="en-US" dirty="0" smtClean="0"/>
+              <a:t>Bin trawl survey:</a:t>
+            </a:r>
+          </a:p>
+        </p:txBody>
+      </p:sp>
+      <p:pic>
+        <p:nvPicPr>
+          <p:cNvPr id="3" name="Picture 2"/>
+          <p:cNvPicPr>
+            <a:picLocks noChangeAspect="1"/>
+          </p:cNvPicPr>
+          <p:nvPr/>
+        </p:nvPicPr>
+        <p:blipFill>
+          <a:blip r:embed="rId2" cstate="print">
+            <a:extLst>
+              <a:ext uri="{28A0092B-C50C-407E-A947-70E740481C1C}">
+                <a14:useLocalDpi xmlns:a14="http://schemas.microsoft.com/office/drawing/2010/main" val="0"/>
+              </a:ext>
+            </a:extLst>
+          </a:blip>
+          <a:stretch>
+            <a:fillRect/>
+          </a:stretch>
+        </p:blipFill>
+        <p:spPr>
+          <a:xfrm>
+            <a:off x="2141838" y="2365632"/>
+            <a:ext cx="7521264" cy="4387404"/>
+          </a:xfrm>
+          <a:prstGeom prst="rect">
+            <a:avLst/>
+          </a:prstGeom>
+        </p:spPr>
+      </p:pic>
+    </p:spTree>
+    <p:extLst>
+      <p:ext uri="{BB962C8B-B14F-4D97-AF65-F5344CB8AC3E}">
+        <p14:creationId xmlns:p14="http://schemas.microsoft.com/office/powerpoint/2010/main" val="1027061865"/>
+      </p:ext>
+    </p:extLst>
+  </p:cSld>
+  <p:clrMapOvr>
+    <a:masterClrMapping/>
+  </p:clrMapOvr>
+</p:sld>
+</file>
+
+<file path=ppt/slides/slide19.xml><?xml version="1.0" encoding="utf-8"?>
+<p:sld xmlns:a="http://schemas.openxmlformats.org/drawingml/2006/main" xmlns:r="http://schemas.openxmlformats.org/officeDocument/2006/relationships" xmlns:p="http://schemas.openxmlformats.org/presentationml/2006/main">
+  <p:cSld>
+    <p:spTree>
+      <p:nvGrpSpPr>
+        <p:cNvPr id="1" name=""/>
+        <p:cNvGrpSpPr/>
+        <p:nvPr/>
+      </p:nvGrpSpPr>
+      <p:grpSpPr>
+        <a:xfrm>
+          <a:off x="0" y="0"/>
+          <a:ext cx="0" cy="0"/>
+          <a:chOff x="0" y="0"/>
+          <a:chExt cx="0" cy="0"/>
+        </a:xfrm>
+      </p:grpSpPr>
+      <p:sp>
+        <p:nvSpPr>
+          <p:cNvPr id="4" name="Title 3"/>
+          <p:cNvSpPr>
+            <a:spLocks noGrp="1"/>
+          </p:cNvSpPr>
+          <p:nvPr>
+            <p:ph type="title"/>
+          </p:nvPr>
+        </p:nvSpPr>
+        <p:spPr/>
+        <p:txBody>
+          <a:bodyPr/>
+          <a:lstStyle/>
+          <a:p>
+            <a:r>
+              <a:rPr lang="en-US" dirty="0" smtClean="0"/>
+              <a:t>Len comp </a:t>
+            </a:r>
+            <a:r>
+              <a:rPr lang="en-US" dirty="0" err="1" smtClean="0"/>
+              <a:t>inv</a:t>
+            </a:r>
+            <a:endParaRPr lang="en-US" dirty="0"/>
+          </a:p>
+        </p:txBody>
+      </p:sp>
+      <p:sp>
+        <p:nvSpPr>
+          <p:cNvPr id="5" name="Content Placeholder 4"/>
+          <p:cNvSpPr>
+            <a:spLocks noGrp="1"/>
+          </p:cNvSpPr>
+          <p:nvPr>
+            <p:ph idx="1"/>
+          </p:nvPr>
+        </p:nvSpPr>
+        <p:spPr/>
+        <p:txBody>
+          <a:bodyPr/>
+          <a:lstStyle/>
+          <a:p>
+            <a:r>
+              <a:rPr lang="en-US" dirty="0" smtClean="0"/>
+              <a:t>Bin longline survey:</a:t>
+            </a:r>
+          </a:p>
+        </p:txBody>
+      </p:sp>
+      <p:pic>
+        <p:nvPicPr>
+          <p:cNvPr id="2" name="Picture 1"/>
+          <p:cNvPicPr>
+            <a:picLocks noChangeAspect="1"/>
+          </p:cNvPicPr>
+          <p:nvPr/>
+        </p:nvPicPr>
+        <p:blipFill>
+          <a:blip r:embed="rId2" cstate="print">
+            <a:extLst>
+              <a:ext uri="{28A0092B-C50C-407E-A947-70E740481C1C}">
+                <a14:useLocalDpi xmlns:a14="http://schemas.microsoft.com/office/drawing/2010/main" val="0"/>
+              </a:ext>
+            </a:extLst>
+          </a:blip>
+          <a:stretch>
+            <a:fillRect/>
+          </a:stretch>
+        </p:blipFill>
+        <p:spPr>
+          <a:xfrm>
+            <a:off x="2372498" y="2406821"/>
+            <a:ext cx="7125848" cy="4156744"/>
+          </a:xfrm>
+          <a:prstGeom prst="rect">
+            <a:avLst/>
+          </a:prstGeom>
+        </p:spPr>
+      </p:pic>
+    </p:spTree>
+    <p:extLst>
+      <p:ext uri="{BB962C8B-B14F-4D97-AF65-F5344CB8AC3E}">
+        <p14:creationId xmlns:p14="http://schemas.microsoft.com/office/powerpoint/2010/main" val="739592806"/>
+      </p:ext>
+    </p:extLst>
+  </p:cSld>
+  <p:clrMapOvr>
+    <a:masterClrMapping/>
+  </p:clrMapOvr>
+</p:sld>
+</file>
+
+<file path=ppt/slides/slide2.xml><?xml version="1.0" encoding="utf-8"?>
+<p:sld xmlns:a="http://schemas.openxmlformats.org/drawingml/2006/main" xmlns:r="http://schemas.openxmlformats.org/officeDocument/2006/relationships" xmlns:p="http://schemas.openxmlformats.org/presentationml/2006/main">
+  <p:cSld>
+    <p:spTree>
+      <p:nvGrpSpPr>
+        <p:cNvPr id="1" name=""/>
+        <p:cNvGrpSpPr/>
+        <p:nvPr/>
+      </p:nvGrpSpPr>
+      <p:grpSpPr>
+        <a:xfrm>
+          <a:off x="0" y="0"/>
+          <a:ext cx="0" cy="0"/>
+          <a:chOff x="0" y="0"/>
+          <a:chExt cx="0" cy="0"/>
+        </a:xfrm>
+      </p:grpSpPr>
+      <p:sp>
+        <p:nvSpPr>
+          <p:cNvPr id="4" name="Title 3"/>
+          <p:cNvSpPr>
+            <a:spLocks noGrp="1"/>
+          </p:cNvSpPr>
+          <p:nvPr>
+            <p:ph type="title"/>
+          </p:nvPr>
+        </p:nvSpPr>
+        <p:spPr/>
+        <p:txBody>
+          <a:bodyPr/>
+          <a:lstStyle/>
+          <a:p>
+            <a:r>
+              <a:rPr lang="en-US" dirty="0" smtClean="0"/>
+              <a:t>Base data differences</a:t>
+            </a:r>
+            <a:endParaRPr lang="en-US" dirty="0"/>
+          </a:p>
+        </p:txBody>
+      </p:sp>
+      <p:sp>
+        <p:nvSpPr>
+          <p:cNvPr id="5" name="Content Placeholder 4"/>
+          <p:cNvSpPr>
+            <a:spLocks noGrp="1"/>
+          </p:cNvSpPr>
+          <p:nvPr>
+            <p:ph idx="1"/>
+          </p:nvPr>
+        </p:nvSpPr>
+        <p:spPr/>
+        <p:txBody>
+          <a:bodyPr/>
+          <a:lstStyle/>
+          <a:p>
+            <a:r>
+              <a:rPr lang="en-US" dirty="0" smtClean="0"/>
+              <a:t>Plot of base model vs data update model</a:t>
+            </a:r>
+            <a:endParaRPr lang="en-US" dirty="0"/>
+          </a:p>
+        </p:txBody>
+      </p:sp>
+    </p:spTree>
+    <p:extLst>
+      <p:ext uri="{BB962C8B-B14F-4D97-AF65-F5344CB8AC3E}">
+        <p14:creationId xmlns:p14="http://schemas.microsoft.com/office/powerpoint/2010/main" val="3238081657"/>
+      </p:ext>
+    </p:extLst>
+  </p:cSld>
+  <p:clrMapOvr>
+    <a:masterClrMapping/>
+  </p:clrMapOvr>
+</p:sld>
+</file>
+
+<file path=ppt/slides/slide20.xml><?xml version="1.0" encoding="utf-8"?>
+<p:sld xmlns:a="http://schemas.openxmlformats.org/drawingml/2006/main" xmlns:r="http://schemas.openxmlformats.org/officeDocument/2006/relationships" xmlns:p="http://schemas.openxmlformats.org/presentationml/2006/main">
+  <p:cSld>
+    <p:spTree>
+      <p:nvGrpSpPr>
+        <p:cNvPr id="1" name=""/>
+        <p:cNvGrpSpPr/>
+        <p:nvPr/>
+      </p:nvGrpSpPr>
+      <p:grpSpPr>
+        <a:xfrm>
+          <a:off x="0" y="0"/>
+          <a:ext cx="0" cy="0"/>
+          <a:chOff x="0" y="0"/>
+          <a:chExt cx="0" cy="0"/>
+        </a:xfrm>
+      </p:grpSpPr>
+      <p:sp>
+        <p:nvSpPr>
+          <p:cNvPr id="4" name="Title 3"/>
+          <p:cNvSpPr>
+            <a:spLocks noGrp="1"/>
+          </p:cNvSpPr>
+          <p:nvPr>
+            <p:ph type="title"/>
+          </p:nvPr>
+        </p:nvSpPr>
+        <p:spPr/>
+        <p:txBody>
+          <a:bodyPr/>
+          <a:lstStyle/>
+          <a:p>
+            <a:r>
+              <a:rPr lang="en-US" dirty="0" smtClean="0"/>
+              <a:t>Len comp </a:t>
+            </a:r>
+            <a:r>
+              <a:rPr lang="en-US" dirty="0" err="1" smtClean="0"/>
+              <a:t>inv</a:t>
+            </a:r>
+            <a:endParaRPr lang="en-US" dirty="0"/>
+          </a:p>
+        </p:txBody>
+      </p:sp>
+      <p:sp>
+        <p:nvSpPr>
+          <p:cNvPr id="5" name="Content Placeholder 4"/>
+          <p:cNvSpPr>
+            <a:spLocks noGrp="1"/>
+          </p:cNvSpPr>
+          <p:nvPr>
+            <p:ph idx="1"/>
+          </p:nvPr>
+        </p:nvSpPr>
+        <p:spPr/>
+        <p:txBody>
+          <a:bodyPr/>
+          <a:lstStyle/>
+          <a:p>
+            <a:r>
+              <a:rPr lang="en-US" dirty="0" smtClean="0"/>
+              <a:t>Overall,</a:t>
+            </a:r>
+            <a:r>
+              <a:rPr lang="en-US" dirty="0"/>
+              <a:t> </a:t>
+            </a:r>
+            <a:r>
+              <a:rPr lang="en-US" dirty="0" smtClean="0"/>
+              <a:t>removing filters, aggregating at trimester-area-gear level and merging state data helps to smooth out much of the variability in fishery length comps</a:t>
+            </a:r>
+          </a:p>
+          <a:p>
+            <a:r>
+              <a:rPr lang="en-US" dirty="0" smtClean="0"/>
+              <a:t>And, binning to 5 cm removes variability in length composition without loosing important signal</a:t>
+            </a:r>
+          </a:p>
+          <a:p>
+            <a:r>
+              <a:rPr lang="en-US" dirty="0"/>
+              <a:t>Proposal: add this data treatment as alternative model ###</a:t>
+            </a:r>
+          </a:p>
+          <a:p>
+            <a:endParaRPr lang="en-US" dirty="0" smtClean="0"/>
+          </a:p>
+        </p:txBody>
+      </p:sp>
+    </p:spTree>
+    <p:extLst>
+      <p:ext uri="{BB962C8B-B14F-4D97-AF65-F5344CB8AC3E}">
+        <p14:creationId xmlns:p14="http://schemas.microsoft.com/office/powerpoint/2010/main" val="2575233872"/>
+      </p:ext>
+    </p:extLst>
+  </p:cSld>
+  <p:clrMapOvr>
+    <a:masterClrMapping/>
+  </p:clrMapOvr>
+</p:sld>
+</file>
+
+<file path=ppt/slides/slide21.xml><?xml version="1.0" encoding="utf-8"?>
+<p:sld xmlns:a="http://schemas.openxmlformats.org/drawingml/2006/main" xmlns:r="http://schemas.openxmlformats.org/officeDocument/2006/relationships" xmlns:p="http://schemas.openxmlformats.org/presentationml/2006/main">
+  <p:cSld>
+    <p:spTree>
+      <p:nvGrpSpPr>
+        <p:cNvPr id="1" name=""/>
+        <p:cNvGrpSpPr/>
+        <p:nvPr/>
+      </p:nvGrpSpPr>
+      <p:grpSpPr>
+        <a:xfrm>
+          <a:off x="0" y="0"/>
+          <a:ext cx="0" cy="0"/>
+          <a:chOff x="0" y="0"/>
+          <a:chExt cx="0" cy="0"/>
+        </a:xfrm>
+      </p:grpSpPr>
+      <p:sp>
+        <p:nvSpPr>
+          <p:cNvPr id="4" name="Title 3"/>
+          <p:cNvSpPr>
+            <a:spLocks noGrp="1"/>
+          </p:cNvSpPr>
+          <p:nvPr>
+            <p:ph type="title"/>
+          </p:nvPr>
+        </p:nvSpPr>
+        <p:spPr/>
+        <p:txBody>
+          <a:bodyPr/>
+          <a:lstStyle/>
+          <a:p>
+            <a:r>
+              <a:rPr lang="en-US" dirty="0" smtClean="0"/>
+              <a:t>Len comp </a:t>
+            </a:r>
+            <a:r>
+              <a:rPr lang="en-US" dirty="0" err="1" smtClean="0"/>
+              <a:t>inv</a:t>
+            </a:r>
+            <a:endParaRPr lang="en-US" dirty="0"/>
+          </a:p>
+        </p:txBody>
+      </p:sp>
+      <p:sp>
+        <p:nvSpPr>
+          <p:cNvPr id="5" name="Content Placeholder 4"/>
+          <p:cNvSpPr>
+            <a:spLocks noGrp="1"/>
+          </p:cNvSpPr>
+          <p:nvPr>
+            <p:ph idx="1"/>
+          </p:nvPr>
+        </p:nvSpPr>
+        <p:spPr/>
+        <p:txBody>
+          <a:bodyPr/>
+          <a:lstStyle/>
+          <a:p>
+            <a:r>
+              <a:rPr lang="en-US" b="1" dirty="0" smtClean="0">
+                <a:solidFill>
+                  <a:srgbClr val="FF0000"/>
+                </a:solidFill>
+              </a:rPr>
+              <a:t>Plots of new base vs alternative model ##</a:t>
+            </a:r>
+          </a:p>
+        </p:txBody>
+      </p:sp>
+    </p:spTree>
+    <p:extLst>
+      <p:ext uri="{BB962C8B-B14F-4D97-AF65-F5344CB8AC3E}">
+        <p14:creationId xmlns:p14="http://schemas.microsoft.com/office/powerpoint/2010/main" val="1423742952"/>
+      </p:ext>
+    </p:extLst>
+  </p:cSld>
+  <p:clrMapOvr>
+    <a:masterClrMapping/>
+  </p:clrMapOvr>
+</p:sld>
+</file>
+
+<file path=ppt/slides/slide22.xml><?xml version="1.0" encoding="utf-8"?>
+<p:sld xmlns:a="http://schemas.openxmlformats.org/drawingml/2006/main" xmlns:r="http://schemas.openxmlformats.org/officeDocument/2006/relationships" xmlns:p="http://schemas.openxmlformats.org/presentationml/2006/main">
+  <p:cSld>
+    <p:spTree>
+      <p:nvGrpSpPr>
+        <p:cNvPr id="1" name=""/>
+        <p:cNvGrpSpPr/>
+        <p:nvPr/>
+      </p:nvGrpSpPr>
+      <p:grpSpPr>
+        <a:xfrm>
+          <a:off x="0" y="0"/>
+          <a:ext cx="0" cy="0"/>
+          <a:chOff x="0" y="0"/>
+          <a:chExt cx="0" cy="0"/>
+        </a:xfrm>
+      </p:grpSpPr>
+      <p:sp>
+        <p:nvSpPr>
+          <p:cNvPr id="4" name="Title 3"/>
+          <p:cNvSpPr>
+            <a:spLocks noGrp="1"/>
+          </p:cNvSpPr>
+          <p:nvPr>
+            <p:ph type="title"/>
+          </p:nvPr>
+        </p:nvSpPr>
+        <p:spPr/>
+        <p:txBody>
+          <a:bodyPr/>
+          <a:lstStyle/>
+          <a:p>
+            <a:r>
+              <a:rPr lang="en-US" dirty="0"/>
+              <a:t>A</a:t>
+            </a:r>
+            <a:r>
+              <a:rPr lang="en-US" dirty="0" smtClean="0"/>
+              <a:t>ge comp </a:t>
+            </a:r>
+            <a:r>
+              <a:rPr lang="en-US" dirty="0" err="1" smtClean="0"/>
+              <a:t>inv</a:t>
+            </a:r>
+            <a:endParaRPr lang="en-US" dirty="0"/>
+          </a:p>
+        </p:txBody>
+      </p:sp>
+      <p:sp>
+        <p:nvSpPr>
+          <p:cNvPr id="5" name="Content Placeholder 4"/>
+          <p:cNvSpPr>
+            <a:spLocks noGrp="1"/>
+          </p:cNvSpPr>
+          <p:nvPr>
+            <p:ph idx="1"/>
+          </p:nvPr>
+        </p:nvSpPr>
+        <p:spPr/>
+        <p:txBody>
+          <a:bodyPr/>
+          <a:lstStyle/>
+          <a:p>
+            <a:r>
+              <a:rPr lang="en-US" dirty="0" smtClean="0"/>
+              <a:t>Survey data: this has been the standard</a:t>
+            </a:r>
+          </a:p>
+          <a:p>
+            <a:r>
+              <a:rPr lang="en-US" dirty="0" smtClean="0"/>
+              <a:t>Fishery data: </a:t>
+            </a:r>
+          </a:p>
+          <a:p>
+            <a:pPr lvl="1"/>
+            <a:r>
+              <a:rPr lang="en-US" dirty="0"/>
+              <a:t>C</a:t>
+            </a:r>
+            <a:r>
+              <a:rPr lang="en-US" dirty="0" smtClean="0"/>
+              <a:t>urrently computed for males/females, then combined (excludes unsexed data)</a:t>
+            </a:r>
+          </a:p>
+          <a:p>
+            <a:pPr lvl="1"/>
+            <a:r>
+              <a:rPr lang="en-US" dirty="0" smtClean="0"/>
+              <a:t>ALK computed with FSA package rather than the observed ALK (essentially, puts lengths into ages that weren’t actually observed)</a:t>
+            </a:r>
+          </a:p>
+          <a:p>
+            <a:pPr lvl="1"/>
+            <a:r>
+              <a:rPr lang="en-US" dirty="0" smtClean="0"/>
+              <a:t>Define smallest lengths in each year as age-1</a:t>
+            </a:r>
+          </a:p>
+          <a:p>
+            <a:r>
+              <a:rPr lang="en-US" dirty="0" smtClean="0"/>
+              <a:t>Propose:</a:t>
+            </a:r>
+          </a:p>
+          <a:p>
+            <a:pPr lvl="1"/>
+            <a:r>
+              <a:rPr lang="en-US" dirty="0" smtClean="0"/>
+              <a:t>Both: combine age/length data across sexes pre-expansion</a:t>
+            </a:r>
+          </a:p>
+          <a:p>
+            <a:pPr lvl="1"/>
+            <a:r>
+              <a:rPr lang="en-US" dirty="0" smtClean="0"/>
+              <a:t>Fishery: use year-specific ALK, remove age-1 assignment</a:t>
+            </a:r>
+          </a:p>
+        </p:txBody>
+      </p:sp>
+    </p:spTree>
+    <p:extLst>
+      <p:ext uri="{BB962C8B-B14F-4D97-AF65-F5344CB8AC3E}">
+        <p14:creationId xmlns:p14="http://schemas.microsoft.com/office/powerpoint/2010/main" val="897550304"/>
+      </p:ext>
+    </p:extLst>
+  </p:cSld>
+  <p:clrMapOvr>
+    <a:masterClrMapping/>
+  </p:clrMapOvr>
+</p:sld>
+</file>
+
+<file path=ppt/slides/slide23.xml><?xml version="1.0" encoding="utf-8"?>
+<p:sld xmlns:a="http://schemas.openxmlformats.org/drawingml/2006/main" xmlns:r="http://schemas.openxmlformats.org/officeDocument/2006/relationships" xmlns:p="http://schemas.openxmlformats.org/presentationml/2006/main">
+  <p:cSld>
+    <p:spTree>
+      <p:nvGrpSpPr>
+        <p:cNvPr id="1" name=""/>
+        <p:cNvGrpSpPr/>
+        <p:nvPr/>
+      </p:nvGrpSpPr>
+      <p:grpSpPr>
+        <a:xfrm>
+          <a:off x="0" y="0"/>
+          <a:ext cx="0" cy="0"/>
+          <a:chOff x="0" y="0"/>
+          <a:chExt cx="0" cy="0"/>
+        </a:xfrm>
+      </p:grpSpPr>
+      <p:sp>
+        <p:nvSpPr>
+          <p:cNvPr id="4" name="Title 3"/>
+          <p:cNvSpPr>
+            <a:spLocks noGrp="1"/>
+          </p:cNvSpPr>
+          <p:nvPr>
+            <p:ph type="title"/>
+          </p:nvPr>
+        </p:nvSpPr>
+        <p:spPr/>
+        <p:txBody>
+          <a:bodyPr/>
+          <a:lstStyle/>
+          <a:p>
+            <a:r>
+              <a:rPr lang="en-US" dirty="0" err="1" smtClean="0"/>
+              <a:t>Apport</a:t>
+            </a:r>
+            <a:r>
+              <a:rPr lang="en-US" dirty="0" smtClean="0"/>
+              <a:t> </a:t>
+            </a:r>
+            <a:r>
+              <a:rPr lang="en-US" dirty="0" err="1" smtClean="0"/>
+              <a:t>inv</a:t>
+            </a:r>
+            <a:endParaRPr lang="en-US" dirty="0"/>
+          </a:p>
+        </p:txBody>
+      </p:sp>
+      <p:sp>
+        <p:nvSpPr>
+          <p:cNvPr id="5" name="Content Placeholder 4"/>
+          <p:cNvSpPr>
+            <a:spLocks noGrp="1"/>
+          </p:cNvSpPr>
+          <p:nvPr>
+            <p:ph idx="1"/>
+          </p:nvPr>
+        </p:nvSpPr>
+        <p:spPr/>
+        <p:txBody>
+          <a:bodyPr/>
+          <a:lstStyle/>
+          <a:p>
+            <a:r>
+              <a:rPr lang="en-US" dirty="0" smtClean="0"/>
+              <a:t>LLS: might want </a:t>
+            </a:r>
+            <a:r>
+              <a:rPr lang="en-US" dirty="0" err="1" smtClean="0"/>
+              <a:t>env</a:t>
+            </a:r>
+            <a:r>
+              <a:rPr lang="en-US" dirty="0" smtClean="0"/>
+              <a:t> index for each region prior to implementation</a:t>
+            </a:r>
+          </a:p>
+          <a:p>
+            <a:pPr lvl="1"/>
+            <a:r>
+              <a:rPr lang="en-US" dirty="0" smtClean="0"/>
+              <a:t>Show </a:t>
+            </a:r>
+            <a:r>
+              <a:rPr lang="en-US" dirty="0" err="1" smtClean="0"/>
+              <a:t>rema</a:t>
+            </a:r>
+            <a:r>
+              <a:rPr lang="en-US" dirty="0" smtClean="0"/>
+              <a:t> with naïve index</a:t>
+            </a:r>
+          </a:p>
+          <a:p>
+            <a:r>
+              <a:rPr lang="en-US" dirty="0" smtClean="0"/>
+              <a:t>ADFG: run </a:t>
+            </a:r>
+            <a:r>
+              <a:rPr lang="en-US" dirty="0" err="1" smtClean="0"/>
+              <a:t>glm</a:t>
+            </a:r>
+            <a:r>
+              <a:rPr lang="en-US" dirty="0" smtClean="0"/>
+              <a:t> for each </a:t>
+            </a:r>
+            <a:r>
+              <a:rPr lang="en-US" dirty="0" err="1" smtClean="0"/>
+              <a:t>subregion</a:t>
+            </a:r>
+            <a:endParaRPr lang="en-US" dirty="0" smtClean="0"/>
+          </a:p>
+          <a:p>
+            <a:pPr lvl="1"/>
+            <a:r>
+              <a:rPr lang="en-US" dirty="0" smtClean="0"/>
+              <a:t>Show </a:t>
+            </a:r>
+            <a:r>
+              <a:rPr lang="en-US" dirty="0" err="1" smtClean="0"/>
+              <a:t>rema</a:t>
+            </a:r>
+            <a:r>
+              <a:rPr lang="en-US" dirty="0" smtClean="0"/>
+              <a:t> with index, removing </a:t>
+            </a:r>
+            <a:r>
+              <a:rPr lang="en-US" dirty="0" err="1" smtClean="0"/>
+              <a:t>egoa</a:t>
+            </a:r>
+            <a:r>
+              <a:rPr lang="en-US" dirty="0" smtClean="0"/>
+              <a:t>?</a:t>
+            </a:r>
+          </a:p>
+          <a:p>
+            <a:r>
+              <a:rPr lang="en-US" dirty="0" smtClean="0"/>
+              <a:t>IPHC: show map for 2024 index, discuss issues with data</a:t>
+            </a:r>
+          </a:p>
+        </p:txBody>
+      </p:sp>
+    </p:spTree>
+    <p:extLst>
+      <p:ext uri="{BB962C8B-B14F-4D97-AF65-F5344CB8AC3E}">
+        <p14:creationId xmlns:p14="http://schemas.microsoft.com/office/powerpoint/2010/main" val="2671101252"/>
+      </p:ext>
+    </p:extLst>
+  </p:cSld>
+  <p:clrMapOvr>
+    <a:masterClrMapping/>
+  </p:clrMapOvr>
+</p:sld>
+</file>
+
+<file path=ppt/slides/slide24.xml><?xml version="1.0" encoding="utf-8"?>
+<p:sld xmlns:a="http://schemas.openxmlformats.org/drawingml/2006/main" xmlns:r="http://schemas.openxmlformats.org/officeDocument/2006/relationships" xmlns:p="http://schemas.openxmlformats.org/presentationml/2006/main">
+  <p:cSld>
+    <p:spTree>
+      <p:nvGrpSpPr>
+        <p:cNvPr id="1" name=""/>
+        <p:cNvGrpSpPr/>
+        <p:nvPr/>
+      </p:nvGrpSpPr>
+      <p:grpSpPr>
+        <a:xfrm>
+          <a:off x="0" y="0"/>
+          <a:ext cx="0" cy="0"/>
+          <a:chOff x="0" y="0"/>
+          <a:chExt cx="0" cy="0"/>
+        </a:xfrm>
+      </p:grpSpPr>
+      <p:sp>
+        <p:nvSpPr>
+          <p:cNvPr id="4" name="Title 3"/>
+          <p:cNvSpPr>
+            <a:spLocks noGrp="1"/>
+          </p:cNvSpPr>
+          <p:nvPr>
+            <p:ph type="title"/>
+          </p:nvPr>
+        </p:nvSpPr>
+        <p:spPr/>
+        <p:txBody>
+          <a:bodyPr/>
+          <a:lstStyle/>
+          <a:p>
+            <a:r>
+              <a:rPr lang="en-US" dirty="0" err="1" smtClean="0"/>
+              <a:t>Apport</a:t>
+            </a:r>
+            <a:r>
+              <a:rPr lang="en-US" dirty="0" smtClean="0"/>
+              <a:t> </a:t>
+            </a:r>
+            <a:r>
+              <a:rPr lang="en-US" dirty="0" err="1" smtClean="0"/>
+              <a:t>inv</a:t>
+            </a:r>
+            <a:endParaRPr lang="en-US" dirty="0"/>
+          </a:p>
+        </p:txBody>
+      </p:sp>
+      <p:sp>
+        <p:nvSpPr>
+          <p:cNvPr id="5" name="Content Placeholder 4"/>
+          <p:cNvSpPr>
+            <a:spLocks noGrp="1"/>
+          </p:cNvSpPr>
+          <p:nvPr>
+            <p:ph idx="1"/>
+          </p:nvPr>
+        </p:nvSpPr>
+        <p:spPr/>
+        <p:txBody>
+          <a:bodyPr/>
+          <a:lstStyle/>
+          <a:p>
+            <a:r>
+              <a:rPr lang="en-US" dirty="0" smtClean="0"/>
+              <a:t>Reminder: LLS used in assessment as additional </a:t>
+            </a:r>
+            <a:r>
+              <a:rPr lang="en-US" dirty="0" err="1" smtClean="0"/>
+              <a:t>pop’n</a:t>
+            </a:r>
+            <a:r>
+              <a:rPr lang="en-US" dirty="0" smtClean="0"/>
+              <a:t> index, but not used in apportionment</a:t>
+            </a:r>
+          </a:p>
+          <a:p>
+            <a:pPr lvl="1"/>
+            <a:r>
+              <a:rPr lang="en-US" dirty="0" smtClean="0"/>
+              <a:t>And, includes an environmental link, where in warmer temps at depth cod move deeper and are more available to the LLS than in colder years</a:t>
+            </a:r>
+          </a:p>
+          <a:p>
+            <a:r>
+              <a:rPr lang="en-US" dirty="0" smtClean="0"/>
+              <a:t>Including it in apportionment has been talked about for some time </a:t>
+            </a:r>
+          </a:p>
+          <a:p>
+            <a:r>
+              <a:rPr lang="en-US" dirty="0" smtClean="0"/>
+              <a:t>Other, ‘tracked’, </a:t>
+            </a:r>
+            <a:r>
+              <a:rPr lang="en-US" dirty="0" err="1" smtClean="0"/>
+              <a:t>pop’n</a:t>
+            </a:r>
+            <a:r>
+              <a:rPr lang="en-US" dirty="0" smtClean="0"/>
+              <a:t> indices include IPHC FISS and ADF&amp;G large mesh trawl survey</a:t>
+            </a:r>
+          </a:p>
+        </p:txBody>
+      </p:sp>
+    </p:spTree>
+    <p:extLst>
+      <p:ext uri="{BB962C8B-B14F-4D97-AF65-F5344CB8AC3E}">
+        <p14:creationId xmlns:p14="http://schemas.microsoft.com/office/powerpoint/2010/main" val="1209424533"/>
+      </p:ext>
+    </p:extLst>
+  </p:cSld>
+  <p:clrMapOvr>
+    <a:masterClrMapping/>
+  </p:clrMapOvr>
+</p:sld>
+</file>
+
+<file path=ppt/slides/slide25.xml><?xml version="1.0" encoding="utf-8"?>
+<p:sld xmlns:a="http://schemas.openxmlformats.org/drawingml/2006/main" xmlns:r="http://schemas.openxmlformats.org/officeDocument/2006/relationships" xmlns:p="http://schemas.openxmlformats.org/presentationml/2006/main">
+  <p:cSld>
+    <p:spTree>
+      <p:nvGrpSpPr>
+        <p:cNvPr id="1" name=""/>
+        <p:cNvGrpSpPr/>
+        <p:nvPr/>
+      </p:nvGrpSpPr>
+      <p:grpSpPr>
+        <a:xfrm>
+          <a:off x="0" y="0"/>
+          <a:ext cx="0" cy="0"/>
+          <a:chOff x="0" y="0"/>
+          <a:chExt cx="0" cy="0"/>
+        </a:xfrm>
+      </p:grpSpPr>
+      <p:sp>
+        <p:nvSpPr>
+          <p:cNvPr id="4" name="Title 3"/>
+          <p:cNvSpPr>
+            <a:spLocks noGrp="1"/>
+          </p:cNvSpPr>
+          <p:nvPr>
+            <p:ph type="title"/>
+          </p:nvPr>
+        </p:nvSpPr>
+        <p:spPr/>
+        <p:txBody>
+          <a:bodyPr/>
+          <a:lstStyle/>
+          <a:p>
+            <a:r>
+              <a:rPr lang="en-US" dirty="0" err="1" smtClean="0"/>
+              <a:t>Apport</a:t>
+            </a:r>
+            <a:r>
+              <a:rPr lang="en-US" dirty="0" smtClean="0"/>
+              <a:t> </a:t>
+            </a:r>
+            <a:r>
+              <a:rPr lang="en-US" dirty="0" err="1" smtClean="0"/>
+              <a:t>inv</a:t>
+            </a:r>
+            <a:endParaRPr lang="en-US" dirty="0"/>
+          </a:p>
+        </p:txBody>
+      </p:sp>
+      <p:sp>
+        <p:nvSpPr>
+          <p:cNvPr id="5" name="Content Placeholder 4"/>
+          <p:cNvSpPr>
+            <a:spLocks noGrp="1"/>
+          </p:cNvSpPr>
+          <p:nvPr>
+            <p:ph idx="1"/>
+          </p:nvPr>
+        </p:nvSpPr>
+        <p:spPr/>
+        <p:txBody>
+          <a:bodyPr/>
+          <a:lstStyle/>
+          <a:p>
+            <a:r>
+              <a:rPr lang="en-US" dirty="0" smtClean="0"/>
+              <a:t>Here, look at including LLS into </a:t>
+            </a:r>
+            <a:r>
+              <a:rPr lang="en-US" dirty="0" err="1" smtClean="0"/>
+              <a:t>rema</a:t>
+            </a:r>
+            <a:r>
+              <a:rPr lang="en-US" dirty="0" smtClean="0"/>
+              <a:t> as an additional index to be used for apportionment</a:t>
+            </a:r>
+          </a:p>
+          <a:p>
+            <a:r>
+              <a:rPr lang="en-US" dirty="0" smtClean="0"/>
+              <a:t>Step-wise approach:</a:t>
+            </a:r>
+          </a:p>
+          <a:p>
+            <a:pPr lvl="1"/>
+            <a:r>
+              <a:rPr lang="en-US" dirty="0" smtClean="0"/>
+              <a:t>First, look at AIC ‘preferred’ model when it comes to Process Error (PE) and index scaling (q) parameters</a:t>
+            </a:r>
+          </a:p>
+          <a:p>
+            <a:pPr lvl="1"/>
+            <a:r>
+              <a:rPr lang="en-US" dirty="0" smtClean="0"/>
+              <a:t>Next, with ‘preferred’ models investigate estimating additional observation error</a:t>
+            </a:r>
+          </a:p>
+        </p:txBody>
+      </p:sp>
+    </p:spTree>
+    <p:extLst>
+      <p:ext uri="{BB962C8B-B14F-4D97-AF65-F5344CB8AC3E}">
+        <p14:creationId xmlns:p14="http://schemas.microsoft.com/office/powerpoint/2010/main" val="1936284340"/>
+      </p:ext>
+    </p:extLst>
+  </p:cSld>
+  <p:clrMapOvr>
+    <a:masterClrMapping/>
+  </p:clrMapOvr>
+</p:sld>
+</file>
+
+<file path=ppt/slides/slide26.xml><?xml version="1.0" encoding="utf-8"?>
+<p:sld xmlns:a="http://schemas.openxmlformats.org/drawingml/2006/main" xmlns:r="http://schemas.openxmlformats.org/officeDocument/2006/relationships" xmlns:p="http://schemas.openxmlformats.org/presentationml/2006/main">
+  <p:cSld>
+    <p:spTree>
+      <p:nvGrpSpPr>
+        <p:cNvPr id="1" name=""/>
+        <p:cNvGrpSpPr/>
+        <p:nvPr/>
+      </p:nvGrpSpPr>
+      <p:grpSpPr>
+        <a:xfrm>
+          <a:off x="0" y="0"/>
+          <a:ext cx="0" cy="0"/>
+          <a:chOff x="0" y="0"/>
+          <a:chExt cx="0" cy="0"/>
+        </a:xfrm>
+      </p:grpSpPr>
+      <p:sp>
+        <p:nvSpPr>
+          <p:cNvPr id="4" name="Title 3"/>
+          <p:cNvSpPr>
+            <a:spLocks noGrp="1"/>
+          </p:cNvSpPr>
+          <p:nvPr>
+            <p:ph type="title"/>
+          </p:nvPr>
+        </p:nvSpPr>
+        <p:spPr/>
+        <p:txBody>
+          <a:bodyPr/>
+          <a:lstStyle/>
+          <a:p>
+            <a:r>
               <a:rPr lang="en-US" dirty="0" err="1" smtClean="0"/>
               <a:t>Apport</a:t>
             </a:r>
@@ -3970,7 +5062,7 @@
 </p:sld>
 </file>
 
-<file path=ppt/slides/slide17.xml><?xml version="1.0" encoding="utf-8"?>
+<file path=ppt/slides/slide27.xml><?xml version="1.0" encoding="utf-8"?>
 <p:sld xmlns:a="http://schemas.openxmlformats.org/drawingml/2006/main" xmlns:r="http://schemas.openxmlformats.org/officeDocument/2006/relationships" xmlns:p="http://schemas.openxmlformats.org/presentationml/2006/main">
   <p:cSld>
     <p:spTree>
@@ -4106,7 +5198,7 @@
 </p:sld>
 </file>
 
-<file path=ppt/slides/slide18.xml><?xml version="1.0" encoding="utf-8"?>
+<file path=ppt/slides/slide28.xml><?xml version="1.0" encoding="utf-8"?>
 <p:sld xmlns:a="http://schemas.openxmlformats.org/drawingml/2006/main" xmlns:r="http://schemas.openxmlformats.org/officeDocument/2006/relationships" xmlns:p="http://schemas.openxmlformats.org/presentationml/2006/main">
   <p:cSld>
     <p:spTree>
@@ -4222,7 +5314,7 @@
 </p:sld>
 </file>
 
-<file path=ppt/slides/slide19.xml><?xml version="1.0" encoding="utf-8"?>
+<file path=ppt/slides/slide29.xml><?xml version="1.0" encoding="utf-8"?>
 <p:sld xmlns:a="http://schemas.openxmlformats.org/drawingml/2006/main" xmlns:r="http://schemas.openxmlformats.org/officeDocument/2006/relationships" xmlns:p="http://schemas.openxmlformats.org/presentationml/2006/main">
   <p:cSld>
     <p:spTree>
@@ -4393,7 +5485,7 @@
 </p:sld>
 </file>
 
-<file path=ppt/slides/slide2.xml><?xml version="1.0" encoding="utf-8"?>
+<file path=ppt/slides/slide3.xml><?xml version="1.0" encoding="utf-8"?>
 <p:sld xmlns:a="http://schemas.openxmlformats.org/drawingml/2006/main" xmlns:r="http://schemas.openxmlformats.org/officeDocument/2006/relationships" xmlns:p="http://schemas.openxmlformats.org/presentationml/2006/main">
   <p:cSld>
     <p:spTree>
@@ -4427,7 +5519,7 @@
           <a:p>
             <a:r>
               <a:rPr lang="en-US" dirty="0" smtClean="0"/>
-              <a:t>Base data differences</a:t>
+              <a:t>Base data updates</a:t>
             </a:r>
             <a:endParaRPr lang="en-US" dirty="0"/>
           </a:p>
@@ -4449,17 +5541,25 @@
           <a:lstStyle/>
           <a:p>
             <a:r>
-              <a:rPr lang="en-US" dirty="0" smtClean="0"/>
-              <a:t>Plot of base model vs data update model</a:t>
-            </a:r>
-            <a:endParaRPr lang="en-US" dirty="0"/>
+              <a:rPr lang="en-US" b="1" dirty="0" smtClean="0">
+                <a:solidFill>
+                  <a:srgbClr val="FF0000"/>
+                </a:solidFill>
+              </a:rPr>
+              <a:t>Ageing error updated</a:t>
+            </a:r>
+            <a:endParaRPr lang="en-US" b="1" dirty="0">
+              <a:solidFill>
+                <a:srgbClr val="FF0000"/>
+              </a:solidFill>
+            </a:endParaRPr>
           </a:p>
         </p:txBody>
       </p:sp>
     </p:spTree>
     <p:extLst>
       <p:ext uri="{BB962C8B-B14F-4D97-AF65-F5344CB8AC3E}">
-        <p14:creationId xmlns:p14="http://schemas.microsoft.com/office/powerpoint/2010/main" val="3238081657"/>
+        <p14:creationId xmlns:p14="http://schemas.microsoft.com/office/powerpoint/2010/main" val="1301354348"/>
       </p:ext>
     </p:extLst>
   </p:cSld>
@@ -4469,7 +5569,7 @@
 </p:sld>
 </file>
 
-<file path=ppt/slides/slide20.xml><?xml version="1.0" encoding="utf-8"?>
+<file path=ppt/slides/slide30.xml><?xml version="1.0" encoding="utf-8"?>
 <p:sld xmlns:a="http://schemas.openxmlformats.org/drawingml/2006/main" xmlns:r="http://schemas.openxmlformats.org/officeDocument/2006/relationships" xmlns:p="http://schemas.openxmlformats.org/presentationml/2006/main">
   <p:cSld>
     <p:spTree>
@@ -4645,7 +5745,7 @@
 </p:sld>
 </file>
 
-<file path=ppt/slides/slide21.xml><?xml version="1.0" encoding="utf-8"?>
+<file path=ppt/slides/slide31.xml><?xml version="1.0" encoding="utf-8"?>
 <p:sld xmlns:a="http://schemas.openxmlformats.org/drawingml/2006/main" xmlns:r="http://schemas.openxmlformats.org/officeDocument/2006/relationships" xmlns:p="http://schemas.openxmlformats.org/presentationml/2006/main">
   <p:cSld>
     <p:spTree>
@@ -4769,7 +5869,7 @@
 </p:sld>
 </file>
 
-<file path=ppt/slides/slide22.xml><?xml version="1.0" encoding="utf-8"?>
+<file path=ppt/slides/slide32.xml><?xml version="1.0" encoding="utf-8"?>
 <p:sld xmlns:a="http://schemas.openxmlformats.org/drawingml/2006/main" xmlns:r="http://schemas.openxmlformats.org/officeDocument/2006/relationships" xmlns:p="http://schemas.openxmlformats.org/presentationml/2006/main">
   <p:cSld>
     <p:spTree>
@@ -4893,7 +5993,7 @@
 </p:sld>
 </file>
 
-<file path=ppt/slides/slide23.xml><?xml version="1.0" encoding="utf-8"?>
+<file path=ppt/slides/slide33.xml><?xml version="1.0" encoding="utf-8"?>
 <p:sld xmlns:a="http://schemas.openxmlformats.org/drawingml/2006/main" xmlns:r="http://schemas.openxmlformats.org/officeDocument/2006/relationships" xmlns:p="http://schemas.openxmlformats.org/presentationml/2006/main">
   <p:cSld>
     <p:spTree>
@@ -5041,7 +6141,7 @@
 </p:sld>
 </file>
 
-<file path=ppt/slides/slide24.xml><?xml version="1.0" encoding="utf-8"?>
+<file path=ppt/slides/slide34.xml><?xml version="1.0" encoding="utf-8"?>
 <p:sld xmlns:a="http://schemas.openxmlformats.org/drawingml/2006/main" xmlns:r="http://schemas.openxmlformats.org/officeDocument/2006/relationships" xmlns:p="http://schemas.openxmlformats.org/presentationml/2006/main">
   <p:cSld>
     <p:spTree>
@@ -5189,7 +6289,7 @@
 </p:sld>
 </file>
 
-<file path=ppt/slides/slide25.xml><?xml version="1.0" encoding="utf-8"?>
+<file path=ppt/slides/slide35.xml><?xml version="1.0" encoding="utf-8"?>
 <p:sld xmlns:a="http://schemas.openxmlformats.org/drawingml/2006/main" xmlns:r="http://schemas.openxmlformats.org/officeDocument/2006/relationships" xmlns:p="http://schemas.openxmlformats.org/presentationml/2006/main">
   <p:cSld>
     <p:spTree>
@@ -5481,7 +6581,7 @@
 </p:sld>
 </file>
 
-<file path=ppt/slides/slide26.xml><?xml version="1.0" encoding="utf-8"?>
+<file path=ppt/slides/slide36.xml><?xml version="1.0" encoding="utf-8"?>
 <p:sld xmlns:a="http://schemas.openxmlformats.org/drawingml/2006/main" xmlns:r="http://schemas.openxmlformats.org/officeDocument/2006/relationships" xmlns:p="http://schemas.openxmlformats.org/presentationml/2006/main">
   <p:cSld>
     <p:spTree>
@@ -5678,90 +6778,6 @@
 </p:sld>
 </file>
 
-<file path=ppt/slides/slide3.xml><?xml version="1.0" encoding="utf-8"?>
-<p:sld xmlns:a="http://schemas.openxmlformats.org/drawingml/2006/main" xmlns:r="http://schemas.openxmlformats.org/officeDocument/2006/relationships" xmlns:p="http://schemas.openxmlformats.org/presentationml/2006/main">
-  <p:cSld>
-    <p:spTree>
-      <p:nvGrpSpPr>
-        <p:cNvPr id="1" name=""/>
-        <p:cNvGrpSpPr/>
-        <p:nvPr/>
-      </p:nvGrpSpPr>
-      <p:grpSpPr>
-        <a:xfrm>
-          <a:off x="0" y="0"/>
-          <a:ext cx="0" cy="0"/>
-          <a:chOff x="0" y="0"/>
-          <a:chExt cx="0" cy="0"/>
-        </a:xfrm>
-      </p:grpSpPr>
-      <p:sp>
-        <p:nvSpPr>
-          <p:cNvPr id="4" name="Title 3"/>
-          <p:cNvSpPr>
-            <a:spLocks noGrp="1"/>
-          </p:cNvSpPr>
-          <p:nvPr>
-            <p:ph type="title"/>
-          </p:nvPr>
-        </p:nvSpPr>
-        <p:spPr/>
-        <p:txBody>
-          <a:bodyPr/>
-          <a:lstStyle/>
-          <a:p>
-            <a:r>
-              <a:rPr lang="en-US" dirty="0" smtClean="0"/>
-              <a:t>Base data updates</a:t>
-            </a:r>
-            <a:endParaRPr lang="en-US" dirty="0"/>
-          </a:p>
-        </p:txBody>
-      </p:sp>
-      <p:sp>
-        <p:nvSpPr>
-          <p:cNvPr id="5" name="Content Placeholder 4"/>
-          <p:cNvSpPr>
-            <a:spLocks noGrp="1"/>
-          </p:cNvSpPr>
-          <p:nvPr>
-            <p:ph idx="1"/>
-          </p:nvPr>
-        </p:nvSpPr>
-        <p:spPr/>
-        <p:txBody>
-          <a:bodyPr/>
-          <a:lstStyle/>
-          <a:p>
-            <a:r>
-              <a:rPr lang="en-US" b="1" dirty="0" smtClean="0">
-                <a:solidFill>
-                  <a:srgbClr val="FF0000"/>
-                </a:solidFill>
-              </a:rPr>
-              <a:t>Ageing error updated</a:t>
-            </a:r>
-            <a:endParaRPr lang="en-US" b="1" dirty="0">
-              <a:solidFill>
-                <a:srgbClr val="FF0000"/>
-              </a:solidFill>
-            </a:endParaRPr>
-          </a:p>
-        </p:txBody>
-      </p:sp>
-    </p:spTree>
-    <p:extLst>
-      <p:ext uri="{BB962C8B-B14F-4D97-AF65-F5344CB8AC3E}">
-        <p14:creationId xmlns:p14="http://schemas.microsoft.com/office/powerpoint/2010/main" val="1301354348"/>
-      </p:ext>
-    </p:extLst>
-  </p:cSld>
-  <p:clrMapOvr>
-    <a:masterClrMapping/>
-  </p:clrMapOvr>
-</p:sld>
-</file>
-
 <file path=ppt/slides/slide4.xml><?xml version="1.0" encoding="utf-8"?>
 <p:sld xmlns:a="http://schemas.openxmlformats.org/drawingml/2006/main" xmlns:r="http://schemas.openxmlformats.org/officeDocument/2006/relationships" xmlns:p="http://schemas.openxmlformats.org/presentationml/2006/main">
   <p:cSld>
@@ -5899,11 +6915,7 @@
           <a:p>
             <a:r>
               <a:rPr lang="en-US" dirty="0" smtClean="0"/>
-              <a:t>Post-91 data filtering: &gt;10 per haul in fed </a:t>
-            </a:r>
-            <a:r>
-              <a:rPr lang="en-US" dirty="0" smtClean="0"/>
-              <a:t>data</a:t>
+              <a:t>Post-91 data filtering: &gt;10 per haul in fed data</a:t>
             </a:r>
           </a:p>
           <a:p>
@@ -5911,7 +6923,6 @@
               <a:rPr lang="en-US" dirty="0" smtClean="0"/>
               <a:t>Proportion of hauls removed:</a:t>
             </a:r>
-            <a:endParaRPr lang="en-US" dirty="0" smtClean="0"/>
           </a:p>
         </p:txBody>
       </p:sp>
@@ -7918,15 +8929,7 @@
           <a:p>
             <a:r>
               <a:rPr lang="en-US" dirty="0" smtClean="0"/>
-              <a:t>State </a:t>
-            </a:r>
-            <a:r>
-              <a:rPr lang="en-US" dirty="0" smtClean="0"/>
-              <a:t>data used to ‘fill-in’ missing fed </a:t>
-            </a:r>
-            <a:r>
-              <a:rPr lang="en-US" dirty="0" smtClean="0"/>
-              <a:t>data:</a:t>
+              <a:t>State data used to ‘fill-in’ missing fed data:</a:t>
             </a:r>
           </a:p>
           <a:p>
@@ -7939,15 +8942,7 @@
             <a:pPr lvl="1"/>
             <a:r>
               <a:rPr lang="en-US" dirty="0" smtClean="0"/>
-              <a:t>Ste</a:t>
-            </a:r>
-            <a:r>
-              <a:rPr lang="en-US" dirty="0" smtClean="0"/>
-              <a:t>p 1:</a:t>
-            </a:r>
-            <a:r>
-              <a:rPr lang="en-US" dirty="0" smtClean="0"/>
-              <a:t> uses state data if has more than fed data</a:t>
+              <a:t>Step 1: uses state data if has more than fed data</a:t>
             </a:r>
           </a:p>
           <a:p>
@@ -7962,7 +8957,6 @@
               <a:rPr lang="en-US" dirty="0" smtClean="0"/>
               <a:t>Amount of state data not used:</a:t>
             </a:r>
-            <a:endParaRPr lang="en-US" dirty="0" smtClean="0"/>
           </a:p>
         </p:txBody>
       </p:sp>
@@ -9423,26 +10417,14 @@
           <a:p>
             <a:r>
               <a:rPr lang="en-US" dirty="0" smtClean="0"/>
-              <a:t>Post-91 data filtering: &gt;10 per haul in fed </a:t>
-            </a:r>
-            <a:r>
-              <a:rPr lang="en-US" dirty="0" smtClean="0"/>
-              <a:t>data</a:t>
+              <a:t>Post-91 data filtering: &gt;10 per haul in fed data</a:t>
             </a:r>
           </a:p>
           <a:p>
             <a:pPr lvl="1"/>
             <a:r>
               <a:rPr lang="en-US" dirty="0" smtClean="0"/>
-              <a:t>Propose</a:t>
-            </a:r>
-            <a:r>
-              <a:rPr lang="en-US" dirty="0" smtClean="0"/>
-              <a:t>: </a:t>
-            </a:r>
-            <a:r>
-              <a:rPr lang="en-US" dirty="0" smtClean="0"/>
-              <a:t>remove filter and include all data</a:t>
+              <a:t>Propose: remove filter and include all data</a:t>
             </a:r>
           </a:p>
           <a:p>
@@ -9455,49 +10437,21 @@
             <a:pPr lvl="1"/>
             <a:r>
               <a:rPr lang="en-US" dirty="0" smtClean="0"/>
-              <a:t>Propose</a:t>
-            </a:r>
-            <a:r>
-              <a:rPr lang="en-US" dirty="0" smtClean="0"/>
-              <a:t>: </a:t>
-            </a:r>
-            <a:r>
-              <a:rPr lang="en-US" dirty="0" smtClean="0"/>
-              <a:t>rather than ‘fill-in’, merge with fed data</a:t>
+              <a:t>Propose: rather than ‘fill-in’, merge with fed data</a:t>
             </a:r>
           </a:p>
           <a:p>
             <a:pPr lvl="1"/>
             <a:r>
               <a:rPr lang="en-US" dirty="0" smtClean="0"/>
-              <a:t>Requires restructure of how fed </a:t>
-            </a:r>
-            <a:r>
-              <a:rPr lang="en-US" dirty="0" smtClean="0"/>
-              <a:t>length </a:t>
-            </a:r>
-            <a:r>
-              <a:rPr lang="en-US" dirty="0" smtClean="0"/>
-              <a:t>comp data computed</a:t>
+              <a:t>Requires restructure of how fed length comp data computed</a:t>
             </a:r>
           </a:p>
           <a:p>
             <a:pPr lvl="2"/>
             <a:r>
               <a:rPr lang="en-US" dirty="0" smtClean="0"/>
-              <a:t>Fed </a:t>
-            </a:r>
-            <a:r>
-              <a:rPr lang="en-US" dirty="0" smtClean="0"/>
-              <a:t>length </a:t>
-            </a:r>
-            <a:r>
-              <a:rPr lang="en-US" dirty="0" smtClean="0"/>
-              <a:t>comp computed at week-area-gear level, difference would require to aggregate at trimester-area-gear </a:t>
-            </a:r>
-            <a:r>
-              <a:rPr lang="en-US" dirty="0" smtClean="0"/>
-              <a:t>level</a:t>
+              <a:t>Fed length comp computed at week-area-gear level, difference would require to aggregate at trimester-area-gear level</a:t>
             </a:r>
           </a:p>
           <a:p>
@@ -9506,7 +10460,6 @@
               <a:rPr lang="en-US" dirty="0" smtClean="0"/>
               <a:t>Propose: simplify and aggregate at trimester-area-gear level</a:t>
             </a:r>
-            <a:endParaRPr lang="en-US" dirty="0" smtClean="0"/>
           </a:p>
         </p:txBody>
       </p:sp>
@@ -9586,7 +10539,6 @@
               <a:rPr lang="en-US" dirty="0" smtClean="0"/>
               <a:t>Aggregated comps:</a:t>
             </a:r>
-            <a:endParaRPr lang="en-US" dirty="0" smtClean="0"/>
           </a:p>
         </p:txBody>
       </p:sp>
@@ -9696,7 +10648,6 @@
               <a:rPr lang="en-US" dirty="0" smtClean="0"/>
               <a:t>Trawl comps:</a:t>
             </a:r>
-            <a:endParaRPr lang="en-US" dirty="0" smtClean="0"/>
           </a:p>
         </p:txBody>
       </p:sp>

</xml_diff>

<commit_message>
add pot '22 figure
</commit_message>
<xml_diff>
--- a/2024/presentation/sept_pt/sept_pt_notes.pptx
+++ b/2024/presentation/sept_pt/sept_pt_notes.pptx
@@ -16,30 +16,31 @@
     <p:sldId id="279" r:id="rId10"/>
     <p:sldId id="280" r:id="rId11"/>
     <p:sldId id="281" r:id="rId12"/>
-    <p:sldId id="282" r:id="rId13"/>
-    <p:sldId id="283" r:id="rId14"/>
-    <p:sldId id="284" r:id="rId15"/>
-    <p:sldId id="285" r:id="rId16"/>
-    <p:sldId id="286" r:id="rId17"/>
-    <p:sldId id="287" r:id="rId18"/>
-    <p:sldId id="288" r:id="rId19"/>
-    <p:sldId id="289" r:id="rId20"/>
-    <p:sldId id="290" r:id="rId21"/>
-    <p:sldId id="291" r:id="rId22"/>
-    <p:sldId id="259" r:id="rId23"/>
-    <p:sldId id="263" r:id="rId24"/>
-    <p:sldId id="264" r:id="rId25"/>
-    <p:sldId id="265" r:id="rId26"/>
-    <p:sldId id="266" r:id="rId27"/>
-    <p:sldId id="267" r:id="rId28"/>
-    <p:sldId id="268" r:id="rId29"/>
-    <p:sldId id="269" r:id="rId30"/>
-    <p:sldId id="270" r:id="rId31"/>
-    <p:sldId id="271" r:id="rId32"/>
-    <p:sldId id="272" r:id="rId33"/>
-    <p:sldId id="273" r:id="rId34"/>
-    <p:sldId id="274" r:id="rId35"/>
-    <p:sldId id="275" r:id="rId36"/>
+    <p:sldId id="292" r:id="rId13"/>
+    <p:sldId id="282" r:id="rId14"/>
+    <p:sldId id="283" r:id="rId15"/>
+    <p:sldId id="284" r:id="rId16"/>
+    <p:sldId id="285" r:id="rId17"/>
+    <p:sldId id="286" r:id="rId18"/>
+    <p:sldId id="287" r:id="rId19"/>
+    <p:sldId id="288" r:id="rId20"/>
+    <p:sldId id="289" r:id="rId21"/>
+    <p:sldId id="290" r:id="rId22"/>
+    <p:sldId id="291" r:id="rId23"/>
+    <p:sldId id="259" r:id="rId24"/>
+    <p:sldId id="263" r:id="rId25"/>
+    <p:sldId id="264" r:id="rId26"/>
+    <p:sldId id="265" r:id="rId27"/>
+    <p:sldId id="266" r:id="rId28"/>
+    <p:sldId id="267" r:id="rId29"/>
+    <p:sldId id="268" r:id="rId30"/>
+    <p:sldId id="269" r:id="rId31"/>
+    <p:sldId id="270" r:id="rId32"/>
+    <p:sldId id="271" r:id="rId33"/>
+    <p:sldId id="272" r:id="rId34"/>
+    <p:sldId id="273" r:id="rId35"/>
+    <p:sldId id="274" r:id="rId36"/>
+    <p:sldId id="275" r:id="rId37"/>
   </p:sldIdLst>
   <p:sldSz cx="12192000" cy="6858000"/>
   <p:notesSz cx="6858000" cy="9144000"/>
@@ -3394,29 +3395,156 @@
           <a:p>
             <a:r>
               <a:rPr lang="en-US" dirty="0" smtClean="0"/>
-              <a:t>Overall,</a:t>
-            </a:r>
-            <a:r>
-              <a:rPr lang="en-US" dirty="0"/>
-              <a:t> </a:t>
-            </a:r>
-            <a:r>
-              <a:rPr lang="en-US" dirty="0" smtClean="0"/>
-              <a:t>removing filters, aggregating at trimester-area-gear level and merging state data helps to smooth out much of the variability in fishery length comps</a:t>
-            </a:r>
-          </a:p>
-          <a:p>
-            <a:r>
-              <a:rPr lang="en-US" dirty="0" smtClean="0"/>
-              <a:t>Proposal: add this data treatment as alternative model ###</a:t>
-            </a:r>
+              <a:t>Pot comps:</a:t>
+            </a:r>
+          </a:p>
+        </p:txBody>
+      </p:sp>
+      <p:pic>
+        <p:nvPicPr>
+          <p:cNvPr id="6" name="Picture 5"/>
+          <p:cNvPicPr>
+            <a:picLocks noChangeAspect="1"/>
+          </p:cNvPicPr>
+          <p:nvPr/>
+        </p:nvPicPr>
+        <p:blipFill>
+          <a:blip r:embed="rId2" cstate="print">
+            <a:extLst>
+              <a:ext uri="{28A0092B-C50C-407E-A947-70E740481C1C}">
+                <a14:useLocalDpi xmlns:a14="http://schemas.microsoft.com/office/drawing/2010/main" val="0"/>
+              </a:ext>
+            </a:extLst>
+          </a:blip>
+          <a:stretch>
+            <a:fillRect/>
+          </a:stretch>
+        </p:blipFill>
+        <p:spPr>
+          <a:xfrm>
+            <a:off x="4510147" y="457062"/>
+            <a:ext cx="6400938" cy="6400938"/>
+          </a:xfrm>
+          <a:prstGeom prst="rect">
+            <a:avLst/>
+          </a:prstGeom>
+        </p:spPr>
+      </p:pic>
+      <p:pic>
+        <p:nvPicPr>
+          <p:cNvPr id="7" name="Picture 6"/>
+          <p:cNvPicPr>
+            <a:picLocks noChangeAspect="1"/>
+          </p:cNvPicPr>
+          <p:nvPr/>
+        </p:nvPicPr>
+        <p:blipFill>
+          <a:blip r:embed="rId3" cstate="print">
+            <a:extLst>
+              <a:ext uri="{28A0092B-C50C-407E-A947-70E740481C1C}">
+                <a14:useLocalDpi xmlns:a14="http://schemas.microsoft.com/office/drawing/2010/main" val="0"/>
+              </a:ext>
+            </a:extLst>
+          </a:blip>
+          <a:stretch>
+            <a:fillRect/>
+          </a:stretch>
+        </p:blipFill>
+        <p:spPr>
+          <a:xfrm>
+            <a:off x="5609838" y="365125"/>
+            <a:ext cx="5173492" cy="5173492"/>
+          </a:xfrm>
+          <a:prstGeom prst="rect">
+            <a:avLst/>
+          </a:prstGeom>
+        </p:spPr>
+      </p:pic>
+      <p:sp>
+        <p:nvSpPr>
+          <p:cNvPr id="8" name="Oval 7"/>
+          <p:cNvSpPr/>
+          <p:nvPr/>
+        </p:nvSpPr>
+        <p:spPr>
+          <a:xfrm>
+            <a:off x="5914768" y="5469924"/>
+            <a:ext cx="1276864" cy="1260390"/>
+          </a:xfrm>
+          <a:prstGeom prst="ellipse">
+            <a:avLst/>
+          </a:prstGeom>
+          <a:noFill/>
+        </p:spPr>
+        <p:style>
+          <a:lnRef idx="2">
+            <a:schemeClr val="accent1">
+              <a:shade val="50000"/>
+            </a:schemeClr>
+          </a:lnRef>
+          <a:fillRef idx="1">
+            <a:schemeClr val="accent1"/>
+          </a:fillRef>
+          <a:effectRef idx="0">
+            <a:schemeClr val="accent1"/>
+          </a:effectRef>
+          <a:fontRef idx="minor">
+            <a:schemeClr val="lt1"/>
+          </a:fontRef>
+        </p:style>
+        <p:txBody>
+          <a:bodyPr rtlCol="0" anchor="ctr"/>
+          <a:lstStyle/>
+          <a:p>
+            <a:pPr algn="ctr"/>
+            <a:endParaRPr lang="en-US"/>
+          </a:p>
+        </p:txBody>
+      </p:sp>
+      <p:sp>
+        <p:nvSpPr>
+          <p:cNvPr id="9" name="Right Arrow 8"/>
+          <p:cNvSpPr/>
+          <p:nvPr/>
+        </p:nvSpPr>
+        <p:spPr>
+          <a:xfrm rot="17580704">
+            <a:off x="6492523" y="4947165"/>
+            <a:ext cx="881448" cy="296562"/>
+          </a:xfrm>
+          <a:prstGeom prst="rightArrow">
+            <a:avLst/>
+          </a:prstGeom>
+        </p:spPr>
+        <p:style>
+          <a:lnRef idx="2">
+            <a:schemeClr val="accent1">
+              <a:shade val="50000"/>
+            </a:schemeClr>
+          </a:lnRef>
+          <a:fillRef idx="1">
+            <a:schemeClr val="accent1"/>
+          </a:fillRef>
+          <a:effectRef idx="0">
+            <a:schemeClr val="accent1"/>
+          </a:effectRef>
+          <a:fontRef idx="minor">
+            <a:schemeClr val="lt1"/>
+          </a:fontRef>
+        </p:style>
+        <p:txBody>
+          <a:bodyPr rtlCol="0" anchor="ctr"/>
+          <a:lstStyle/>
+          <a:p>
+            <a:pPr algn="ctr"/>
+            <a:endParaRPr lang="en-US"/>
           </a:p>
         </p:txBody>
       </p:sp>
     </p:spTree>
     <p:extLst>
       <p:ext uri="{BB962C8B-B14F-4D97-AF65-F5344CB8AC3E}">
-        <p14:creationId xmlns:p14="http://schemas.microsoft.com/office/powerpoint/2010/main" val="1805485079"/>
+        <p14:creationId xmlns:p14="http://schemas.microsoft.com/office/powerpoint/2010/main" val="3596832696"/>
       </p:ext>
     </p:extLst>
   </p:cSld>
@@ -3486,12 +3614,22 @@
           <a:lstStyle/>
           <a:p>
             <a:r>
-              <a:rPr lang="en-US" b="1" dirty="0" smtClean="0">
-                <a:solidFill>
-                  <a:srgbClr val="FF0000"/>
-                </a:solidFill>
-              </a:rPr>
-              <a:t>Plots of new base vs alternative model ##</a:t>
+              <a:rPr lang="en-US" dirty="0" smtClean="0"/>
+              <a:t>Overall,</a:t>
+            </a:r>
+            <a:r>
+              <a:rPr lang="en-US" dirty="0"/>
+              <a:t> </a:t>
+            </a:r>
+            <a:r>
+              <a:rPr lang="en-US" dirty="0" smtClean="0"/>
+              <a:t>removing filters, aggregating at trimester-area-gear level and merging state data helps to smooth out much of the variability in fishery length comps</a:t>
+            </a:r>
+          </a:p>
+          <a:p>
+            <a:r>
+              <a:rPr lang="en-US" dirty="0" smtClean="0"/>
+              <a:t>Proposal: add this data treatment as alternative model ###</a:t>
             </a:r>
           </a:p>
         </p:txBody>
@@ -3499,7 +3637,7 @@
     </p:spTree>
     <p:extLst>
       <p:ext uri="{BB962C8B-B14F-4D97-AF65-F5344CB8AC3E}">
-        <p14:creationId xmlns:p14="http://schemas.microsoft.com/office/powerpoint/2010/main" val="1675813466"/>
+        <p14:creationId xmlns:p14="http://schemas.microsoft.com/office/powerpoint/2010/main" val="1805485079"/>
       </p:ext>
     </p:extLst>
   </p:cSld>
@@ -3569,6 +3707,89 @@
           <a:lstStyle/>
           <a:p>
             <a:r>
+              <a:rPr lang="en-US" b="1" dirty="0" smtClean="0">
+                <a:solidFill>
+                  <a:srgbClr val="FF0000"/>
+                </a:solidFill>
+              </a:rPr>
+              <a:t>Plots of new base vs alternative model ##</a:t>
+            </a:r>
+          </a:p>
+        </p:txBody>
+      </p:sp>
+    </p:spTree>
+    <p:extLst>
+      <p:ext uri="{BB962C8B-B14F-4D97-AF65-F5344CB8AC3E}">
+        <p14:creationId xmlns:p14="http://schemas.microsoft.com/office/powerpoint/2010/main" val="1675813466"/>
+      </p:ext>
+    </p:extLst>
+  </p:cSld>
+  <p:clrMapOvr>
+    <a:masterClrMapping/>
+  </p:clrMapOvr>
+</p:sld>
+</file>
+
+<file path=ppt/slides/slide15.xml><?xml version="1.0" encoding="utf-8"?>
+<p:sld xmlns:a="http://schemas.openxmlformats.org/drawingml/2006/main" xmlns:r="http://schemas.openxmlformats.org/officeDocument/2006/relationships" xmlns:p="http://schemas.openxmlformats.org/presentationml/2006/main">
+  <p:cSld>
+    <p:spTree>
+      <p:nvGrpSpPr>
+        <p:cNvPr id="1" name=""/>
+        <p:cNvGrpSpPr/>
+        <p:nvPr/>
+      </p:nvGrpSpPr>
+      <p:grpSpPr>
+        <a:xfrm>
+          <a:off x="0" y="0"/>
+          <a:ext cx="0" cy="0"/>
+          <a:chOff x="0" y="0"/>
+          <a:chExt cx="0" cy="0"/>
+        </a:xfrm>
+      </p:grpSpPr>
+      <p:sp>
+        <p:nvSpPr>
+          <p:cNvPr id="4" name="Title 3"/>
+          <p:cNvSpPr>
+            <a:spLocks noGrp="1"/>
+          </p:cNvSpPr>
+          <p:nvPr>
+            <p:ph type="title"/>
+          </p:nvPr>
+        </p:nvSpPr>
+        <p:spPr/>
+        <p:txBody>
+          <a:bodyPr/>
+          <a:lstStyle/>
+          <a:p>
+            <a:r>
+              <a:rPr lang="en-US" dirty="0" smtClean="0"/>
+              <a:t>Len comp </a:t>
+            </a:r>
+            <a:r>
+              <a:rPr lang="en-US" dirty="0" err="1" smtClean="0"/>
+              <a:t>inv</a:t>
+            </a:r>
+            <a:endParaRPr lang="en-US" dirty="0"/>
+          </a:p>
+        </p:txBody>
+      </p:sp>
+      <p:sp>
+        <p:nvSpPr>
+          <p:cNvPr id="5" name="Content Placeholder 4"/>
+          <p:cNvSpPr>
+            <a:spLocks noGrp="1"/>
+          </p:cNvSpPr>
+          <p:nvPr>
+            <p:ph idx="1"/>
+          </p:nvPr>
+        </p:nvSpPr>
+        <p:spPr/>
+        <p:txBody>
+          <a:bodyPr/>
+          <a:lstStyle/>
+          <a:p>
+            <a:r>
               <a:rPr lang="en-US" dirty="0" smtClean="0"/>
               <a:t>Overall,</a:t>
             </a:r>
@@ -3614,7 +3835,7 @@
 </p:sld>
 </file>
 
-<file path=ppt/slides/slide15.xml><?xml version="1.0" encoding="utf-8"?>
+<file path=ppt/slides/slide16.xml><?xml version="1.0" encoding="utf-8"?>
 <p:sld xmlns:a="http://schemas.openxmlformats.org/drawingml/2006/main" xmlns:r="http://schemas.openxmlformats.org/officeDocument/2006/relationships" xmlns:p="http://schemas.openxmlformats.org/presentationml/2006/main">
   <p:cSld>
     <p:spTree>
@@ -3723,7 +3944,7 @@
 </p:sld>
 </file>
 
-<file path=ppt/slides/slide16.xml><?xml version="1.0" encoding="utf-8"?>
+<file path=ppt/slides/slide17.xml><?xml version="1.0" encoding="utf-8"?>
 <p:sld xmlns:a="http://schemas.openxmlformats.org/drawingml/2006/main" xmlns:r="http://schemas.openxmlformats.org/officeDocument/2006/relationships" xmlns:p="http://schemas.openxmlformats.org/presentationml/2006/main">
   <p:cSld>
     <p:spTree>
@@ -3832,7 +4053,7 @@
 </p:sld>
 </file>
 
-<file path=ppt/slides/slide17.xml><?xml version="1.0" encoding="utf-8"?>
+<file path=ppt/slides/slide18.xml><?xml version="1.0" encoding="utf-8"?>
 <p:sld xmlns:a="http://schemas.openxmlformats.org/drawingml/2006/main" xmlns:r="http://schemas.openxmlformats.org/officeDocument/2006/relationships" xmlns:p="http://schemas.openxmlformats.org/presentationml/2006/main">
   <p:cSld>
     <p:spTree>
@@ -3941,7 +4162,7 @@
 </p:sld>
 </file>
 
-<file path=ppt/slides/slide18.xml><?xml version="1.0" encoding="utf-8"?>
+<file path=ppt/slides/slide19.xml><?xml version="1.0" encoding="utf-8"?>
 <p:sld xmlns:a="http://schemas.openxmlformats.org/drawingml/2006/main" xmlns:r="http://schemas.openxmlformats.org/officeDocument/2006/relationships" xmlns:p="http://schemas.openxmlformats.org/presentationml/2006/main">
   <p:cSld>
     <p:spTree>
@@ -4050,7 +4271,83 @@
 </p:sld>
 </file>
 
-<file path=ppt/slides/slide19.xml><?xml version="1.0" encoding="utf-8"?>
+<file path=ppt/slides/slide2.xml><?xml version="1.0" encoding="utf-8"?>
+<p:sld xmlns:a="http://schemas.openxmlformats.org/drawingml/2006/main" xmlns:r="http://schemas.openxmlformats.org/officeDocument/2006/relationships" xmlns:p="http://schemas.openxmlformats.org/presentationml/2006/main">
+  <p:cSld>
+    <p:spTree>
+      <p:nvGrpSpPr>
+        <p:cNvPr id="1" name=""/>
+        <p:cNvGrpSpPr/>
+        <p:nvPr/>
+      </p:nvGrpSpPr>
+      <p:grpSpPr>
+        <a:xfrm>
+          <a:off x="0" y="0"/>
+          <a:ext cx="0" cy="0"/>
+          <a:chOff x="0" y="0"/>
+          <a:chExt cx="0" cy="0"/>
+        </a:xfrm>
+      </p:grpSpPr>
+      <p:sp>
+        <p:nvSpPr>
+          <p:cNvPr id="4" name="Title 3"/>
+          <p:cNvSpPr>
+            <a:spLocks noGrp="1"/>
+          </p:cNvSpPr>
+          <p:nvPr>
+            <p:ph type="title"/>
+          </p:nvPr>
+        </p:nvSpPr>
+        <p:spPr/>
+        <p:txBody>
+          <a:bodyPr/>
+          <a:lstStyle/>
+          <a:p>
+            <a:r>
+              <a:rPr lang="en-US" dirty="0" smtClean="0"/>
+              <a:t>Base data differences</a:t>
+            </a:r>
+            <a:endParaRPr lang="en-US" dirty="0"/>
+          </a:p>
+        </p:txBody>
+      </p:sp>
+      <p:sp>
+        <p:nvSpPr>
+          <p:cNvPr id="5" name="Content Placeholder 4"/>
+          <p:cNvSpPr>
+            <a:spLocks noGrp="1"/>
+          </p:cNvSpPr>
+          <p:nvPr>
+            <p:ph idx="1"/>
+          </p:nvPr>
+        </p:nvSpPr>
+        <p:spPr/>
+        <p:txBody>
+          <a:bodyPr/>
+          <a:lstStyle/>
+          <a:p>
+            <a:r>
+              <a:rPr lang="en-US" dirty="0" smtClean="0"/>
+              <a:t>Plot of base model vs data update model</a:t>
+            </a:r>
+            <a:endParaRPr lang="en-US" dirty="0"/>
+          </a:p>
+        </p:txBody>
+      </p:sp>
+    </p:spTree>
+    <p:extLst>
+      <p:ext uri="{BB962C8B-B14F-4D97-AF65-F5344CB8AC3E}">
+        <p14:creationId xmlns:p14="http://schemas.microsoft.com/office/powerpoint/2010/main" val="3238081657"/>
+      </p:ext>
+    </p:extLst>
+  </p:cSld>
+  <p:clrMapOvr>
+    <a:masterClrMapping/>
+  </p:clrMapOvr>
+</p:sld>
+</file>
+
+<file path=ppt/slides/slide20.xml><?xml version="1.0" encoding="utf-8"?>
 <p:sld xmlns:a="http://schemas.openxmlformats.org/drawingml/2006/main" xmlns:r="http://schemas.openxmlformats.org/officeDocument/2006/relationships" xmlns:p="http://schemas.openxmlformats.org/presentationml/2006/main">
   <p:cSld>
     <p:spTree>
@@ -4159,184 +4456,6 @@
 </p:sld>
 </file>
 
-<file path=ppt/slides/slide2.xml><?xml version="1.0" encoding="utf-8"?>
-<p:sld xmlns:a="http://schemas.openxmlformats.org/drawingml/2006/main" xmlns:r="http://schemas.openxmlformats.org/officeDocument/2006/relationships" xmlns:p="http://schemas.openxmlformats.org/presentationml/2006/main">
-  <p:cSld>
-    <p:spTree>
-      <p:nvGrpSpPr>
-        <p:cNvPr id="1" name=""/>
-        <p:cNvGrpSpPr/>
-        <p:nvPr/>
-      </p:nvGrpSpPr>
-      <p:grpSpPr>
-        <a:xfrm>
-          <a:off x="0" y="0"/>
-          <a:ext cx="0" cy="0"/>
-          <a:chOff x="0" y="0"/>
-          <a:chExt cx="0" cy="0"/>
-        </a:xfrm>
-      </p:grpSpPr>
-      <p:sp>
-        <p:nvSpPr>
-          <p:cNvPr id="4" name="Title 3"/>
-          <p:cNvSpPr>
-            <a:spLocks noGrp="1"/>
-          </p:cNvSpPr>
-          <p:nvPr>
-            <p:ph type="title"/>
-          </p:nvPr>
-        </p:nvSpPr>
-        <p:spPr/>
-        <p:txBody>
-          <a:bodyPr/>
-          <a:lstStyle/>
-          <a:p>
-            <a:r>
-              <a:rPr lang="en-US" dirty="0" smtClean="0"/>
-              <a:t>Base data differences</a:t>
-            </a:r>
-            <a:endParaRPr lang="en-US" dirty="0"/>
-          </a:p>
-        </p:txBody>
-      </p:sp>
-      <p:sp>
-        <p:nvSpPr>
-          <p:cNvPr id="5" name="Content Placeholder 4"/>
-          <p:cNvSpPr>
-            <a:spLocks noGrp="1"/>
-          </p:cNvSpPr>
-          <p:nvPr>
-            <p:ph idx="1"/>
-          </p:nvPr>
-        </p:nvSpPr>
-        <p:spPr/>
-        <p:txBody>
-          <a:bodyPr/>
-          <a:lstStyle/>
-          <a:p>
-            <a:r>
-              <a:rPr lang="en-US" dirty="0" smtClean="0"/>
-              <a:t>Plot of base model vs data update model</a:t>
-            </a:r>
-            <a:endParaRPr lang="en-US" dirty="0"/>
-          </a:p>
-        </p:txBody>
-      </p:sp>
-    </p:spTree>
-    <p:extLst>
-      <p:ext uri="{BB962C8B-B14F-4D97-AF65-F5344CB8AC3E}">
-        <p14:creationId xmlns:p14="http://schemas.microsoft.com/office/powerpoint/2010/main" val="3238081657"/>
-      </p:ext>
-    </p:extLst>
-  </p:cSld>
-  <p:clrMapOvr>
-    <a:masterClrMapping/>
-  </p:clrMapOvr>
-</p:sld>
-</file>
-
-<file path=ppt/slides/slide20.xml><?xml version="1.0" encoding="utf-8"?>
-<p:sld xmlns:a="http://schemas.openxmlformats.org/drawingml/2006/main" xmlns:r="http://schemas.openxmlformats.org/officeDocument/2006/relationships" xmlns:p="http://schemas.openxmlformats.org/presentationml/2006/main">
-  <p:cSld>
-    <p:spTree>
-      <p:nvGrpSpPr>
-        <p:cNvPr id="1" name=""/>
-        <p:cNvGrpSpPr/>
-        <p:nvPr/>
-      </p:nvGrpSpPr>
-      <p:grpSpPr>
-        <a:xfrm>
-          <a:off x="0" y="0"/>
-          <a:ext cx="0" cy="0"/>
-          <a:chOff x="0" y="0"/>
-          <a:chExt cx="0" cy="0"/>
-        </a:xfrm>
-      </p:grpSpPr>
-      <p:sp>
-        <p:nvSpPr>
-          <p:cNvPr id="4" name="Title 3"/>
-          <p:cNvSpPr>
-            <a:spLocks noGrp="1"/>
-          </p:cNvSpPr>
-          <p:nvPr>
-            <p:ph type="title"/>
-          </p:nvPr>
-        </p:nvSpPr>
-        <p:spPr/>
-        <p:txBody>
-          <a:bodyPr/>
-          <a:lstStyle/>
-          <a:p>
-            <a:r>
-              <a:rPr lang="en-US" dirty="0" smtClean="0"/>
-              <a:t>Len comp </a:t>
-            </a:r>
-            <a:r>
-              <a:rPr lang="en-US" dirty="0" err="1" smtClean="0"/>
-              <a:t>inv</a:t>
-            </a:r>
-            <a:endParaRPr lang="en-US" dirty="0"/>
-          </a:p>
-        </p:txBody>
-      </p:sp>
-      <p:sp>
-        <p:nvSpPr>
-          <p:cNvPr id="5" name="Content Placeholder 4"/>
-          <p:cNvSpPr>
-            <a:spLocks noGrp="1"/>
-          </p:cNvSpPr>
-          <p:nvPr>
-            <p:ph idx="1"/>
-          </p:nvPr>
-        </p:nvSpPr>
-        <p:spPr/>
-        <p:txBody>
-          <a:bodyPr/>
-          <a:lstStyle/>
-          <a:p>
-            <a:r>
-              <a:rPr lang="en-US" dirty="0" smtClean="0"/>
-              <a:t>Overall,</a:t>
-            </a:r>
-            <a:r>
-              <a:rPr lang="en-US" dirty="0"/>
-              <a:t> </a:t>
-            </a:r>
-            <a:r>
-              <a:rPr lang="en-US" dirty="0" smtClean="0"/>
-              <a:t>removing filters, aggregating at trimester-area-gear level and merging state data helps to smooth out much of the variability in fishery length comps</a:t>
-            </a:r>
-          </a:p>
-          <a:p>
-            <a:r>
-              <a:rPr lang="en-US" dirty="0" smtClean="0"/>
-              <a:t>And, binning to 5 cm removes variability in length composition without loosing important signal</a:t>
-            </a:r>
-          </a:p>
-          <a:p>
-            <a:r>
-              <a:rPr lang="en-US" dirty="0"/>
-              <a:t>Proposal: add this data treatment as alternative model ###</a:t>
-            </a:r>
-          </a:p>
-          <a:p>
-            <a:endParaRPr lang="en-US" dirty="0" smtClean="0"/>
-          </a:p>
-        </p:txBody>
-      </p:sp>
-    </p:spTree>
-    <p:extLst>
-      <p:ext uri="{BB962C8B-B14F-4D97-AF65-F5344CB8AC3E}">
-        <p14:creationId xmlns:p14="http://schemas.microsoft.com/office/powerpoint/2010/main" val="2575233872"/>
-      </p:ext>
-    </p:extLst>
-  </p:cSld>
-  <p:clrMapOvr>
-    <a:masterClrMapping/>
-  </p:clrMapOvr>
-</p:sld>
-</file>
-
 <file path=ppt/slides/slide21.xml><?xml version="1.0" encoding="utf-8"?>
 <p:sld xmlns:a="http://schemas.openxmlformats.org/drawingml/2006/main" xmlns:r="http://schemas.openxmlformats.org/officeDocument/2006/relationships" xmlns:p="http://schemas.openxmlformats.org/presentationml/2006/main">
   <p:cSld>
@@ -4397,20 +4516,39 @@
           <a:lstStyle/>
           <a:p>
             <a:r>
-              <a:rPr lang="en-US" b="1" dirty="0" smtClean="0">
-                <a:solidFill>
-                  <a:srgbClr val="FF0000"/>
-                </a:solidFill>
-              </a:rPr>
-              <a:t>Plots of new base vs alternative model ##</a:t>
-            </a:r>
+              <a:rPr lang="en-US" dirty="0" smtClean="0"/>
+              <a:t>Overall,</a:t>
+            </a:r>
+            <a:r>
+              <a:rPr lang="en-US" dirty="0"/>
+              <a:t> </a:t>
+            </a:r>
+            <a:r>
+              <a:rPr lang="en-US" dirty="0" smtClean="0"/>
+              <a:t>removing filters, aggregating at trimester-area-gear level and merging state data helps to smooth out much of the variability in fishery length comps</a:t>
+            </a:r>
+          </a:p>
+          <a:p>
+            <a:r>
+              <a:rPr lang="en-US" dirty="0" smtClean="0"/>
+              <a:t>And, binning to 5 cm removes variability in length composition without loosing important signal</a:t>
+            </a:r>
+          </a:p>
+          <a:p>
+            <a:r>
+              <a:rPr lang="en-US" dirty="0"/>
+              <a:t>Proposal: add this data treatment as alternative model ###</a:t>
+            </a:r>
+          </a:p>
+          <a:p>
+            <a:endParaRPr lang="en-US" dirty="0" smtClean="0"/>
           </a:p>
         </p:txBody>
       </p:sp>
     </p:spTree>
     <p:extLst>
       <p:ext uri="{BB962C8B-B14F-4D97-AF65-F5344CB8AC3E}">
-        <p14:creationId xmlns:p14="http://schemas.microsoft.com/office/powerpoint/2010/main" val="1423742952"/>
+        <p14:creationId xmlns:p14="http://schemas.microsoft.com/office/powerpoint/2010/main" val="2575233872"/>
       </p:ext>
     </p:extLst>
   </p:cSld>
@@ -4453,12 +4591,8 @@
           <a:lstStyle/>
           <a:p>
             <a:r>
-              <a:rPr lang="en-US" dirty="0"/>
-              <a:t>A</a:t>
-            </a:r>
-            <a:r>
-              <a:rPr lang="en-US" dirty="0" smtClean="0"/>
-              <a:t>ge comp </a:t>
+              <a:rPr lang="en-US" dirty="0" smtClean="0"/>
+              <a:t>Len comp </a:t>
             </a:r>
             <a:r>
               <a:rPr lang="en-US" dirty="0" err="1" smtClean="0"/>
@@ -4484,59 +4618,12 @@
           <a:lstStyle/>
           <a:p>
             <a:r>
-              <a:rPr lang="en-US" dirty="0" smtClean="0"/>
-              <a:t>Survey data: this has been the standard</a:t>
-            </a:r>
-          </a:p>
-          <a:p>
-            <a:r>
-              <a:rPr lang="en-US" dirty="0" smtClean="0"/>
-              <a:t>Fishery data: </a:t>
-            </a:r>
-          </a:p>
-          <a:p>
-            <a:pPr lvl="1"/>
-            <a:r>
-              <a:rPr lang="en-US" dirty="0"/>
-              <a:t>C</a:t>
-            </a:r>
-            <a:r>
-              <a:rPr lang="en-US" dirty="0" smtClean="0"/>
-              <a:t>urrently computed for males/females, then combined (excludes unsexed data)</a:t>
-            </a:r>
-          </a:p>
-          <a:p>
-            <a:pPr lvl="1"/>
-            <a:r>
-              <a:rPr lang="en-US" dirty="0" smtClean="0"/>
-              <a:t>ALK computed with FSA package rather than the observed ALK (essentially, puts lengths into ages that weren’t actually observed)</a:t>
-            </a:r>
-          </a:p>
-          <a:p>
-            <a:pPr lvl="1"/>
-            <a:r>
-              <a:rPr lang="en-US" dirty="0" smtClean="0"/>
-              <a:t>Define smallest lengths in each year as age-1</a:t>
-            </a:r>
-          </a:p>
-          <a:p>
-            <a:r>
-              <a:rPr lang="en-US" dirty="0" smtClean="0"/>
-              <a:t>Propose:</a:t>
-            </a:r>
-          </a:p>
-          <a:p>
-            <a:pPr lvl="1"/>
-            <a:r>
-              <a:rPr lang="en-US" dirty="0" smtClean="0"/>
-              <a:t>Both: combine age/length data across sexes pre-expansion</a:t>
-            </a:r>
-          </a:p>
-          <a:p>
-            <a:pPr lvl="1"/>
-            <a:r>
-              <a:rPr lang="en-US" dirty="0" smtClean="0"/>
-              <a:t>Fishery: use year-specific ALK, remove age-1 assignment</a:t>
+              <a:rPr lang="en-US" b="1" dirty="0" smtClean="0">
+                <a:solidFill>
+                  <a:srgbClr val="FF0000"/>
+                </a:solidFill>
+              </a:rPr>
+              <a:t>Plots of new base vs alternative model ##</a:t>
             </a:r>
           </a:p>
         </p:txBody>
@@ -4544,7 +4631,7 @@
     </p:spTree>
     <p:extLst>
       <p:ext uri="{BB962C8B-B14F-4D97-AF65-F5344CB8AC3E}">
-        <p14:creationId xmlns:p14="http://schemas.microsoft.com/office/powerpoint/2010/main" val="897550304"/>
+        <p14:creationId xmlns:p14="http://schemas.microsoft.com/office/powerpoint/2010/main" val="1423742952"/>
       </p:ext>
     </p:extLst>
   </p:cSld>
@@ -4587,12 +4674,12 @@
           <a:lstStyle/>
           <a:p>
             <a:r>
-              <a:rPr lang="en-US" dirty="0" err="1" smtClean="0"/>
-              <a:t>Apport</a:t>
-            </a:r>
-            <a:r>
-              <a:rPr lang="en-US" dirty="0" smtClean="0"/>
-              <a:t> </a:t>
+              <a:rPr lang="en-US" dirty="0"/>
+              <a:t>A</a:t>
+            </a:r>
+            <a:r>
+              <a:rPr lang="en-US" dirty="0" smtClean="0"/>
+              <a:t>ge comp </a:t>
             </a:r>
             <a:r>
               <a:rPr lang="en-US" dirty="0" err="1" smtClean="0"/>
@@ -4619,42 +4706,58 @@
           <a:p>
             <a:r>
               <a:rPr lang="en-US" dirty="0" smtClean="0"/>
-              <a:t>Reminder: LLS used in assessment as additional </a:t>
-            </a:r>
-            <a:r>
-              <a:rPr lang="en-US" dirty="0" err="1" smtClean="0"/>
-              <a:t>pop’n</a:t>
-            </a:r>
-            <a:r>
-              <a:rPr lang="en-US" dirty="0" smtClean="0"/>
-              <a:t> index, but not used in apportionment</a:t>
+              <a:t>Survey data: this has been the standard</a:t>
+            </a:r>
+          </a:p>
+          <a:p>
+            <a:r>
+              <a:rPr lang="en-US" dirty="0" smtClean="0"/>
+              <a:t>Fishery data: </a:t>
             </a:r>
           </a:p>
           <a:p>
             <a:pPr lvl="1"/>
             <a:r>
-              <a:rPr lang="en-US" dirty="0" smtClean="0"/>
-              <a:t>And, includes an environmental link, where in warmer temps at depth cod move deeper and are more available to the LLS than in colder years</a:t>
-            </a:r>
-          </a:p>
-          <a:p>
-            <a:r>
-              <a:rPr lang="en-US" dirty="0" smtClean="0"/>
-              <a:t>Including it in apportionment has been talked about for some time </a:t>
-            </a:r>
-          </a:p>
-          <a:p>
-            <a:r>
-              <a:rPr lang="en-US" dirty="0" smtClean="0"/>
-              <a:t>Other, ‘tracked’, </a:t>
-            </a:r>
-            <a:r>
-              <a:rPr lang="en-US" dirty="0" err="1" smtClean="0"/>
-              <a:t>pop’n</a:t>
-            </a:r>
-            <a:r>
-              <a:rPr lang="en-US" dirty="0" smtClean="0"/>
-              <a:t> indices include IPHC FISS and ADF&amp;G large mesh trawl survey</a:t>
+              <a:rPr lang="en-US" dirty="0"/>
+              <a:t>C</a:t>
+            </a:r>
+            <a:r>
+              <a:rPr lang="en-US" dirty="0" smtClean="0"/>
+              <a:t>urrently computed for males/females, then combined (excludes unsexed data)</a:t>
+            </a:r>
+          </a:p>
+          <a:p>
+            <a:pPr lvl="1"/>
+            <a:r>
+              <a:rPr lang="en-US" dirty="0" smtClean="0"/>
+              <a:t>ALK computed with FSA package rather than the observed ALK (essentially, puts lengths into ages that weren’t actually observed)</a:t>
+            </a:r>
+          </a:p>
+          <a:p>
+            <a:pPr lvl="1"/>
+            <a:r>
+              <a:rPr lang="en-US" dirty="0" smtClean="0"/>
+              <a:t>Define smallest lengths in each year as age-1</a:t>
+            </a:r>
+          </a:p>
+          <a:p>
+            <a:r>
+              <a:rPr lang="en-US" dirty="0" smtClean="0"/>
+              <a:t>Propose:</a:t>
+            </a:r>
+          </a:p>
+          <a:p>
+            <a:pPr lvl="1"/>
+            <a:r>
+              <a:rPr lang="en-US" dirty="0" smtClean="0"/>
+              <a:t>Both: combine age/length data across sexes pre-expansion</a:t>
+            </a:r>
+          </a:p>
+          <a:p>
+            <a:pPr lvl="1"/>
+            <a:r>
+              <a:rPr lang="en-US" dirty="0" smtClean="0"/>
+              <a:t>Fishery: use year-specific ALK, remove age-1 assignment</a:t>
             </a:r>
           </a:p>
         </p:txBody>
@@ -4662,7 +4765,7 @@
     </p:spTree>
     <p:extLst>
       <p:ext uri="{BB962C8B-B14F-4D97-AF65-F5344CB8AC3E}">
-        <p14:creationId xmlns:p14="http://schemas.microsoft.com/office/powerpoint/2010/main" val="1209424533"/>
+        <p14:creationId xmlns:p14="http://schemas.microsoft.com/office/powerpoint/2010/main" val="897550304"/>
       </p:ext>
     </p:extLst>
   </p:cSld>
@@ -4737,35 +4840,42 @@
           <a:p>
             <a:r>
               <a:rPr lang="en-US" dirty="0" smtClean="0"/>
-              <a:t>Here, look at including LLS into </a:t>
+              <a:t>Reminder: LLS used in assessment as additional </a:t>
             </a:r>
             <a:r>
               <a:rPr lang="en-US" dirty="0" err="1" smtClean="0"/>
-              <a:t>rema</a:t>
-            </a:r>
-            <a:r>
-              <a:rPr lang="en-US" dirty="0" smtClean="0"/>
-              <a:t> as an additional index to be used for apportionment</a:t>
-            </a:r>
-          </a:p>
-          <a:p>
-            <a:r>
-              <a:rPr lang="en-US" dirty="0" smtClean="0"/>
-              <a:t>Step-wise approach:</a:t>
+              <a:t>pop’n</a:t>
+            </a:r>
+            <a:r>
+              <a:rPr lang="en-US" dirty="0" smtClean="0"/>
+              <a:t> index, but not used in apportionment</a:t>
             </a:r>
           </a:p>
           <a:p>
             <a:pPr lvl="1"/>
             <a:r>
               <a:rPr lang="en-US" dirty="0" smtClean="0"/>
-              <a:t>First, look at AIC ‘preferred’ model when it comes to Process Error (PE) and index scaling (q) parameters</a:t>
-            </a:r>
-          </a:p>
-          <a:p>
-            <a:pPr lvl="1"/>
-            <a:r>
-              <a:rPr lang="en-US" dirty="0" smtClean="0"/>
-              <a:t>Next, with ‘preferred’ models investigate estimating additional observation error</a:t>
+              <a:t>And, includes an environmental link, where in warmer temps at depth cod move deeper and are more available to the LLS than in colder years</a:t>
+            </a:r>
+          </a:p>
+          <a:p>
+            <a:r>
+              <a:rPr lang="en-US" dirty="0" smtClean="0"/>
+              <a:t>Including it in apportionment has been talked about for some time </a:t>
+            </a:r>
+          </a:p>
+          <a:p>
+            <a:r>
+              <a:rPr lang="en-US" dirty="0" smtClean="0"/>
+              <a:t>Other, ‘tracked’, </a:t>
+            </a:r>
+            <a:r>
+              <a:rPr lang="en-US" dirty="0" err="1" smtClean="0"/>
+              <a:t>pop’n</a:t>
+            </a:r>
+            <a:r>
+              <a:rPr lang="en-US" dirty="0" smtClean="0"/>
+              <a:t> indices include IPHC FISS and ADF&amp;G large mesh trawl survey</a:t>
             </a:r>
           </a:p>
         </p:txBody>
@@ -4773,7 +4883,7 @@
     </p:spTree>
     <p:extLst>
       <p:ext uri="{BB962C8B-B14F-4D97-AF65-F5344CB8AC3E}">
-        <p14:creationId xmlns:p14="http://schemas.microsoft.com/office/powerpoint/2010/main" val="1936284340"/>
+        <p14:creationId xmlns:p14="http://schemas.microsoft.com/office/powerpoint/2010/main" val="1209424533"/>
       </p:ext>
     </p:extLst>
   </p:cSld>
@@ -4827,6 +4937,117 @@
               <a:rPr lang="en-US" dirty="0" err="1" smtClean="0"/>
               <a:t>inv</a:t>
             </a:r>
+            <a:endParaRPr lang="en-US" dirty="0"/>
+          </a:p>
+        </p:txBody>
+      </p:sp>
+      <p:sp>
+        <p:nvSpPr>
+          <p:cNvPr id="5" name="Content Placeholder 4"/>
+          <p:cNvSpPr>
+            <a:spLocks noGrp="1"/>
+          </p:cNvSpPr>
+          <p:nvPr>
+            <p:ph idx="1"/>
+          </p:nvPr>
+        </p:nvSpPr>
+        <p:spPr/>
+        <p:txBody>
+          <a:bodyPr/>
+          <a:lstStyle/>
+          <a:p>
+            <a:r>
+              <a:rPr lang="en-US" dirty="0" smtClean="0"/>
+              <a:t>Here, look at including LLS into </a:t>
+            </a:r>
+            <a:r>
+              <a:rPr lang="en-US" dirty="0" err="1" smtClean="0"/>
+              <a:t>rema</a:t>
+            </a:r>
+            <a:r>
+              <a:rPr lang="en-US" dirty="0" smtClean="0"/>
+              <a:t> as an additional index to be used for apportionment</a:t>
+            </a:r>
+          </a:p>
+          <a:p>
+            <a:r>
+              <a:rPr lang="en-US" dirty="0" smtClean="0"/>
+              <a:t>Step-wise approach:</a:t>
+            </a:r>
+          </a:p>
+          <a:p>
+            <a:pPr lvl="1"/>
+            <a:r>
+              <a:rPr lang="en-US" dirty="0" smtClean="0"/>
+              <a:t>First, look at AIC ‘preferred’ model when it comes to Process Error (PE) and index scaling (q) parameters</a:t>
+            </a:r>
+          </a:p>
+          <a:p>
+            <a:pPr lvl="1"/>
+            <a:r>
+              <a:rPr lang="en-US" dirty="0" smtClean="0"/>
+              <a:t>Next, with ‘preferred’ models investigate estimating additional observation error</a:t>
+            </a:r>
+          </a:p>
+        </p:txBody>
+      </p:sp>
+    </p:spTree>
+    <p:extLst>
+      <p:ext uri="{BB962C8B-B14F-4D97-AF65-F5344CB8AC3E}">
+        <p14:creationId xmlns:p14="http://schemas.microsoft.com/office/powerpoint/2010/main" val="1936284340"/>
+      </p:ext>
+    </p:extLst>
+  </p:cSld>
+  <p:clrMapOvr>
+    <a:masterClrMapping/>
+  </p:clrMapOvr>
+</p:sld>
+</file>
+
+<file path=ppt/slides/slide26.xml><?xml version="1.0" encoding="utf-8"?>
+<p:sld xmlns:a="http://schemas.openxmlformats.org/drawingml/2006/main" xmlns:r="http://schemas.openxmlformats.org/officeDocument/2006/relationships" xmlns:p="http://schemas.openxmlformats.org/presentationml/2006/main">
+  <p:cSld>
+    <p:spTree>
+      <p:nvGrpSpPr>
+        <p:cNvPr id="1" name=""/>
+        <p:cNvGrpSpPr/>
+        <p:nvPr/>
+      </p:nvGrpSpPr>
+      <p:grpSpPr>
+        <a:xfrm>
+          <a:off x="0" y="0"/>
+          <a:ext cx="0" cy="0"/>
+          <a:chOff x="0" y="0"/>
+          <a:chExt cx="0" cy="0"/>
+        </a:xfrm>
+      </p:grpSpPr>
+      <p:sp>
+        <p:nvSpPr>
+          <p:cNvPr id="4" name="Title 3"/>
+          <p:cNvSpPr>
+            <a:spLocks noGrp="1"/>
+          </p:cNvSpPr>
+          <p:nvPr>
+            <p:ph type="title"/>
+          </p:nvPr>
+        </p:nvSpPr>
+        <p:spPr/>
+        <p:txBody>
+          <a:bodyPr/>
+          <a:lstStyle/>
+          <a:p>
+            <a:r>
+              <a:rPr lang="en-US" dirty="0" err="1" smtClean="0"/>
+              <a:t>Apport</a:t>
+            </a:r>
+            <a:r>
+              <a:rPr lang="en-US" dirty="0" smtClean="0"/>
+              <a:t> </a:t>
+            </a:r>
+            <a:r>
+              <a:rPr lang="en-US" dirty="0" err="1" smtClean="0"/>
+              <a:t>inv</a:t>
+            </a:r>
             <a:r>
               <a:rPr lang="en-US" dirty="0" smtClean="0"/>
               <a:t>: Step 1</a:t>
@@ -4902,7 +5123,7 @@
 </p:sld>
 </file>
 
-<file path=ppt/slides/slide26.xml><?xml version="1.0" encoding="utf-8"?>
+<file path=ppt/slides/slide27.xml><?xml version="1.0" encoding="utf-8"?>
 <p:sld xmlns:a="http://schemas.openxmlformats.org/drawingml/2006/main" xmlns:r="http://schemas.openxmlformats.org/officeDocument/2006/relationships" xmlns:p="http://schemas.openxmlformats.org/presentationml/2006/main">
   <p:cSld>
     <p:spTree>
@@ -5038,7 +5259,7 @@
 </p:sld>
 </file>
 
-<file path=ppt/slides/slide27.xml><?xml version="1.0" encoding="utf-8"?>
+<file path=ppt/slides/slide28.xml><?xml version="1.0" encoding="utf-8"?>
 <p:sld xmlns:a="http://schemas.openxmlformats.org/drawingml/2006/main" xmlns:r="http://schemas.openxmlformats.org/officeDocument/2006/relationships" xmlns:p="http://schemas.openxmlformats.org/presentationml/2006/main">
   <p:cSld>
     <p:spTree>
@@ -5154,7 +5375,7 @@
 </p:sld>
 </file>
 
-<file path=ppt/slides/slide28.xml><?xml version="1.0" encoding="utf-8"?>
+<file path=ppt/slides/slide29.xml><?xml version="1.0" encoding="utf-8"?>
 <p:sld xmlns:a="http://schemas.openxmlformats.org/drawingml/2006/main" xmlns:r="http://schemas.openxmlformats.org/officeDocument/2006/relationships" xmlns:p="http://schemas.openxmlformats.org/presentationml/2006/main">
   <p:cSld>
     <p:spTree>
@@ -5325,7 +5546,91 @@
 </p:sld>
 </file>
 
-<file path=ppt/slides/slide29.xml><?xml version="1.0" encoding="utf-8"?>
+<file path=ppt/slides/slide3.xml><?xml version="1.0" encoding="utf-8"?>
+<p:sld xmlns:a="http://schemas.openxmlformats.org/drawingml/2006/main" xmlns:r="http://schemas.openxmlformats.org/officeDocument/2006/relationships" xmlns:p="http://schemas.openxmlformats.org/presentationml/2006/main">
+  <p:cSld>
+    <p:spTree>
+      <p:nvGrpSpPr>
+        <p:cNvPr id="1" name=""/>
+        <p:cNvGrpSpPr/>
+        <p:nvPr/>
+      </p:nvGrpSpPr>
+      <p:grpSpPr>
+        <a:xfrm>
+          <a:off x="0" y="0"/>
+          <a:ext cx="0" cy="0"/>
+          <a:chOff x="0" y="0"/>
+          <a:chExt cx="0" cy="0"/>
+        </a:xfrm>
+      </p:grpSpPr>
+      <p:sp>
+        <p:nvSpPr>
+          <p:cNvPr id="4" name="Title 3"/>
+          <p:cNvSpPr>
+            <a:spLocks noGrp="1"/>
+          </p:cNvSpPr>
+          <p:nvPr>
+            <p:ph type="title"/>
+          </p:nvPr>
+        </p:nvSpPr>
+        <p:spPr/>
+        <p:txBody>
+          <a:bodyPr/>
+          <a:lstStyle/>
+          <a:p>
+            <a:r>
+              <a:rPr lang="en-US" dirty="0" smtClean="0"/>
+              <a:t>Base data updates</a:t>
+            </a:r>
+            <a:endParaRPr lang="en-US" dirty="0"/>
+          </a:p>
+        </p:txBody>
+      </p:sp>
+      <p:sp>
+        <p:nvSpPr>
+          <p:cNvPr id="5" name="Content Placeholder 4"/>
+          <p:cNvSpPr>
+            <a:spLocks noGrp="1"/>
+          </p:cNvSpPr>
+          <p:nvPr>
+            <p:ph idx="1"/>
+          </p:nvPr>
+        </p:nvSpPr>
+        <p:spPr/>
+        <p:txBody>
+          <a:bodyPr/>
+          <a:lstStyle/>
+          <a:p>
+            <a:r>
+              <a:rPr lang="en-US" b="1" dirty="0" smtClean="0">
+                <a:solidFill>
+                  <a:srgbClr val="FF0000"/>
+                </a:solidFill>
+              </a:rPr>
+              <a:t>Ageing error updated</a:t>
+            </a:r>
+            <a:endParaRPr lang="en-US" b="1" dirty="0">
+              <a:solidFill>
+                <a:srgbClr val="FF0000"/>
+              </a:solidFill>
+            </a:endParaRPr>
+          </a:p>
+        </p:txBody>
+      </p:sp>
+    </p:spTree>
+    <p:extLst>
+      <p:ext uri="{BB962C8B-B14F-4D97-AF65-F5344CB8AC3E}">
+        <p14:creationId xmlns:p14="http://schemas.microsoft.com/office/powerpoint/2010/main" val="1301354348"/>
+      </p:ext>
+    </p:extLst>
+  </p:cSld>
+  <p:clrMapOvr>
+    <a:masterClrMapping/>
+  </p:clrMapOvr>
+</p:sld>
+</file>
+
+<file path=ppt/slides/slide30.xml><?xml version="1.0" encoding="utf-8"?>
 <p:sld xmlns:a="http://schemas.openxmlformats.org/drawingml/2006/main" xmlns:r="http://schemas.openxmlformats.org/officeDocument/2006/relationships" xmlns:p="http://schemas.openxmlformats.org/presentationml/2006/main">
   <p:cSld>
     <p:spTree>
@@ -5501,91 +5806,7 @@
 </p:sld>
 </file>
 
-<file path=ppt/slides/slide3.xml><?xml version="1.0" encoding="utf-8"?>
-<p:sld xmlns:a="http://schemas.openxmlformats.org/drawingml/2006/main" xmlns:r="http://schemas.openxmlformats.org/officeDocument/2006/relationships" xmlns:p="http://schemas.openxmlformats.org/presentationml/2006/main">
-  <p:cSld>
-    <p:spTree>
-      <p:nvGrpSpPr>
-        <p:cNvPr id="1" name=""/>
-        <p:cNvGrpSpPr/>
-        <p:nvPr/>
-      </p:nvGrpSpPr>
-      <p:grpSpPr>
-        <a:xfrm>
-          <a:off x="0" y="0"/>
-          <a:ext cx="0" cy="0"/>
-          <a:chOff x="0" y="0"/>
-          <a:chExt cx="0" cy="0"/>
-        </a:xfrm>
-      </p:grpSpPr>
-      <p:sp>
-        <p:nvSpPr>
-          <p:cNvPr id="4" name="Title 3"/>
-          <p:cNvSpPr>
-            <a:spLocks noGrp="1"/>
-          </p:cNvSpPr>
-          <p:nvPr>
-            <p:ph type="title"/>
-          </p:nvPr>
-        </p:nvSpPr>
-        <p:spPr/>
-        <p:txBody>
-          <a:bodyPr/>
-          <a:lstStyle/>
-          <a:p>
-            <a:r>
-              <a:rPr lang="en-US" dirty="0" smtClean="0"/>
-              <a:t>Base data updates</a:t>
-            </a:r>
-            <a:endParaRPr lang="en-US" dirty="0"/>
-          </a:p>
-        </p:txBody>
-      </p:sp>
-      <p:sp>
-        <p:nvSpPr>
-          <p:cNvPr id="5" name="Content Placeholder 4"/>
-          <p:cNvSpPr>
-            <a:spLocks noGrp="1"/>
-          </p:cNvSpPr>
-          <p:nvPr>
-            <p:ph idx="1"/>
-          </p:nvPr>
-        </p:nvSpPr>
-        <p:spPr/>
-        <p:txBody>
-          <a:bodyPr/>
-          <a:lstStyle/>
-          <a:p>
-            <a:r>
-              <a:rPr lang="en-US" b="1" dirty="0" smtClean="0">
-                <a:solidFill>
-                  <a:srgbClr val="FF0000"/>
-                </a:solidFill>
-              </a:rPr>
-              <a:t>Ageing error updated</a:t>
-            </a:r>
-            <a:endParaRPr lang="en-US" b="1" dirty="0">
-              <a:solidFill>
-                <a:srgbClr val="FF0000"/>
-              </a:solidFill>
-            </a:endParaRPr>
-          </a:p>
-        </p:txBody>
-      </p:sp>
-    </p:spTree>
-    <p:extLst>
-      <p:ext uri="{BB962C8B-B14F-4D97-AF65-F5344CB8AC3E}">
-        <p14:creationId xmlns:p14="http://schemas.microsoft.com/office/powerpoint/2010/main" val="1301354348"/>
-      </p:ext>
-    </p:extLst>
-  </p:cSld>
-  <p:clrMapOvr>
-    <a:masterClrMapping/>
-  </p:clrMapOvr>
-</p:sld>
-</file>
-
-<file path=ppt/slides/slide30.xml><?xml version="1.0" encoding="utf-8"?>
+<file path=ppt/slides/slide31.xml><?xml version="1.0" encoding="utf-8"?>
 <p:sld xmlns:a="http://schemas.openxmlformats.org/drawingml/2006/main" xmlns:r="http://schemas.openxmlformats.org/officeDocument/2006/relationships" xmlns:p="http://schemas.openxmlformats.org/presentationml/2006/main">
   <p:cSld>
     <p:spTree>
@@ -5709,7 +5930,7 @@
 </p:sld>
 </file>
 
-<file path=ppt/slides/slide31.xml><?xml version="1.0" encoding="utf-8"?>
+<file path=ppt/slides/slide32.xml><?xml version="1.0" encoding="utf-8"?>
 <p:sld xmlns:a="http://schemas.openxmlformats.org/drawingml/2006/main" xmlns:r="http://schemas.openxmlformats.org/officeDocument/2006/relationships" xmlns:p="http://schemas.openxmlformats.org/presentationml/2006/main">
   <p:cSld>
     <p:spTree>
@@ -5833,7 +6054,7 @@
 </p:sld>
 </file>
 
-<file path=ppt/slides/slide32.xml><?xml version="1.0" encoding="utf-8"?>
+<file path=ppt/slides/slide33.xml><?xml version="1.0" encoding="utf-8"?>
 <p:sld xmlns:a="http://schemas.openxmlformats.org/drawingml/2006/main" xmlns:r="http://schemas.openxmlformats.org/officeDocument/2006/relationships" xmlns:p="http://schemas.openxmlformats.org/presentationml/2006/main">
   <p:cSld>
     <p:spTree>
@@ -5981,7 +6202,7 @@
 </p:sld>
 </file>
 
-<file path=ppt/slides/slide33.xml><?xml version="1.0" encoding="utf-8"?>
+<file path=ppt/slides/slide34.xml><?xml version="1.0" encoding="utf-8"?>
 <p:sld xmlns:a="http://schemas.openxmlformats.org/drawingml/2006/main" xmlns:r="http://schemas.openxmlformats.org/officeDocument/2006/relationships" xmlns:p="http://schemas.openxmlformats.org/presentationml/2006/main">
   <p:cSld>
     <p:spTree>
@@ -6072,11 +6293,7 @@
             <a:pPr lvl="1"/>
             <a:r>
               <a:rPr lang="en-US" dirty="0" smtClean="0"/>
-              <a:t>Makes apportionment consistent with data used in </a:t>
-            </a:r>
-            <a:r>
-              <a:rPr lang="en-US" dirty="0" smtClean="0"/>
-              <a:t>assessment</a:t>
+              <a:t>Makes apportionment consistent with data used in assessment</a:t>
             </a:r>
           </a:p>
           <a:p>
@@ -6085,7 +6302,6 @@
               <a:rPr lang="en-US" dirty="0" smtClean="0"/>
               <a:t>But, it will likely result in more variable apportionment compared to using only trawl survey</a:t>
             </a:r>
-            <a:endParaRPr lang="en-US" dirty="0" smtClean="0"/>
           </a:p>
           <a:p>
             <a:pPr lvl="1"/>
@@ -6141,7 +6357,7 @@
 </p:sld>
 </file>
 
-<file path=ppt/slides/slide34.xml><?xml version="1.0" encoding="utf-8"?>
+<file path=ppt/slides/slide35.xml><?xml version="1.0" encoding="utf-8"?>
 <p:sld xmlns:a="http://schemas.openxmlformats.org/drawingml/2006/main" xmlns:r="http://schemas.openxmlformats.org/officeDocument/2006/relationships" xmlns:p="http://schemas.openxmlformats.org/presentationml/2006/main">
   <p:cSld>
     <p:spTree>
@@ -6433,7 +6649,7 @@
 </p:sld>
 </file>
 
-<file path=ppt/slides/slide35.xml><?xml version="1.0" encoding="utf-8"?>
+<file path=ppt/slides/slide36.xml><?xml version="1.0" encoding="utf-8"?>
 <p:sld xmlns:a="http://schemas.openxmlformats.org/drawingml/2006/main" xmlns:r="http://schemas.openxmlformats.org/officeDocument/2006/relationships" xmlns:p="http://schemas.openxmlformats.org/presentationml/2006/main">
   <p:cSld>
     <p:spTree>

</xml_diff>